<commit_message>
refactor: translate to spanish configuration
</commit_message>
<xml_diff>
--- a/Presentacion y memorias/Gestor de Dietas.pptx
+++ b/Presentacion y memorias/Gestor de Dietas.pptx
@@ -119,6 +119,35 @@
     </p:ext>
   </p:extLst>
 </p:presentation>
+</file>
+
+<file path=ppt/changesInfos/changesInfo1.xml><?xml version="1.0" encoding="utf-8"?>
+<pc:chgInfo xmlns:a="http://schemas.openxmlformats.org/drawingml/2006/main" xmlns:r="http://schemas.openxmlformats.org/officeDocument/2006/relationships" xmlns:ac="http://schemas.microsoft.com/office/drawing/2013/main/command" xmlns:pc="http://schemas.microsoft.com/office/powerpoint/2013/main/command">
+  <pc:docChgLst>
+    <pc:chgData name="Alberto Velázquez Rapado" userId="b5275a5ea1bbeae7" providerId="LiveId" clId="{82D48C34-EA48-48CD-92C5-616C07D15ACA}"/>
+    <pc:docChg chg="custSel modSld">
+      <pc:chgData name="Alberto Velázquez Rapado" userId="b5275a5ea1bbeae7" providerId="LiveId" clId="{82D48C34-EA48-48CD-92C5-616C07D15ACA}" dt="2023-06-15T09:00:46.158" v="65" actId="1076"/>
+      <pc:docMkLst>
+        <pc:docMk/>
+      </pc:docMkLst>
+      <pc:sldChg chg="modSp mod">
+        <pc:chgData name="Alberto Velázquez Rapado" userId="b5275a5ea1bbeae7" providerId="LiveId" clId="{82D48C34-EA48-48CD-92C5-616C07D15ACA}" dt="2023-06-15T09:00:46.158" v="65" actId="1076"/>
+        <pc:sldMkLst>
+          <pc:docMk/>
+          <pc:sldMk cId="20039717" sldId="256"/>
+        </pc:sldMkLst>
+        <pc:spChg chg="mod">
+          <ac:chgData name="Alberto Velázquez Rapado" userId="b5275a5ea1bbeae7" providerId="LiveId" clId="{82D48C34-EA48-48CD-92C5-616C07D15ACA}" dt="2023-06-15T09:00:46.158" v="65" actId="1076"/>
+          <ac:spMkLst>
+            <pc:docMk/>
+            <pc:sldMk cId="20039717" sldId="256"/>
+            <ac:spMk id="5" creationId="{A58E0E4B-45B9-BEC9-CA98-BC6393B0818A}"/>
+          </ac:spMkLst>
+        </pc:spChg>
+      </pc:sldChg>
+    </pc:docChg>
+  </pc:docChgLst>
+</pc:chgInfo>
 </file>
 
 <file path=ppt/slideLayouts/slideLayout1.xml><?xml version="1.0" encoding="utf-8"?>
@@ -843,7 +872,7 @@
           <a:p>
             <a:fld id="{68FB41E2-212A-458D-84D8-C7300EE7A49C}" type="datetimeFigureOut">
               <a:rPr lang="es-ES" smtClean="0"/>
-              <a:t>14/06/2023</a:t>
+              <a:t>15/06/2023</a:t>
             </a:fld>
             <a:endParaRPr lang="es-ES"/>
           </a:p>
@@ -1094,7 +1123,7 @@
           <a:p>
             <a:fld id="{68FB41E2-212A-458D-84D8-C7300EE7A49C}" type="datetimeFigureOut">
               <a:rPr lang="es-ES" smtClean="0"/>
-              <a:t>14/06/2023</a:t>
+              <a:t>15/06/2023</a:t>
             </a:fld>
             <a:endParaRPr lang="es-ES"/>
           </a:p>
@@ -1408,7 +1437,7 @@
           <a:p>
             <a:fld id="{68FB41E2-212A-458D-84D8-C7300EE7A49C}" type="datetimeFigureOut">
               <a:rPr lang="es-ES" smtClean="0"/>
-              <a:t>14/06/2023</a:t>
+              <a:t>15/06/2023</a:t>
             </a:fld>
             <a:endParaRPr lang="es-ES"/>
           </a:p>
@@ -1749,7 +1778,7 @@
           <a:p>
             <a:fld id="{68FB41E2-212A-458D-84D8-C7300EE7A49C}" type="datetimeFigureOut">
               <a:rPr lang="es-ES" smtClean="0"/>
-              <a:t>14/06/2023</a:t>
+              <a:t>15/06/2023</a:t>
             </a:fld>
             <a:endParaRPr lang="es-ES"/>
           </a:p>
@@ -2063,7 +2092,7 @@
           <a:p>
             <a:fld id="{68FB41E2-212A-458D-84D8-C7300EE7A49C}" type="datetimeFigureOut">
               <a:rPr lang="es-ES" smtClean="0"/>
-              <a:t>14/06/2023</a:t>
+              <a:t>15/06/2023</a:t>
             </a:fld>
             <a:endParaRPr lang="es-ES"/>
           </a:p>
@@ -2456,7 +2485,7 @@
           <a:p>
             <a:fld id="{68FB41E2-212A-458D-84D8-C7300EE7A49C}" type="datetimeFigureOut">
               <a:rPr lang="es-ES" smtClean="0"/>
-              <a:t>14/06/2023</a:t>
+              <a:t>15/06/2023</a:t>
             </a:fld>
             <a:endParaRPr lang="es-ES"/>
           </a:p>
@@ -2626,7 +2655,7 @@
           <a:p>
             <a:fld id="{68FB41E2-212A-458D-84D8-C7300EE7A49C}" type="datetimeFigureOut">
               <a:rPr lang="es-ES" smtClean="0"/>
-              <a:t>14/06/2023</a:t>
+              <a:t>15/06/2023</a:t>
             </a:fld>
             <a:endParaRPr lang="es-ES"/>
           </a:p>
@@ -2806,7 +2835,7 @@
           <a:p>
             <a:fld id="{68FB41E2-212A-458D-84D8-C7300EE7A49C}" type="datetimeFigureOut">
               <a:rPr lang="es-ES" smtClean="0"/>
-              <a:t>14/06/2023</a:t>
+              <a:t>15/06/2023</a:t>
             </a:fld>
             <a:endParaRPr lang="es-ES"/>
           </a:p>
@@ -2982,7 +3011,7 @@
           <a:p>
             <a:fld id="{68FB41E2-212A-458D-84D8-C7300EE7A49C}" type="datetimeFigureOut">
               <a:rPr lang="es-ES" smtClean="0"/>
-              <a:t>14/06/2023</a:t>
+              <a:t>15/06/2023</a:t>
             </a:fld>
             <a:endParaRPr lang="es-ES"/>
           </a:p>
@@ -3229,7 +3258,7 @@
           <a:p>
             <a:fld id="{68FB41E2-212A-458D-84D8-C7300EE7A49C}" type="datetimeFigureOut">
               <a:rPr lang="es-ES" smtClean="0"/>
-              <a:t>14/06/2023</a:t>
+              <a:t>15/06/2023</a:t>
             </a:fld>
             <a:endParaRPr lang="es-ES"/>
           </a:p>
@@ -3461,7 +3490,7 @@
           <a:p>
             <a:fld id="{68FB41E2-212A-458D-84D8-C7300EE7A49C}" type="datetimeFigureOut">
               <a:rPr lang="es-ES" smtClean="0"/>
-              <a:t>14/06/2023</a:t>
+              <a:t>15/06/2023</a:t>
             </a:fld>
             <a:endParaRPr lang="es-ES"/>
           </a:p>
@@ -3835,7 +3864,7 @@
           <a:p>
             <a:fld id="{68FB41E2-212A-458D-84D8-C7300EE7A49C}" type="datetimeFigureOut">
               <a:rPr lang="es-ES" smtClean="0"/>
-              <a:t>14/06/2023</a:t>
+              <a:t>15/06/2023</a:t>
             </a:fld>
             <a:endParaRPr lang="es-ES"/>
           </a:p>
@@ -3958,7 +3987,7 @@
           <a:p>
             <a:fld id="{68FB41E2-212A-458D-84D8-C7300EE7A49C}" type="datetimeFigureOut">
               <a:rPr lang="es-ES" smtClean="0"/>
-              <a:t>14/06/2023</a:t>
+              <a:t>15/06/2023</a:t>
             </a:fld>
             <a:endParaRPr lang="es-ES"/>
           </a:p>
@@ -4053,7 +4082,7 @@
           <a:p>
             <a:fld id="{68FB41E2-212A-458D-84D8-C7300EE7A49C}" type="datetimeFigureOut">
               <a:rPr lang="es-ES" smtClean="0"/>
-              <a:t>14/06/2023</a:t>
+              <a:t>15/06/2023</a:t>
             </a:fld>
             <a:endParaRPr lang="es-ES"/>
           </a:p>
@@ -4308,7 +4337,7 @@
           <a:p>
             <a:fld id="{68FB41E2-212A-458D-84D8-C7300EE7A49C}" type="datetimeFigureOut">
               <a:rPr lang="es-ES" smtClean="0"/>
-              <a:t>14/06/2023</a:t>
+              <a:t>15/06/2023</a:t>
             </a:fld>
             <a:endParaRPr lang="es-ES"/>
           </a:p>
@@ -4571,7 +4600,7 @@
           <a:p>
             <a:fld id="{68FB41E2-212A-458D-84D8-C7300EE7A49C}" type="datetimeFigureOut">
               <a:rPr lang="es-ES" smtClean="0"/>
-              <a:t>14/06/2023</a:t>
+              <a:t>15/06/2023</a:t>
             </a:fld>
             <a:endParaRPr lang="es-ES"/>
           </a:p>
@@ -5314,7 +5343,7 @@
           <a:p>
             <a:fld id="{68FB41E2-212A-458D-84D8-C7300EE7A49C}" type="datetimeFigureOut">
               <a:rPr lang="es-ES" smtClean="0"/>
-              <a:t>14/06/2023</a:t>
+              <a:t>15/06/2023</a:t>
             </a:fld>
             <a:endParaRPr lang="es-ES"/>
           </a:p>
@@ -5917,8 +5946,8 @@
         </p:nvSpPr>
         <p:spPr>
           <a:xfrm>
-            <a:off x="1984159" y="5147732"/>
-            <a:ext cx="6098958" cy="369332"/>
+            <a:off x="976993" y="5479037"/>
+            <a:ext cx="6098958" cy="646331"/>
           </a:xfrm>
           <a:prstGeom prst="rect">
             <a:avLst/>
@@ -5939,29 +5968,44 @@
                 <a:effectLst/>
                 <a:latin typeface="DDG_ProximaNova"/>
               </a:rPr>
-              <a:t>Mi nombre y el de </a:t>
-            </a:r>
-            <a:r>
-              <a:rPr lang="es-ES" b="0" i="0" dirty="0" err="1">
+              <a:t>Alumno: Alberto Velázquez Rapado</a:t>
+            </a:r>
+          </a:p>
+          <a:p>
+            <a:r>
+              <a:rPr lang="es-ES" dirty="0">
                 <a:solidFill>
                   <a:srgbClr val="666666"/>
                 </a:solidFill>
-                <a:effectLst/>
+                <a:latin typeface="DDG_ProximaNova"/>
+              </a:rPr>
+              <a:t>Tutor: </a:t>
+            </a:r>
+            <a:r>
+              <a:rPr lang="es-ES" dirty="0" err="1">
+                <a:solidFill>
+                  <a:srgbClr val="666666"/>
+                </a:solidFill>
                 <a:latin typeface="DDG_ProximaNova"/>
               </a:rPr>
               <a:t>Jose</a:t>
             </a:r>
             <a:r>
-              <a:rPr lang="es-ES" b="0" i="0" dirty="0">
+              <a:rPr lang="es-ES" dirty="0">
                 <a:solidFill>
                   <a:srgbClr val="666666"/>
                 </a:solidFill>
-                <a:effectLst/>
                 <a:latin typeface="DDG_ProximaNova"/>
               </a:rPr>
-              <a:t> Luis</a:t>
-            </a:r>
-            <a:endParaRPr lang="es-ES" dirty="0"/>
+              <a:t> Luis Román Bienes</a:t>
+            </a:r>
+            <a:endParaRPr lang="es-ES" b="0" i="0" dirty="0">
+              <a:solidFill>
+                <a:srgbClr val="666666"/>
+              </a:solidFill>
+              <a:effectLst/>
+              <a:latin typeface="DDG_ProximaNova"/>
+            </a:endParaRPr>
           </a:p>
         </p:txBody>
       </p:sp>

</xml_diff>

<commit_message>
feat: update home page
</commit_message>
<xml_diff>
--- a/Presentacion y memorias/Gestor de Dietas.pptx
+++ b/Presentacion y memorias/Gestor de Dietas.pptx
@@ -11,8 +11,8 @@
     <p:sldId id="258" r:id="rId5"/>
     <p:sldId id="259" r:id="rId6"/>
     <p:sldId id="260" r:id="rId7"/>
-    <p:sldId id="261" r:id="rId8"/>
-    <p:sldId id="265" r:id="rId9"/>
+    <p:sldId id="265" r:id="rId8"/>
+    <p:sldId id="261" r:id="rId9"/>
     <p:sldId id="262" r:id="rId10"/>
     <p:sldId id="263" r:id="rId11"/>
   </p:sldIdLst>
@@ -125,8 +125,8 @@
 <pc:chgInfo xmlns:a="http://schemas.openxmlformats.org/drawingml/2006/main" xmlns:r="http://schemas.openxmlformats.org/officeDocument/2006/relationships" xmlns:ac="http://schemas.microsoft.com/office/drawing/2013/main/command" xmlns:pc="http://schemas.microsoft.com/office/powerpoint/2013/main/command">
   <pc:docChgLst>
     <pc:chgData name="Alberto Velázquez Rapado" userId="b5275a5ea1bbeae7" providerId="LiveId" clId="{82D48C34-EA48-48CD-92C5-616C07D15ACA}"/>
-    <pc:docChg chg="custSel modSld">
-      <pc:chgData name="Alberto Velázquez Rapado" userId="b5275a5ea1bbeae7" providerId="LiveId" clId="{82D48C34-EA48-48CD-92C5-616C07D15ACA}" dt="2023-06-15T09:00:46.158" v="65" actId="1076"/>
+    <pc:docChg chg="undo custSel modSld sldOrd">
+      <pc:chgData name="Alberto Velázquez Rapado" userId="b5275a5ea1bbeae7" providerId="LiveId" clId="{82D48C34-EA48-48CD-92C5-616C07D15ACA}" dt="2023-06-21T10:02:23.332" v="603" actId="20577"/>
       <pc:docMkLst>
         <pc:docMk/>
       </pc:docMkLst>
@@ -142,6 +142,240 @@
             <pc:docMk/>
             <pc:sldMk cId="20039717" sldId="256"/>
             <ac:spMk id="5" creationId="{A58E0E4B-45B9-BEC9-CA98-BC6393B0818A}"/>
+          </ac:spMkLst>
+        </pc:spChg>
+      </pc:sldChg>
+      <pc:sldChg chg="modSp mod">
+        <pc:chgData name="Alberto Velázquez Rapado" userId="b5275a5ea1bbeae7" providerId="LiveId" clId="{82D48C34-EA48-48CD-92C5-616C07D15ACA}" dt="2023-06-21T10:02:23.332" v="603" actId="20577"/>
+        <pc:sldMkLst>
+          <pc:docMk/>
+          <pc:sldMk cId="1052401113" sldId="259"/>
+        </pc:sldMkLst>
+        <pc:spChg chg="mod">
+          <ac:chgData name="Alberto Velázquez Rapado" userId="b5275a5ea1bbeae7" providerId="LiveId" clId="{82D48C34-EA48-48CD-92C5-616C07D15ACA}" dt="2023-06-21T10:02:23.332" v="603" actId="20577"/>
+          <ac:spMkLst>
+            <pc:docMk/>
+            <pc:sldMk cId="1052401113" sldId="259"/>
+            <ac:spMk id="3" creationId="{4F8C50B0-0470-FF1F-FCAC-069A7FFAADE4}"/>
+          </ac:spMkLst>
+        </pc:spChg>
+      </pc:sldChg>
+      <pc:sldChg chg="addSp modSp mod">
+        <pc:chgData name="Alberto Velázquez Rapado" userId="b5275a5ea1bbeae7" providerId="LiveId" clId="{82D48C34-EA48-48CD-92C5-616C07D15ACA}" dt="2023-06-20T11:26:24.660" v="394" actId="14100"/>
+        <pc:sldMkLst>
+          <pc:docMk/>
+          <pc:sldMk cId="3222557619" sldId="260"/>
+        </pc:sldMkLst>
+        <pc:spChg chg="mod">
+          <ac:chgData name="Alberto Velázquez Rapado" userId="b5275a5ea1bbeae7" providerId="LiveId" clId="{82D48C34-EA48-48CD-92C5-616C07D15ACA}" dt="2023-06-20T11:24:14.076" v="212" actId="1076"/>
+          <ac:spMkLst>
+            <pc:docMk/>
+            <pc:sldMk cId="3222557619" sldId="260"/>
+            <ac:spMk id="2" creationId="{C6C214C8-DD43-DC5C-A40F-B96DC2967418}"/>
+          </ac:spMkLst>
+        </pc:spChg>
+        <pc:spChg chg="mod">
+          <ac:chgData name="Alberto Velázquez Rapado" userId="b5275a5ea1bbeae7" providerId="LiveId" clId="{82D48C34-EA48-48CD-92C5-616C07D15ACA}" dt="2023-06-20T11:24:26.906" v="246" actId="14100"/>
+          <ac:spMkLst>
+            <pc:docMk/>
+            <pc:sldMk cId="3222557619" sldId="260"/>
+            <ac:spMk id="5" creationId="{590B0902-6532-E384-DA7B-821830963789}"/>
+          </ac:spMkLst>
+        </pc:spChg>
+        <pc:spChg chg="mod">
+          <ac:chgData name="Alberto Velázquez Rapado" userId="b5275a5ea1bbeae7" providerId="LiveId" clId="{82D48C34-EA48-48CD-92C5-616C07D15ACA}" dt="2023-06-20T11:24:52.495" v="272" actId="1037"/>
+          <ac:spMkLst>
+            <pc:docMk/>
+            <pc:sldMk cId="3222557619" sldId="260"/>
+            <ac:spMk id="6" creationId="{B1B45903-85CA-239C-9115-601419267226}"/>
+          </ac:spMkLst>
+        </pc:spChg>
+        <pc:spChg chg="mod">
+          <ac:chgData name="Alberto Velázquez Rapado" userId="b5275a5ea1bbeae7" providerId="LiveId" clId="{82D48C34-EA48-48CD-92C5-616C07D15ACA}" dt="2023-06-20T11:26:24.660" v="394" actId="14100"/>
+          <ac:spMkLst>
+            <pc:docMk/>
+            <pc:sldMk cId="3222557619" sldId="260"/>
+            <ac:spMk id="7" creationId="{932D9D8E-662B-D943-771E-B6D85E42DAE9}"/>
+          </ac:spMkLst>
+        </pc:spChg>
+        <pc:spChg chg="add mod">
+          <ac:chgData name="Alberto Velázquez Rapado" userId="b5275a5ea1bbeae7" providerId="LiveId" clId="{82D48C34-EA48-48CD-92C5-616C07D15ACA}" dt="2023-06-20T11:26:19.390" v="393" actId="14100"/>
+          <ac:spMkLst>
+            <pc:docMk/>
+            <pc:sldMk cId="3222557619" sldId="260"/>
+            <ac:spMk id="12" creationId="{D54E105F-0198-14C0-138F-C54F3D3B6B66}"/>
+          </ac:spMkLst>
+        </pc:spChg>
+        <pc:picChg chg="add mod">
+          <ac:chgData name="Alberto Velázquez Rapado" userId="b5275a5ea1bbeae7" providerId="LiveId" clId="{82D48C34-EA48-48CD-92C5-616C07D15ACA}" dt="2023-06-20T11:24:40.449" v="252" actId="1076"/>
+          <ac:picMkLst>
+            <pc:docMk/>
+            <pc:sldMk cId="3222557619" sldId="260"/>
+            <ac:picMk id="10" creationId="{08DD74E5-2374-6509-D6F1-D54AC30A8F8E}"/>
+          </ac:picMkLst>
+        </pc:picChg>
+        <pc:picChg chg="add mod">
+          <ac:chgData name="Alberto Velázquez Rapado" userId="b5275a5ea1bbeae7" providerId="LiveId" clId="{82D48C34-EA48-48CD-92C5-616C07D15ACA}" dt="2023-06-20T11:26:10.799" v="392" actId="1036"/>
+          <ac:picMkLst>
+            <pc:docMk/>
+            <pc:sldMk cId="3222557619" sldId="260"/>
+            <ac:picMk id="11" creationId="{B47C186E-A253-61D2-4404-BED27DC32AD7}"/>
+          </ac:picMkLst>
+        </pc:picChg>
+        <pc:picChg chg="mod">
+          <ac:chgData name="Alberto Velázquez Rapado" userId="b5275a5ea1bbeae7" providerId="LiveId" clId="{82D48C34-EA48-48CD-92C5-616C07D15ACA}" dt="2023-06-20T11:24:35.909" v="250" actId="1076"/>
+          <ac:picMkLst>
+            <pc:docMk/>
+            <pc:sldMk cId="3222557619" sldId="260"/>
+            <ac:picMk id="1026" creationId="{BC89CEA6-D104-2B80-1C24-E54B6E4E60C0}"/>
+          </ac:picMkLst>
+        </pc:picChg>
+        <pc:picChg chg="mod">
+          <ac:chgData name="Alberto Velázquez Rapado" userId="b5275a5ea1bbeae7" providerId="LiveId" clId="{82D48C34-EA48-48CD-92C5-616C07D15ACA}" dt="2023-06-20T11:24:52.495" v="272" actId="1037"/>
+          <ac:picMkLst>
+            <pc:docMk/>
+            <pc:sldMk cId="3222557619" sldId="260"/>
+            <ac:picMk id="1044" creationId="{46DF071F-0D1F-06E7-E53B-6C2041B663A4}"/>
+          </ac:picMkLst>
+        </pc:picChg>
+        <pc:picChg chg="mod">
+          <ac:chgData name="Alberto Velázquez Rapado" userId="b5275a5ea1bbeae7" providerId="LiveId" clId="{82D48C34-EA48-48CD-92C5-616C07D15ACA}" dt="2023-06-20T11:24:52.495" v="272" actId="1037"/>
+          <ac:picMkLst>
+            <pc:docMk/>
+            <pc:sldMk cId="3222557619" sldId="260"/>
+            <ac:picMk id="1046" creationId="{42D7F49A-940B-04D0-D326-3A2910FC1469}"/>
+          </ac:picMkLst>
+        </pc:picChg>
+        <pc:picChg chg="mod">
+          <ac:chgData name="Alberto Velázquez Rapado" userId="b5275a5ea1bbeae7" providerId="LiveId" clId="{82D48C34-EA48-48CD-92C5-616C07D15ACA}" dt="2023-06-20T11:24:52.495" v="272" actId="1037"/>
+          <ac:picMkLst>
+            <pc:docMk/>
+            <pc:sldMk cId="3222557619" sldId="260"/>
+            <ac:picMk id="1048" creationId="{F8EC5F60-90B1-C76B-0BDE-936D93F81650}"/>
+          </ac:picMkLst>
+        </pc:picChg>
+        <pc:picChg chg="mod">
+          <ac:chgData name="Alberto Velázquez Rapado" userId="b5275a5ea1bbeae7" providerId="LiveId" clId="{82D48C34-EA48-48CD-92C5-616C07D15ACA}" dt="2023-06-20T11:24:52.495" v="272" actId="1037"/>
+          <ac:picMkLst>
+            <pc:docMk/>
+            <pc:sldMk cId="3222557619" sldId="260"/>
+            <ac:picMk id="1050" creationId="{6CF48E4A-A778-AD3D-C1BF-CF90F2F6CDCC}"/>
+          </ac:picMkLst>
+        </pc:picChg>
+        <pc:picChg chg="mod">
+          <ac:chgData name="Alberto Velázquez Rapado" userId="b5275a5ea1bbeae7" providerId="LiveId" clId="{82D48C34-EA48-48CD-92C5-616C07D15ACA}" dt="2023-06-20T11:24:52.495" v="272" actId="1037"/>
+          <ac:picMkLst>
+            <pc:docMk/>
+            <pc:sldMk cId="3222557619" sldId="260"/>
+            <ac:picMk id="1052" creationId="{0C814756-142B-89D9-412E-2E419BCF81FA}"/>
+          </ac:picMkLst>
+        </pc:picChg>
+        <pc:picChg chg="mod">
+          <ac:chgData name="Alberto Velázquez Rapado" userId="b5275a5ea1bbeae7" providerId="LiveId" clId="{82D48C34-EA48-48CD-92C5-616C07D15ACA}" dt="2023-06-20T11:24:52.495" v="272" actId="1037"/>
+          <ac:picMkLst>
+            <pc:docMk/>
+            <pc:sldMk cId="3222557619" sldId="260"/>
+            <ac:picMk id="1054" creationId="{A172A297-DC7C-2E76-58E6-95CE8BF95C24}"/>
+          </ac:picMkLst>
+        </pc:picChg>
+        <pc:picChg chg="mod">
+          <ac:chgData name="Alberto Velázquez Rapado" userId="b5275a5ea1bbeae7" providerId="LiveId" clId="{82D48C34-EA48-48CD-92C5-616C07D15ACA}" dt="2023-06-20T11:25:00.590" v="275" actId="1076"/>
+          <ac:picMkLst>
+            <pc:docMk/>
+            <pc:sldMk cId="3222557619" sldId="260"/>
+            <ac:picMk id="1056" creationId="{DE492B06-A904-96B1-9218-ED1493EDD937}"/>
+          </ac:picMkLst>
+        </pc:picChg>
+      </pc:sldChg>
+      <pc:sldChg chg="addSp delSp modSp mod">
+        <pc:chgData name="Alberto Velázquez Rapado" userId="b5275a5ea1bbeae7" providerId="LiveId" clId="{82D48C34-EA48-48CD-92C5-616C07D15ACA}" dt="2023-06-20T11:38:57.260" v="434" actId="1036"/>
+        <pc:sldMkLst>
+          <pc:docMk/>
+          <pc:sldMk cId="668459926" sldId="261"/>
+        </pc:sldMkLst>
+        <pc:spChg chg="ord">
+          <ac:chgData name="Alberto Velázquez Rapado" userId="b5275a5ea1bbeae7" providerId="LiveId" clId="{82D48C34-EA48-48CD-92C5-616C07D15ACA}" dt="2023-06-20T11:38:35.882" v="420" actId="166"/>
+          <ac:spMkLst>
+            <pc:docMk/>
+            <pc:sldMk cId="668459926" sldId="261"/>
+            <ac:spMk id="2" creationId="{61BD8FAF-7728-8988-EA4D-52DA1BCD1C9A}"/>
+          </ac:spMkLst>
+        </pc:spChg>
+        <pc:spChg chg="add del mod">
+          <ac:chgData name="Alberto Velázquez Rapado" userId="b5275a5ea1bbeae7" providerId="LiveId" clId="{82D48C34-EA48-48CD-92C5-616C07D15ACA}" dt="2023-06-20T11:33:17.435" v="403" actId="478"/>
+          <ac:spMkLst>
+            <pc:docMk/>
+            <pc:sldMk cId="668459926" sldId="261"/>
+            <ac:spMk id="7" creationId="{1EB6950E-7098-EF77-BA9F-99E9C446E123}"/>
+          </ac:spMkLst>
+        </pc:spChg>
+        <pc:picChg chg="add del mod">
+          <ac:chgData name="Alberto Velázquez Rapado" userId="b5275a5ea1bbeae7" providerId="LiveId" clId="{82D48C34-EA48-48CD-92C5-616C07D15ACA}" dt="2023-06-20T11:37:39.144" v="407" actId="478"/>
+          <ac:picMkLst>
+            <pc:docMk/>
+            <pc:sldMk cId="668459926" sldId="261"/>
+            <ac:picMk id="4" creationId="{C2C08786-4F2B-12D6-4E9C-3D6C10BAFFDE}"/>
+          </ac:picMkLst>
+        </pc:picChg>
+        <pc:picChg chg="del mod">
+          <ac:chgData name="Alberto Velázquez Rapado" userId="b5275a5ea1bbeae7" providerId="LiveId" clId="{82D48C34-EA48-48CD-92C5-616C07D15ACA}" dt="2023-06-20T11:32:57.326" v="399" actId="478"/>
+          <ac:picMkLst>
+            <pc:docMk/>
+            <pc:sldMk cId="668459926" sldId="261"/>
+            <ac:picMk id="5" creationId="{487DDDF6-984B-0150-ED5B-4DBDE2075E61}"/>
+          </ac:picMkLst>
+        </pc:picChg>
+        <pc:picChg chg="add mod modCrop">
+          <ac:chgData name="Alberto Velázquez Rapado" userId="b5275a5ea1bbeae7" providerId="LiveId" clId="{82D48C34-EA48-48CD-92C5-616C07D15ACA}" dt="2023-06-20T11:38:57.260" v="434" actId="1036"/>
+          <ac:picMkLst>
+            <pc:docMk/>
+            <pc:sldMk cId="668459926" sldId="261"/>
+            <ac:picMk id="9" creationId="{22F4055C-FB0E-DA51-D967-58ED5E9D5AAD}"/>
+          </ac:picMkLst>
+        </pc:picChg>
+      </pc:sldChg>
+      <pc:sldChg chg="modSp mod">
+        <pc:chgData name="Alberto Velázquez Rapado" userId="b5275a5ea1bbeae7" providerId="LiveId" clId="{82D48C34-EA48-48CD-92C5-616C07D15ACA}" dt="2023-06-20T11:41:53.253" v="590" actId="207"/>
+        <pc:sldMkLst>
+          <pc:docMk/>
+          <pc:sldMk cId="1928398243" sldId="262"/>
+        </pc:sldMkLst>
+        <pc:spChg chg="mod">
+          <ac:chgData name="Alberto Velázquez Rapado" userId="b5275a5ea1bbeae7" providerId="LiveId" clId="{82D48C34-EA48-48CD-92C5-616C07D15ACA}" dt="2023-06-20T11:41:53.253" v="590" actId="207"/>
+          <ac:spMkLst>
+            <pc:docMk/>
+            <pc:sldMk cId="1928398243" sldId="262"/>
+            <ac:spMk id="3" creationId="{B925B571-44AD-9500-5DE4-637EE8EC8A0C}"/>
+          </ac:spMkLst>
+        </pc:spChg>
+      </pc:sldChg>
+      <pc:sldChg chg="modSp mod">
+        <pc:chgData name="Alberto Velázquez Rapado" userId="b5275a5ea1bbeae7" providerId="LiveId" clId="{82D48C34-EA48-48CD-92C5-616C07D15ACA}" dt="2023-06-20T11:41:05.273" v="545" actId="5793"/>
+        <pc:sldMkLst>
+          <pc:docMk/>
+          <pc:sldMk cId="144551678" sldId="264"/>
+        </pc:sldMkLst>
+        <pc:spChg chg="mod">
+          <ac:chgData name="Alberto Velázquez Rapado" userId="b5275a5ea1bbeae7" providerId="LiveId" clId="{82D48C34-EA48-48CD-92C5-616C07D15ACA}" dt="2023-06-20T11:41:05.273" v="545" actId="5793"/>
+          <ac:spMkLst>
+            <pc:docMk/>
+            <pc:sldMk cId="144551678" sldId="264"/>
+            <ac:spMk id="3" creationId="{78669549-A335-3A34-3C1D-213FB03C61FD}"/>
+          </ac:spMkLst>
+        </pc:spChg>
+      </pc:sldChg>
+      <pc:sldChg chg="modSp mod ord">
+        <pc:chgData name="Alberto Velázquez Rapado" userId="b5275a5ea1bbeae7" providerId="LiveId" clId="{82D48C34-EA48-48CD-92C5-616C07D15ACA}" dt="2023-06-20T11:42:17.786" v="591" actId="313"/>
+        <pc:sldMkLst>
+          <pc:docMk/>
+          <pc:sldMk cId="3251461164" sldId="265"/>
+        </pc:sldMkLst>
+        <pc:spChg chg="mod">
+          <ac:chgData name="Alberto Velázquez Rapado" userId="b5275a5ea1bbeae7" providerId="LiveId" clId="{82D48C34-EA48-48CD-92C5-616C07D15ACA}" dt="2023-06-20T11:42:17.786" v="591" actId="313"/>
+          <ac:spMkLst>
+            <pc:docMk/>
+            <pc:sldMk cId="3251461164" sldId="265"/>
+            <ac:spMk id="6" creationId="{FE673028-BA31-4425-A0DF-BF4C1EF31C56}"/>
           </ac:spMkLst>
         </pc:spChg>
       </pc:sldChg>
@@ -872,7 +1106,7 @@
           <a:p>
             <a:fld id="{68FB41E2-212A-458D-84D8-C7300EE7A49C}" type="datetimeFigureOut">
               <a:rPr lang="es-ES" smtClean="0"/>
-              <a:t>15/06/2023</a:t>
+              <a:t>21/06/2023</a:t>
             </a:fld>
             <a:endParaRPr lang="es-ES"/>
           </a:p>
@@ -1123,7 +1357,7 @@
           <a:p>
             <a:fld id="{68FB41E2-212A-458D-84D8-C7300EE7A49C}" type="datetimeFigureOut">
               <a:rPr lang="es-ES" smtClean="0"/>
-              <a:t>15/06/2023</a:t>
+              <a:t>21/06/2023</a:t>
             </a:fld>
             <a:endParaRPr lang="es-ES"/>
           </a:p>
@@ -1437,7 +1671,7 @@
           <a:p>
             <a:fld id="{68FB41E2-212A-458D-84D8-C7300EE7A49C}" type="datetimeFigureOut">
               <a:rPr lang="es-ES" smtClean="0"/>
-              <a:t>15/06/2023</a:t>
+              <a:t>21/06/2023</a:t>
             </a:fld>
             <a:endParaRPr lang="es-ES"/>
           </a:p>
@@ -1778,7 +2012,7 @@
           <a:p>
             <a:fld id="{68FB41E2-212A-458D-84D8-C7300EE7A49C}" type="datetimeFigureOut">
               <a:rPr lang="es-ES" smtClean="0"/>
-              <a:t>15/06/2023</a:t>
+              <a:t>21/06/2023</a:t>
             </a:fld>
             <a:endParaRPr lang="es-ES"/>
           </a:p>
@@ -2092,7 +2326,7 @@
           <a:p>
             <a:fld id="{68FB41E2-212A-458D-84D8-C7300EE7A49C}" type="datetimeFigureOut">
               <a:rPr lang="es-ES" smtClean="0"/>
-              <a:t>15/06/2023</a:t>
+              <a:t>21/06/2023</a:t>
             </a:fld>
             <a:endParaRPr lang="es-ES"/>
           </a:p>
@@ -2485,7 +2719,7 @@
           <a:p>
             <a:fld id="{68FB41E2-212A-458D-84D8-C7300EE7A49C}" type="datetimeFigureOut">
               <a:rPr lang="es-ES" smtClean="0"/>
-              <a:t>15/06/2023</a:t>
+              <a:t>21/06/2023</a:t>
             </a:fld>
             <a:endParaRPr lang="es-ES"/>
           </a:p>
@@ -2655,7 +2889,7 @@
           <a:p>
             <a:fld id="{68FB41E2-212A-458D-84D8-C7300EE7A49C}" type="datetimeFigureOut">
               <a:rPr lang="es-ES" smtClean="0"/>
-              <a:t>15/06/2023</a:t>
+              <a:t>21/06/2023</a:t>
             </a:fld>
             <a:endParaRPr lang="es-ES"/>
           </a:p>
@@ -2835,7 +3069,7 @@
           <a:p>
             <a:fld id="{68FB41E2-212A-458D-84D8-C7300EE7A49C}" type="datetimeFigureOut">
               <a:rPr lang="es-ES" smtClean="0"/>
-              <a:t>15/06/2023</a:t>
+              <a:t>21/06/2023</a:t>
             </a:fld>
             <a:endParaRPr lang="es-ES"/>
           </a:p>
@@ -3011,7 +3245,7 @@
           <a:p>
             <a:fld id="{68FB41E2-212A-458D-84D8-C7300EE7A49C}" type="datetimeFigureOut">
               <a:rPr lang="es-ES" smtClean="0"/>
-              <a:t>15/06/2023</a:t>
+              <a:t>21/06/2023</a:t>
             </a:fld>
             <a:endParaRPr lang="es-ES"/>
           </a:p>
@@ -3258,7 +3492,7 @@
           <a:p>
             <a:fld id="{68FB41E2-212A-458D-84D8-C7300EE7A49C}" type="datetimeFigureOut">
               <a:rPr lang="es-ES" smtClean="0"/>
-              <a:t>15/06/2023</a:t>
+              <a:t>21/06/2023</a:t>
             </a:fld>
             <a:endParaRPr lang="es-ES"/>
           </a:p>
@@ -3490,7 +3724,7 @@
           <a:p>
             <a:fld id="{68FB41E2-212A-458D-84D8-C7300EE7A49C}" type="datetimeFigureOut">
               <a:rPr lang="es-ES" smtClean="0"/>
-              <a:t>15/06/2023</a:t>
+              <a:t>21/06/2023</a:t>
             </a:fld>
             <a:endParaRPr lang="es-ES"/>
           </a:p>
@@ -3864,7 +4098,7 @@
           <a:p>
             <a:fld id="{68FB41E2-212A-458D-84D8-C7300EE7A49C}" type="datetimeFigureOut">
               <a:rPr lang="es-ES" smtClean="0"/>
-              <a:t>15/06/2023</a:t>
+              <a:t>21/06/2023</a:t>
             </a:fld>
             <a:endParaRPr lang="es-ES"/>
           </a:p>
@@ -3987,7 +4221,7 @@
           <a:p>
             <a:fld id="{68FB41E2-212A-458D-84D8-C7300EE7A49C}" type="datetimeFigureOut">
               <a:rPr lang="es-ES" smtClean="0"/>
-              <a:t>15/06/2023</a:t>
+              <a:t>21/06/2023</a:t>
             </a:fld>
             <a:endParaRPr lang="es-ES"/>
           </a:p>
@@ -4082,7 +4316,7 @@
           <a:p>
             <a:fld id="{68FB41E2-212A-458D-84D8-C7300EE7A49C}" type="datetimeFigureOut">
               <a:rPr lang="es-ES" smtClean="0"/>
-              <a:t>15/06/2023</a:t>
+              <a:t>21/06/2023</a:t>
             </a:fld>
             <a:endParaRPr lang="es-ES"/>
           </a:p>
@@ -4337,7 +4571,7 @@
           <a:p>
             <a:fld id="{68FB41E2-212A-458D-84D8-C7300EE7A49C}" type="datetimeFigureOut">
               <a:rPr lang="es-ES" smtClean="0"/>
-              <a:t>15/06/2023</a:t>
+              <a:t>21/06/2023</a:t>
             </a:fld>
             <a:endParaRPr lang="es-ES"/>
           </a:p>
@@ -4600,7 +4834,7 @@
           <a:p>
             <a:fld id="{68FB41E2-212A-458D-84D8-C7300EE7A49C}" type="datetimeFigureOut">
               <a:rPr lang="es-ES" smtClean="0"/>
-              <a:t>15/06/2023</a:t>
+              <a:t>21/06/2023</a:t>
             </a:fld>
             <a:endParaRPr lang="es-ES"/>
           </a:p>
@@ -5343,7 +5577,7 @@
           <a:p>
             <a:fld id="{68FB41E2-212A-458D-84D8-C7300EE7A49C}" type="datetimeFigureOut">
               <a:rPr lang="es-ES" smtClean="0"/>
-              <a:t>15/06/2023</a:t>
+              <a:t>21/06/2023</a:t>
             </a:fld>
             <a:endParaRPr lang="es-ES"/>
           </a:p>
@@ -6156,13 +6390,60 @@
         </p:nvSpPr>
         <p:spPr/>
         <p:txBody>
-          <a:bodyPr/>
+          <a:bodyPr>
+            <a:normAutofit/>
+          </a:bodyPr>
           <a:lstStyle/>
           <a:p>
             <a:r>
               <a:rPr lang="es-ES" dirty="0"/>
-              <a:t>En diapositiva voy a poner el índice de los puntos que vamos a ver en esta aplicación.</a:t>
-            </a:r>
+              <a:t>Motivación</a:t>
+            </a:r>
+          </a:p>
+          <a:p>
+            <a:r>
+              <a:rPr lang="es-ES" dirty="0"/>
+              <a:t>Objetivos</a:t>
+            </a:r>
+          </a:p>
+          <a:p>
+            <a:r>
+              <a:rPr lang="es-ES" dirty="0"/>
+              <a:t>Plan de trabajo</a:t>
+            </a:r>
+          </a:p>
+          <a:p>
+            <a:r>
+              <a:rPr lang="es-ES" dirty="0"/>
+              <a:t>Tecnologías utilizadas</a:t>
+            </a:r>
+          </a:p>
+          <a:p>
+            <a:r>
+              <a:rPr lang="es-ES" dirty="0"/>
+              <a:t>Prototipo</a:t>
+            </a:r>
+          </a:p>
+          <a:p>
+            <a:r>
+              <a:rPr lang="es-ES" dirty="0"/>
+              <a:t>Base de Datos</a:t>
+            </a:r>
+          </a:p>
+          <a:p>
+            <a:r>
+              <a:rPr lang="es-ES" dirty="0"/>
+              <a:t>Demo</a:t>
+            </a:r>
+          </a:p>
+          <a:p>
+            <a:r>
+              <a:rPr lang="es-ES" dirty="0"/>
+              <a:t>Preguntas</a:t>
+            </a:r>
+          </a:p>
+          <a:p>
+            <a:endParaRPr lang="es-ES" dirty="0"/>
           </a:p>
         </p:txBody>
       </p:sp>
@@ -6683,7 +6964,7 @@
                 <a:latin typeface="Calibri" panose="020F0502020204030204" pitchFamily="34" charset="0"/>
                 <a:ea typeface="Calibri" panose="020F0502020204030204" pitchFamily="34" charset="0"/>
               </a:rPr>
-              <a:t>Análisis</a:t>
+              <a:t>Análisis (3h)</a:t>
             </a:r>
           </a:p>
           <a:p>
@@ -6700,7 +6981,7 @@
                 <a:latin typeface="Calibri" panose="020F0502020204030204" pitchFamily="34" charset="0"/>
                 <a:ea typeface="Calibri" panose="020F0502020204030204" pitchFamily="34" charset="0"/>
               </a:rPr>
-              <a:t>Diseño</a:t>
+              <a:t>Diseño (20h)</a:t>
             </a:r>
           </a:p>
           <a:p>
@@ -6717,7 +6998,94 @@
                 <a:latin typeface="Calibri" panose="020F0502020204030204" pitchFamily="34" charset="0"/>
                 <a:ea typeface="Calibri" panose="020F0502020204030204" pitchFamily="34" charset="0"/>
               </a:rPr>
-              <a:t>Desarrollo</a:t>
+              <a:t>Desarrollo (92h total)	</a:t>
+            </a:r>
+          </a:p>
+          <a:p>
+            <a:pPr lvl="2" indent="-342900" algn="just">
+              <a:buFont typeface="Symbol" panose="05050102010706020507" pitchFamily="18" charset="2"/>
+              <a:buChar char=""/>
+            </a:pPr>
+            <a:r>
+              <a:rPr lang="es-ES" b="1" dirty="0">
+                <a:solidFill>
+                  <a:srgbClr val="000000"/>
+                </a:solidFill>
+                <a:latin typeface="Calibri" panose="020F0502020204030204" pitchFamily="34" charset="0"/>
+                <a:ea typeface="Calibri" panose="020F0502020204030204" pitchFamily="34" charset="0"/>
+              </a:rPr>
+              <a:t>Base de Datos (4h)</a:t>
+            </a:r>
+          </a:p>
+          <a:p>
+            <a:pPr lvl="2" indent="-342900" algn="just">
+              <a:buFont typeface="Symbol" panose="05050102010706020507" pitchFamily="18" charset="2"/>
+              <a:buChar char=""/>
+            </a:pPr>
+            <a:r>
+              <a:rPr lang="es-ES" b="1" dirty="0" err="1">
+                <a:solidFill>
+                  <a:srgbClr val="000000"/>
+                </a:solidFill>
+                <a:effectLst/>
+                <a:latin typeface="Calibri" panose="020F0502020204030204" pitchFamily="34" charset="0"/>
+                <a:ea typeface="Calibri" panose="020F0502020204030204" pitchFamily="34" charset="0"/>
+              </a:rPr>
+              <a:t>BackEnd</a:t>
+            </a:r>
+            <a:r>
+              <a:rPr lang="es-ES" b="1" dirty="0">
+                <a:solidFill>
+                  <a:srgbClr val="000000"/>
+                </a:solidFill>
+                <a:effectLst/>
+                <a:latin typeface="Calibri" panose="020F0502020204030204" pitchFamily="34" charset="0"/>
+                <a:ea typeface="Calibri" panose="020F0502020204030204" pitchFamily="34" charset="0"/>
+              </a:rPr>
+              <a:t> (8h)</a:t>
+            </a:r>
+          </a:p>
+          <a:p>
+            <a:pPr lvl="2" indent="-342900" algn="just">
+              <a:buFont typeface="Symbol" panose="05050102010706020507" pitchFamily="18" charset="2"/>
+              <a:buChar char=""/>
+            </a:pPr>
+            <a:r>
+              <a:rPr lang="es-ES" b="1" dirty="0" err="1">
+                <a:solidFill>
+                  <a:srgbClr val="000000"/>
+                </a:solidFill>
+                <a:latin typeface="Calibri" panose="020F0502020204030204" pitchFamily="34" charset="0"/>
+                <a:ea typeface="Calibri" panose="020F0502020204030204" pitchFamily="34" charset="0"/>
+              </a:rPr>
+              <a:t>FrontEnd</a:t>
+            </a:r>
+            <a:r>
+              <a:rPr lang="es-ES" b="1" dirty="0">
+                <a:solidFill>
+                  <a:srgbClr val="000000"/>
+                </a:solidFill>
+                <a:latin typeface="Calibri" panose="020F0502020204030204" pitchFamily="34" charset="0"/>
+                <a:ea typeface="Calibri" panose="020F0502020204030204" pitchFamily="34" charset="0"/>
+              </a:rPr>
+              <a:t> (60h)</a:t>
+            </a:r>
+          </a:p>
+          <a:p>
+            <a:pPr lvl="2" indent="-342900" algn="just">
+              <a:buFont typeface="Symbol" panose="05050102010706020507" pitchFamily="18" charset="2"/>
+              <a:buChar char=""/>
+            </a:pPr>
+            <a:r>
+              <a:rPr lang="es-ES" b="1" dirty="0">
+                <a:solidFill>
+                  <a:srgbClr val="000000"/>
+                </a:solidFill>
+                <a:effectLst/>
+                <a:latin typeface="Calibri" panose="020F0502020204030204" pitchFamily="34" charset="0"/>
+                <a:ea typeface="Calibri" panose="020F0502020204030204" pitchFamily="34" charset="0"/>
+              </a:rPr>
+              <a:t>Corrección de Bugs (20h)</a:t>
             </a:r>
           </a:p>
           <a:p>
@@ -6734,7 +7102,7 @@
                 <a:latin typeface="Calibri" panose="020F0502020204030204" pitchFamily="34" charset="0"/>
                 <a:ea typeface="Calibri" panose="020F0502020204030204" pitchFamily="34" charset="0"/>
               </a:rPr>
-              <a:t>Compilación</a:t>
+              <a:t>Compilación (4h)</a:t>
             </a:r>
             <a:endParaRPr lang="es-ES" b="1" dirty="0">
               <a:solidFill>
@@ -6758,7 +7126,7 @@
                 <a:latin typeface="Calibri" panose="020F0502020204030204" pitchFamily="34" charset="0"/>
                 <a:ea typeface="Calibri" panose="020F0502020204030204" pitchFamily="34" charset="0"/>
               </a:rPr>
-              <a:t>Despliegue</a:t>
+              <a:t>Despliegue (?¿)</a:t>
             </a:r>
             <a:endParaRPr lang="es-ES" dirty="0"/>
           </a:p>
@@ -6810,7 +7178,7 @@
         </p:nvSpPr>
         <p:spPr>
           <a:xfrm>
-            <a:off x="5270084" y="2167264"/>
+            <a:off x="6118225" y="2167264"/>
             <a:ext cx="2959452" cy="4521350"/>
           </a:xfrm>
           <a:prstGeom prst="rect">
@@ -7510,7 +7878,7 @@
         </p:blipFill>
         <p:spPr bwMode="auto">
           <a:xfrm>
-            <a:off x="5213198" y="4297745"/>
+            <a:off x="6061339" y="4297745"/>
             <a:ext cx="1865764" cy="836436"/>
           </a:xfrm>
           <a:prstGeom prst="rect">
@@ -7557,7 +7925,7 @@
         </p:blipFill>
         <p:spPr bwMode="auto">
           <a:xfrm>
-            <a:off x="5518905" y="3043394"/>
+            <a:off x="6367046" y="3043394"/>
             <a:ext cx="1254351" cy="1254351"/>
           </a:xfrm>
           <a:prstGeom prst="rect">
@@ -7604,7 +7972,7 @@
         </p:blipFill>
         <p:spPr bwMode="auto">
           <a:xfrm>
-            <a:off x="5359142" y="5252613"/>
+            <a:off x="6207283" y="5252613"/>
             <a:ext cx="1573877" cy="1298448"/>
           </a:xfrm>
           <a:prstGeom prst="rect">
@@ -7651,7 +8019,7 @@
         </p:blipFill>
         <p:spPr bwMode="auto">
           <a:xfrm>
-            <a:off x="7132482" y="3189954"/>
+            <a:off x="7980623" y="3189954"/>
             <a:ext cx="866460" cy="1000367"/>
           </a:xfrm>
           <a:prstGeom prst="rect">
@@ -7698,7 +8066,7 @@
         </p:blipFill>
         <p:spPr bwMode="auto">
           <a:xfrm>
-            <a:off x="7055507" y="4231700"/>
+            <a:off x="7903648" y="4231700"/>
             <a:ext cx="1020411" cy="765840"/>
           </a:xfrm>
           <a:prstGeom prst="rect">
@@ -7745,7 +8113,7 @@
         </p:blipFill>
         <p:spPr bwMode="auto">
           <a:xfrm>
-            <a:off x="7219129" y="5450319"/>
+            <a:off x="8067270" y="5450319"/>
             <a:ext cx="693166" cy="1036489"/>
           </a:xfrm>
           <a:prstGeom prst="rect">
@@ -7780,7 +8148,7 @@
         <p:spPr>
           <a:xfrm>
             <a:off x="2705005" y="2171619"/>
-            <a:ext cx="2347380" cy="4521350"/>
+            <a:ext cx="3152456" cy="4521350"/>
           </a:xfrm>
           <a:prstGeom prst="rect">
             <a:avLst/>
@@ -8062,8 +8430,8 @@
         </p:nvSpPr>
         <p:spPr>
           <a:xfrm>
-            <a:off x="8437013" y="2167264"/>
-            <a:ext cx="3134066" cy="4521350"/>
+            <a:off x="9294104" y="2167263"/>
+            <a:ext cx="2276975" cy="2493999"/>
           </a:xfrm>
           <a:prstGeom prst="rect">
             <a:avLst/>
@@ -8401,8 +8769,8 @@
         </p:blipFill>
         <p:spPr bwMode="auto">
           <a:xfrm>
-            <a:off x="9015029" y="3571198"/>
-            <a:ext cx="1978034" cy="1660211"/>
+            <a:off x="9486995" y="2773488"/>
+            <a:ext cx="1873179" cy="1572204"/>
           </a:xfrm>
           <a:prstGeom prst="rect">
             <a:avLst/>
@@ -8589,8 +8957,373 @@
         </p:blipFill>
         <p:spPr bwMode="auto">
           <a:xfrm>
-            <a:off x="3463822" y="4202205"/>
-            <a:ext cx="1828445" cy="1311351"/>
+            <a:off x="4439700" y="4842341"/>
+            <a:ext cx="1277493" cy="916211"/>
+          </a:xfrm>
+          <a:prstGeom prst="rect">
+            <a:avLst/>
+          </a:prstGeom>
+          <a:noFill/>
+          <a:extLst>
+            <a:ext uri="{909E8E84-426E-40DD-AFC4-6F175D3DCCD1}">
+              <a14:hiddenFill xmlns:a14="http://schemas.microsoft.com/office/drawing/2010/main">
+                <a:solidFill>
+                  <a:srgbClr val="FFFFFF"/>
+                </a:solidFill>
+              </a14:hiddenFill>
+            </a:ext>
+          </a:extLst>
+        </p:spPr>
+      </p:pic>
+      <p:pic>
+        <p:nvPicPr>
+          <p:cNvPr id="10" name="Imagen 9">
+            <a:extLst>
+              <a:ext uri="{FF2B5EF4-FFF2-40B4-BE49-F238E27FC236}">
+                <a16:creationId xmlns:a16="http://schemas.microsoft.com/office/drawing/2014/main" id="{08DD74E5-2374-6509-D6F1-D54AC30A8F8E}"/>
+              </a:ext>
+            </a:extLst>
+          </p:cNvPr>
+          <p:cNvPicPr>
+            <a:picLocks noChangeAspect="1"/>
+          </p:cNvPicPr>
+          <p:nvPr/>
+        </p:nvPicPr>
+        <p:blipFill>
+          <a:blip r:embed="rId15">
+            <a:extLst>
+              <a:ext uri="{28A0092B-C50C-407E-A947-70E740481C1C}">
+                <a14:useLocalDpi xmlns:a14="http://schemas.microsoft.com/office/drawing/2010/main" val="0"/>
+              </a:ext>
+            </a:extLst>
+          </a:blip>
+          <a:stretch>
+            <a:fillRect/>
+          </a:stretch>
+        </p:blipFill>
+        <p:spPr>
+          <a:xfrm>
+            <a:off x="4476070" y="3338878"/>
+            <a:ext cx="1043738" cy="1138092"/>
+          </a:xfrm>
+          <a:prstGeom prst="rect">
+            <a:avLst/>
+          </a:prstGeom>
+        </p:spPr>
+      </p:pic>
+      <p:sp>
+        <p:nvSpPr>
+          <p:cNvPr id="12" name="Marcador de contenido 2">
+            <a:extLst>
+              <a:ext uri="{FF2B5EF4-FFF2-40B4-BE49-F238E27FC236}">
+                <a16:creationId xmlns:a16="http://schemas.microsoft.com/office/drawing/2014/main" id="{D54E105F-0198-14C0-138F-C54F3D3B6B66}"/>
+              </a:ext>
+            </a:extLst>
+          </p:cNvPr>
+          <p:cNvSpPr txBox="1">
+            <a:spLocks/>
+          </p:cNvSpPr>
+          <p:nvPr/>
+        </p:nvSpPr>
+        <p:spPr>
+          <a:xfrm>
+            <a:off x="9300517" y="4831876"/>
+            <a:ext cx="2276976" cy="1856738"/>
+          </a:xfrm>
+          <a:prstGeom prst="rect">
+            <a:avLst/>
+          </a:prstGeom>
+        </p:spPr>
+        <p:style>
+          <a:lnRef idx="2">
+            <a:schemeClr val="accent1"/>
+          </a:lnRef>
+          <a:fillRef idx="1">
+            <a:schemeClr val="lt1"/>
+          </a:fillRef>
+          <a:effectRef idx="0">
+            <a:schemeClr val="accent1"/>
+          </a:effectRef>
+          <a:fontRef idx="minor">
+            <a:schemeClr val="dk1"/>
+          </a:fontRef>
+        </p:style>
+        <p:txBody>
+          <a:bodyPr vert="horz" lIns="91440" tIns="45720" rIns="91440" bIns="45720" rtlCol="0">
+            <a:normAutofit/>
+          </a:bodyPr>
+          <a:lstStyle>
+            <a:lvl1pPr marL="342900" indent="-342900" algn="l" defTabSz="457200" rtl="0" eaLnBrk="1" latinLnBrk="0" hangingPunct="1">
+              <a:spcBef>
+                <a:spcPts val="1000"/>
+              </a:spcBef>
+              <a:spcAft>
+                <a:spcPts val="0"/>
+              </a:spcAft>
+              <a:buClr>
+                <a:schemeClr val="accent1"/>
+              </a:buClr>
+              <a:buSzPct val="80000"/>
+              <a:buFont typeface="Wingdings 3" charset="2"/>
+              <a:buChar char=""/>
+              <a:defRPr sz="1800" kern="1200">
+                <a:solidFill>
+                  <a:schemeClr val="tx1">
+                    <a:lumMod val="75000"/>
+                    <a:lumOff val="25000"/>
+                  </a:schemeClr>
+                </a:solidFill>
+                <a:latin typeface="+mn-lt"/>
+                <a:ea typeface="+mn-ea"/>
+                <a:cs typeface="+mn-cs"/>
+              </a:defRPr>
+            </a:lvl1pPr>
+            <a:lvl2pPr marL="742950" indent="-285750" algn="l" defTabSz="457200" rtl="0" eaLnBrk="1" latinLnBrk="0" hangingPunct="1">
+              <a:spcBef>
+                <a:spcPts val="1000"/>
+              </a:spcBef>
+              <a:spcAft>
+                <a:spcPts val="0"/>
+              </a:spcAft>
+              <a:buClr>
+                <a:schemeClr val="accent1"/>
+              </a:buClr>
+              <a:buSzPct val="80000"/>
+              <a:buFont typeface="Wingdings 3" charset="2"/>
+              <a:buChar char=""/>
+              <a:defRPr sz="1600" kern="1200">
+                <a:solidFill>
+                  <a:schemeClr val="tx1">
+                    <a:lumMod val="75000"/>
+                    <a:lumOff val="25000"/>
+                  </a:schemeClr>
+                </a:solidFill>
+                <a:latin typeface="+mn-lt"/>
+                <a:ea typeface="+mn-ea"/>
+                <a:cs typeface="+mn-cs"/>
+              </a:defRPr>
+            </a:lvl2pPr>
+            <a:lvl3pPr marL="1143000" indent="-228600" algn="l" defTabSz="457200" rtl="0" eaLnBrk="1" latinLnBrk="0" hangingPunct="1">
+              <a:spcBef>
+                <a:spcPts val="1000"/>
+              </a:spcBef>
+              <a:spcAft>
+                <a:spcPts val="0"/>
+              </a:spcAft>
+              <a:buClr>
+                <a:schemeClr val="accent1"/>
+              </a:buClr>
+              <a:buSzPct val="80000"/>
+              <a:buFont typeface="Wingdings 3" charset="2"/>
+              <a:buChar char=""/>
+              <a:defRPr sz="1400" kern="1200">
+                <a:solidFill>
+                  <a:schemeClr val="tx1">
+                    <a:lumMod val="75000"/>
+                    <a:lumOff val="25000"/>
+                  </a:schemeClr>
+                </a:solidFill>
+                <a:latin typeface="+mn-lt"/>
+                <a:ea typeface="+mn-ea"/>
+                <a:cs typeface="+mn-cs"/>
+              </a:defRPr>
+            </a:lvl3pPr>
+            <a:lvl4pPr marL="1600200" indent="-228600" algn="l" defTabSz="457200" rtl="0" eaLnBrk="1" latinLnBrk="0" hangingPunct="1">
+              <a:spcBef>
+                <a:spcPts val="1000"/>
+              </a:spcBef>
+              <a:spcAft>
+                <a:spcPts val="0"/>
+              </a:spcAft>
+              <a:buClr>
+                <a:schemeClr val="accent1"/>
+              </a:buClr>
+              <a:buSzPct val="80000"/>
+              <a:buFont typeface="Wingdings 3" charset="2"/>
+              <a:buChar char=""/>
+              <a:defRPr sz="1200" kern="1200">
+                <a:solidFill>
+                  <a:schemeClr val="tx1">
+                    <a:lumMod val="75000"/>
+                    <a:lumOff val="25000"/>
+                  </a:schemeClr>
+                </a:solidFill>
+                <a:latin typeface="+mn-lt"/>
+                <a:ea typeface="+mn-ea"/>
+                <a:cs typeface="+mn-cs"/>
+              </a:defRPr>
+            </a:lvl4pPr>
+            <a:lvl5pPr marL="2057400" indent="-228600" algn="l" defTabSz="457200" rtl="0" eaLnBrk="1" latinLnBrk="0" hangingPunct="1">
+              <a:spcBef>
+                <a:spcPts val="1000"/>
+              </a:spcBef>
+              <a:spcAft>
+                <a:spcPts val="0"/>
+              </a:spcAft>
+              <a:buClr>
+                <a:schemeClr val="accent1"/>
+              </a:buClr>
+              <a:buSzPct val="80000"/>
+              <a:buFont typeface="Wingdings 3" charset="2"/>
+              <a:buChar char=""/>
+              <a:defRPr sz="1200" kern="1200">
+                <a:solidFill>
+                  <a:schemeClr val="tx1">
+                    <a:lumMod val="75000"/>
+                    <a:lumOff val="25000"/>
+                  </a:schemeClr>
+                </a:solidFill>
+                <a:latin typeface="+mn-lt"/>
+                <a:ea typeface="+mn-ea"/>
+                <a:cs typeface="+mn-cs"/>
+              </a:defRPr>
+            </a:lvl5pPr>
+            <a:lvl6pPr marL="2514600" indent="-228600" algn="l" defTabSz="457200" rtl="0" eaLnBrk="1" latinLnBrk="0" hangingPunct="1">
+              <a:spcBef>
+                <a:spcPts val="1000"/>
+              </a:spcBef>
+              <a:spcAft>
+                <a:spcPts val="0"/>
+              </a:spcAft>
+              <a:buClr>
+                <a:schemeClr val="accent1"/>
+              </a:buClr>
+              <a:buSzPct val="80000"/>
+              <a:buFont typeface="Wingdings 3" charset="2"/>
+              <a:buChar char=""/>
+              <a:defRPr sz="1200" kern="1200">
+                <a:solidFill>
+                  <a:schemeClr val="tx1">
+                    <a:lumMod val="75000"/>
+                    <a:lumOff val="25000"/>
+                  </a:schemeClr>
+                </a:solidFill>
+                <a:latin typeface="+mn-lt"/>
+                <a:ea typeface="+mn-ea"/>
+                <a:cs typeface="+mn-cs"/>
+              </a:defRPr>
+            </a:lvl6pPr>
+            <a:lvl7pPr marL="2971800" indent="-228600" algn="l" defTabSz="457200" rtl="0" eaLnBrk="1" latinLnBrk="0" hangingPunct="1">
+              <a:spcBef>
+                <a:spcPts val="1000"/>
+              </a:spcBef>
+              <a:spcAft>
+                <a:spcPts val="0"/>
+              </a:spcAft>
+              <a:buClr>
+                <a:schemeClr val="accent1"/>
+              </a:buClr>
+              <a:buSzPct val="80000"/>
+              <a:buFont typeface="Wingdings 3" charset="2"/>
+              <a:buChar char=""/>
+              <a:defRPr sz="1200" kern="1200">
+                <a:solidFill>
+                  <a:schemeClr val="tx1">
+                    <a:lumMod val="75000"/>
+                    <a:lumOff val="25000"/>
+                  </a:schemeClr>
+                </a:solidFill>
+                <a:latin typeface="+mn-lt"/>
+                <a:ea typeface="+mn-ea"/>
+                <a:cs typeface="+mn-cs"/>
+              </a:defRPr>
+            </a:lvl7pPr>
+            <a:lvl8pPr marL="3429000" indent="-228600" algn="l" defTabSz="457200" rtl="0" eaLnBrk="1" latinLnBrk="0" hangingPunct="1">
+              <a:spcBef>
+                <a:spcPts val="1000"/>
+              </a:spcBef>
+              <a:spcAft>
+                <a:spcPts val="0"/>
+              </a:spcAft>
+              <a:buClr>
+                <a:schemeClr val="accent1"/>
+              </a:buClr>
+              <a:buSzPct val="80000"/>
+              <a:buFont typeface="Wingdings 3" charset="2"/>
+              <a:buChar char=""/>
+              <a:defRPr sz="1200" kern="1200">
+                <a:solidFill>
+                  <a:schemeClr val="tx1">
+                    <a:lumMod val="75000"/>
+                    <a:lumOff val="25000"/>
+                  </a:schemeClr>
+                </a:solidFill>
+                <a:latin typeface="+mn-lt"/>
+                <a:ea typeface="+mn-ea"/>
+                <a:cs typeface="+mn-cs"/>
+              </a:defRPr>
+            </a:lvl8pPr>
+            <a:lvl9pPr marL="3886200" indent="-228600" algn="l" defTabSz="457200" rtl="0" eaLnBrk="1" latinLnBrk="0" hangingPunct="1">
+              <a:spcBef>
+                <a:spcPts val="1000"/>
+              </a:spcBef>
+              <a:spcAft>
+                <a:spcPts val="0"/>
+              </a:spcAft>
+              <a:buClr>
+                <a:schemeClr val="accent1"/>
+              </a:buClr>
+              <a:buSzPct val="80000"/>
+              <a:buFont typeface="Wingdings 3" charset="2"/>
+              <a:buChar char=""/>
+              <a:defRPr sz="1200" kern="1200">
+                <a:solidFill>
+                  <a:schemeClr val="tx1">
+                    <a:lumMod val="75000"/>
+                    <a:lumOff val="25000"/>
+                  </a:schemeClr>
+                </a:solidFill>
+                <a:latin typeface="+mn-lt"/>
+                <a:ea typeface="+mn-ea"/>
+                <a:cs typeface="+mn-cs"/>
+              </a:defRPr>
+            </a:lvl9pPr>
+          </a:lstStyle>
+          <a:p>
+            <a:r>
+              <a:rPr lang="es-ES" dirty="0"/>
+              <a:t>Repositorio</a:t>
+            </a:r>
+          </a:p>
+          <a:p>
+            <a:endParaRPr lang="es-ES" dirty="0"/>
+          </a:p>
+          <a:p>
+            <a:endParaRPr lang="es-ES" dirty="0"/>
+          </a:p>
+        </p:txBody>
+      </p:sp>
+      <p:pic>
+        <p:nvPicPr>
+          <p:cNvPr id="11" name="Picture 2">
+            <a:extLst>
+              <a:ext uri="{FF2B5EF4-FFF2-40B4-BE49-F238E27FC236}">
+                <a16:creationId xmlns:a16="http://schemas.microsoft.com/office/drawing/2014/main" id="{B47C186E-A253-61D2-4404-BED27DC32AD7}"/>
+              </a:ext>
+            </a:extLst>
+          </p:cNvPr>
+          <p:cNvPicPr>
+            <a:picLocks noChangeAspect="1" noChangeArrowheads="1"/>
+          </p:cNvPicPr>
+          <p:nvPr/>
+        </p:nvPicPr>
+        <p:blipFill>
+          <a:blip r:embed="rId16">
+            <a:extLst>
+              <a:ext uri="{28A0092B-C50C-407E-A947-70E740481C1C}">
+                <a14:useLocalDpi xmlns:a14="http://schemas.microsoft.com/office/drawing/2010/main" val="0"/>
+              </a:ext>
+            </a:extLst>
+          </a:blip>
+          <a:srcRect/>
+          <a:stretch>
+            <a:fillRect/>
+          </a:stretch>
+        </p:blipFill>
+        <p:spPr bwMode="auto">
+          <a:xfrm>
+            <a:off x="9747583" y="5166000"/>
+            <a:ext cx="1352001" cy="1352001"/>
           </a:xfrm>
           <a:prstGeom prst="rect">
             <a:avLst/>
@@ -8642,99 +9375,6 @@
           <p:cNvPr id="2" name="Título 1">
             <a:extLst>
               <a:ext uri="{FF2B5EF4-FFF2-40B4-BE49-F238E27FC236}">
-                <a16:creationId xmlns:a16="http://schemas.microsoft.com/office/drawing/2014/main" id="{61BD8FAF-7728-8988-EA4D-52DA1BCD1C9A}"/>
-              </a:ext>
-            </a:extLst>
-          </p:cNvPr>
-          <p:cNvSpPr>
-            <a:spLocks noGrp="1"/>
-          </p:cNvSpPr>
-          <p:nvPr>
-            <p:ph type="title"/>
-          </p:nvPr>
-        </p:nvSpPr>
-        <p:spPr/>
-        <p:txBody>
-          <a:bodyPr/>
-          <a:lstStyle/>
-          <a:p>
-            <a:r>
-              <a:rPr lang="es-ES" dirty="0"/>
-              <a:t>Base de Datos</a:t>
-            </a:r>
-          </a:p>
-        </p:txBody>
-      </p:sp>
-      <p:pic>
-        <p:nvPicPr>
-          <p:cNvPr id="5" name="Marcador de contenido 4">
-            <a:extLst>
-              <a:ext uri="{FF2B5EF4-FFF2-40B4-BE49-F238E27FC236}">
-                <a16:creationId xmlns:a16="http://schemas.microsoft.com/office/drawing/2014/main" id="{487DDDF6-984B-0150-ED5B-4DBDE2075E61}"/>
-              </a:ext>
-            </a:extLst>
-          </p:cNvPr>
-          <p:cNvPicPr>
-            <a:picLocks noGrp="1" noChangeAspect="1"/>
-          </p:cNvPicPr>
-          <p:nvPr>
-            <p:ph idx="1"/>
-          </p:nvPr>
-        </p:nvPicPr>
-        <p:blipFill>
-          <a:blip r:embed="rId2">
-            <a:extLst>
-              <a:ext uri="{28A0092B-C50C-407E-A947-70E740481C1C}">
-                <a14:useLocalDpi xmlns:a14="http://schemas.microsoft.com/office/drawing/2010/main" val="0"/>
-              </a:ext>
-            </a:extLst>
-          </a:blip>
-          <a:stretch>
-            <a:fillRect/>
-          </a:stretch>
-        </p:blipFill>
-        <p:spPr>
-          <a:xfrm>
-            <a:off x="4956129" y="192349"/>
-            <a:ext cx="6718008" cy="6473301"/>
-          </a:xfrm>
-        </p:spPr>
-      </p:pic>
-    </p:spTree>
-    <p:extLst>
-      <p:ext uri="{BB962C8B-B14F-4D97-AF65-F5344CB8AC3E}">
-        <p14:creationId xmlns:p14="http://schemas.microsoft.com/office/powerpoint/2010/main" val="668459926"/>
-      </p:ext>
-    </p:extLst>
-  </p:cSld>
-  <p:clrMapOvr>
-    <a:masterClrMapping/>
-  </p:clrMapOvr>
-</p:sld>
-</file>
-
-<file path=ppt/slides/slide8.xml><?xml version="1.0" encoding="utf-8"?>
-<p:sld xmlns:a="http://schemas.openxmlformats.org/drawingml/2006/main" xmlns:r="http://schemas.openxmlformats.org/officeDocument/2006/relationships" xmlns:p="http://schemas.openxmlformats.org/presentationml/2006/main">
-  <p:cSld>
-    <p:spTree>
-      <p:nvGrpSpPr>
-        <p:cNvPr id="1" name=""/>
-        <p:cNvGrpSpPr/>
-        <p:nvPr/>
-      </p:nvGrpSpPr>
-      <p:grpSpPr>
-        <a:xfrm>
-          <a:off x="0" y="0"/>
-          <a:ext cx="0" cy="0"/>
-          <a:chOff x="0" y="0"/>
-          <a:chExt cx="0" cy="0"/>
-        </a:xfrm>
-      </p:grpSpPr>
-      <p:sp>
-        <p:nvSpPr>
-          <p:cNvPr id="2" name="Título 1">
-            <a:extLst>
-              <a:ext uri="{FF2B5EF4-FFF2-40B4-BE49-F238E27FC236}">
                 <a16:creationId xmlns:a16="http://schemas.microsoft.com/office/drawing/2014/main" id="{73AC805D-C225-0166-E125-42FB72F80BF8}"/>
               </a:ext>
             </a:extLst>
@@ -8814,10 +9454,9 @@
           <a:lstStyle/>
           <a:p>
             <a:r>
-              <a:rPr lang="es-ES" dirty="0" err="1"/>
-              <a:t>Movil</a:t>
-            </a:r>
-            <a:endParaRPr lang="es-ES" dirty="0"/>
+              <a:rPr lang="es-ES" dirty="0"/>
+              <a:t>Móvil</a:t>
+            </a:r>
           </a:p>
         </p:txBody>
       </p:sp>
@@ -9125,6 +9764,99 @@
 </p:sld>
 </file>
 
+<file path=ppt/slides/slide8.xml><?xml version="1.0" encoding="utf-8"?>
+<p:sld xmlns:a="http://schemas.openxmlformats.org/drawingml/2006/main" xmlns:r="http://schemas.openxmlformats.org/officeDocument/2006/relationships" xmlns:p="http://schemas.openxmlformats.org/presentationml/2006/main">
+  <p:cSld>
+    <p:spTree>
+      <p:nvGrpSpPr>
+        <p:cNvPr id="1" name=""/>
+        <p:cNvGrpSpPr/>
+        <p:nvPr/>
+      </p:nvGrpSpPr>
+      <p:grpSpPr>
+        <a:xfrm>
+          <a:off x="0" y="0"/>
+          <a:ext cx="0" cy="0"/>
+          <a:chOff x="0" y="0"/>
+          <a:chExt cx="0" cy="0"/>
+        </a:xfrm>
+      </p:grpSpPr>
+      <p:pic>
+        <p:nvPicPr>
+          <p:cNvPr id="9" name="Imagen 8">
+            <a:extLst>
+              <a:ext uri="{FF2B5EF4-FFF2-40B4-BE49-F238E27FC236}">
+                <a16:creationId xmlns:a16="http://schemas.microsoft.com/office/drawing/2014/main" id="{22F4055C-FB0E-DA51-D967-58ED5E9D5AAD}"/>
+              </a:ext>
+            </a:extLst>
+          </p:cNvPr>
+          <p:cNvPicPr>
+            <a:picLocks noChangeAspect="1"/>
+          </p:cNvPicPr>
+          <p:nvPr/>
+        </p:nvPicPr>
+        <p:blipFill rotWithShape="1">
+          <a:blip r:embed="rId2">
+            <a:extLst>
+              <a:ext uri="{28A0092B-C50C-407E-A947-70E740481C1C}">
+                <a14:useLocalDpi xmlns:a14="http://schemas.microsoft.com/office/drawing/2010/main" val="0"/>
+              </a:ext>
+            </a:extLst>
+          </a:blip>
+          <a:srcRect l="-1" t="16172" r="22078"/>
+          <a:stretch/>
+        </p:blipFill>
+        <p:spPr>
+          <a:xfrm>
+            <a:off x="-1" y="584921"/>
+            <a:ext cx="12192001" cy="6009000"/>
+          </a:xfrm>
+          <a:prstGeom prst="rect">
+            <a:avLst/>
+          </a:prstGeom>
+        </p:spPr>
+      </p:pic>
+      <p:sp>
+        <p:nvSpPr>
+          <p:cNvPr id="2" name="Título 1">
+            <a:extLst>
+              <a:ext uri="{FF2B5EF4-FFF2-40B4-BE49-F238E27FC236}">
+                <a16:creationId xmlns:a16="http://schemas.microsoft.com/office/drawing/2014/main" id="{61BD8FAF-7728-8988-EA4D-52DA1BCD1C9A}"/>
+              </a:ext>
+            </a:extLst>
+          </p:cNvPr>
+          <p:cNvSpPr>
+            <a:spLocks noGrp="1"/>
+          </p:cNvSpPr>
+          <p:nvPr>
+            <p:ph type="title"/>
+          </p:nvPr>
+        </p:nvSpPr>
+        <p:spPr/>
+        <p:txBody>
+          <a:bodyPr/>
+          <a:lstStyle/>
+          <a:p>
+            <a:r>
+              <a:rPr lang="es-ES" dirty="0"/>
+              <a:t>Base de Datos</a:t>
+            </a:r>
+          </a:p>
+        </p:txBody>
+      </p:sp>
+    </p:spTree>
+    <p:extLst>
+      <p:ext uri="{BB962C8B-B14F-4D97-AF65-F5344CB8AC3E}">
+        <p14:creationId xmlns:p14="http://schemas.microsoft.com/office/powerpoint/2010/main" val="668459926"/>
+      </p:ext>
+    </p:extLst>
+  </p:cSld>
+  <p:clrMapOvr>
+    <a:masterClrMapping/>
+  </p:clrMapOvr>
+</p:sld>
+</file>
+
 <file path=ppt/slides/slide9.xml><?xml version="1.0" encoding="utf-8"?>
 <p:sld xmlns:a="http://schemas.openxmlformats.org/drawingml/2006/main" xmlns:r="http://schemas.openxmlformats.org/officeDocument/2006/relationships" xmlns:p="http://schemas.openxmlformats.org/presentationml/2006/main">
   <p:cSld>
@@ -9194,6 +9926,19 @@
             <a:r>
               <a:rPr lang="es-ES" dirty="0"/>
               <a:t>Ahora procederé a mostrar una demo de la aplicación y su funcionamiento</a:t>
+            </a:r>
+          </a:p>
+          <a:p>
+            <a:endParaRPr lang="es-ES" dirty="0"/>
+          </a:p>
+          <a:p>
+            <a:r>
+              <a:rPr lang="es-ES" dirty="0">
+                <a:solidFill>
+                  <a:srgbClr val="FF0000"/>
+                </a:solidFill>
+              </a:rPr>
+              <a:t>PONER AQUÍ EL LINK EN CASO DE DESPLEGARLO</a:t>
             </a:r>
           </a:p>
         </p:txBody>

</xml_diff>

<commit_message>
modifications after test with teacher
</commit_message>
<xml_diff>
--- a/Presentacion y memorias/Gestor de Dietas.pptx
+++ b/Presentacion y memorias/Gestor de Dietas.pptx
@@ -14,7 +14,8 @@
     <p:sldId id="265" r:id="rId8"/>
     <p:sldId id="261" r:id="rId9"/>
     <p:sldId id="262" r:id="rId10"/>
-    <p:sldId id="263" r:id="rId11"/>
+    <p:sldId id="266" r:id="rId11"/>
+    <p:sldId id="263" r:id="rId12"/>
   </p:sldIdLst>
   <p:sldSz cx="12192000" cy="6858000"/>
   <p:notesSz cx="6858000" cy="9144000"/>
@@ -6213,25 +6214,7 @@
                 </a:solidFill>
                 <a:latin typeface="DDG_ProximaNova"/>
               </a:rPr>
-              <a:t>Tutor: </a:t>
-            </a:r>
-            <a:r>
-              <a:rPr lang="es-ES" dirty="0" err="1">
-                <a:solidFill>
-                  <a:srgbClr val="666666"/>
-                </a:solidFill>
-                <a:latin typeface="DDG_ProximaNova"/>
-              </a:rPr>
-              <a:t>Jose</a:t>
-            </a:r>
-            <a:r>
-              <a:rPr lang="es-ES" dirty="0">
-                <a:solidFill>
-                  <a:srgbClr val="666666"/>
-                </a:solidFill>
-                <a:latin typeface="DDG_ProximaNova"/>
-              </a:rPr>
-              <a:t> Luis Román Bienes</a:t>
+              <a:t>Tutor: José Luis Román Bienes</a:t>
             </a:r>
             <a:endParaRPr lang="es-ES" b="0" i="0" dirty="0">
               <a:solidFill>
@@ -6278,6 +6261,105 @@
           <p:cNvPr id="2" name="Título 1">
             <a:extLst>
               <a:ext uri="{FF2B5EF4-FFF2-40B4-BE49-F238E27FC236}">
+                <a16:creationId xmlns:a16="http://schemas.microsoft.com/office/drawing/2014/main" id="{D986E5BC-5F83-73C7-C180-DA40CF7220B8}"/>
+              </a:ext>
+            </a:extLst>
+          </p:cNvPr>
+          <p:cNvSpPr>
+            <a:spLocks noGrp="1"/>
+          </p:cNvSpPr>
+          <p:nvPr>
+            <p:ph type="title"/>
+          </p:nvPr>
+        </p:nvSpPr>
+        <p:spPr/>
+        <p:txBody>
+          <a:bodyPr/>
+          <a:lstStyle/>
+          <a:p>
+            <a:r>
+              <a:rPr lang="es-ES" dirty="0"/>
+              <a:t>Conclusiones</a:t>
+            </a:r>
+          </a:p>
+        </p:txBody>
+      </p:sp>
+      <p:sp>
+        <p:nvSpPr>
+          <p:cNvPr id="3" name="Marcador de contenido 2">
+            <a:extLst>
+              <a:ext uri="{FF2B5EF4-FFF2-40B4-BE49-F238E27FC236}">
+                <a16:creationId xmlns:a16="http://schemas.microsoft.com/office/drawing/2014/main" id="{B925B571-44AD-9500-5DE4-637EE8EC8A0C}"/>
+              </a:ext>
+            </a:extLst>
+          </p:cNvPr>
+          <p:cNvSpPr>
+            <a:spLocks noGrp="1"/>
+          </p:cNvSpPr>
+          <p:nvPr>
+            <p:ph idx="1"/>
+          </p:nvPr>
+        </p:nvSpPr>
+        <p:spPr/>
+        <p:txBody>
+          <a:bodyPr/>
+          <a:lstStyle/>
+          <a:p>
+            <a:r>
+              <a:rPr lang="es-ES" dirty="0"/>
+              <a:t>Ahora procederé a mostrar una demo de la aplicación y su funcionamiento</a:t>
+            </a:r>
+          </a:p>
+          <a:p>
+            <a:endParaRPr lang="es-ES" dirty="0"/>
+          </a:p>
+          <a:p>
+            <a:r>
+              <a:rPr lang="es-ES" dirty="0">
+                <a:solidFill>
+                  <a:srgbClr val="FF0000"/>
+                </a:solidFill>
+              </a:rPr>
+              <a:t>PONER AQUÍ EL LINK EN CASO DE DESPLEGARLO</a:t>
+            </a:r>
+          </a:p>
+        </p:txBody>
+      </p:sp>
+    </p:spTree>
+    <p:extLst>
+      <p:ext uri="{BB962C8B-B14F-4D97-AF65-F5344CB8AC3E}">
+        <p14:creationId xmlns:p14="http://schemas.microsoft.com/office/powerpoint/2010/main" val="1687958293"/>
+      </p:ext>
+    </p:extLst>
+  </p:cSld>
+  <p:clrMapOvr>
+    <a:masterClrMapping/>
+  </p:clrMapOvr>
+</p:sld>
+</file>
+
+<file path=ppt/slides/slide11.xml><?xml version="1.0" encoding="utf-8"?>
+<p:sld xmlns:a="http://schemas.openxmlformats.org/drawingml/2006/main" xmlns:r="http://schemas.openxmlformats.org/officeDocument/2006/relationships" xmlns:p="http://schemas.openxmlformats.org/presentationml/2006/main">
+  <p:cSld>
+    <p:spTree>
+      <p:nvGrpSpPr>
+        <p:cNvPr id="1" name=""/>
+        <p:cNvGrpSpPr/>
+        <p:nvPr/>
+      </p:nvGrpSpPr>
+      <p:grpSpPr>
+        <a:xfrm>
+          <a:off x="0" y="0"/>
+          <a:ext cx="0" cy="0"/>
+          <a:chOff x="0" y="0"/>
+          <a:chExt cx="0" cy="0"/>
+        </a:xfrm>
+      </p:grpSpPr>
+      <p:sp>
+        <p:nvSpPr>
+          <p:cNvPr id="2" name="Título 1">
+            <a:extLst>
+              <a:ext uri="{FF2B5EF4-FFF2-40B4-BE49-F238E27FC236}">
                 <a16:creationId xmlns:a16="http://schemas.microsoft.com/office/drawing/2014/main" id="{7AE95EF9-15C3-142E-4017-8EE903C905F2}"/>
               </a:ext>
             </a:extLst>
@@ -6409,7 +6491,7 @@
           <a:p>
             <a:r>
               <a:rPr lang="es-ES" dirty="0"/>
-              <a:t>Plan de trabajo</a:t>
+              <a:t>Plan de trabajo y Temporalización</a:t>
             </a:r>
           </a:p>
           <a:p>
@@ -6772,7 +6854,7 @@
             <a:r>
               <a:rPr lang="es-ES" dirty="0">
                 <a:solidFill>
-                  <a:srgbClr val="000000"/>
+                  <a:schemeClr val="accent5"/>
                 </a:solidFill>
                 <a:effectLst/>
                 <a:latin typeface="Calibri" panose="020F0502020204030204" pitchFamily="34" charset="0"/>
@@ -6919,7 +7001,7 @@
           <a:p>
             <a:r>
               <a:rPr lang="es-ES" dirty="0"/>
-              <a:t>Plan de trabajo</a:t>
+              <a:t>Plan de trabajo y Temporalización</a:t>
             </a:r>
           </a:p>
         </p:txBody>
@@ -7120,7 +7202,7 @@
             <a:r>
               <a:rPr lang="es-ES" b="1" dirty="0">
                 <a:solidFill>
-                  <a:srgbClr val="000000"/>
+                  <a:schemeClr val="accent5"/>
                 </a:solidFill>
                 <a:effectLst/>
                 <a:latin typeface="Calibri" panose="020F0502020204030204" pitchFamily="34" charset="0"/>
@@ -7128,7 +7210,11 @@
               </a:rPr>
               <a:t>Despliegue (?¿)</a:t>
             </a:r>
-            <a:endParaRPr lang="es-ES" dirty="0"/>
+            <a:endParaRPr lang="es-ES" dirty="0">
+              <a:solidFill>
+                <a:schemeClr val="accent5"/>
+              </a:solidFill>
+            </a:endParaRPr>
           </a:p>
         </p:txBody>
       </p:sp>

</xml_diff>

<commit_message>
feat: create screen after register new user
</commit_message>
<xml_diff>
--- a/Presentacion y memorias/Gestor de Dietas.pptx
+++ b/Presentacion y memorias/Gestor de Dietas.pptx
@@ -7,15 +7,24 @@
   <p:sldIdLst>
     <p:sldId id="256" r:id="rId2"/>
     <p:sldId id="264" r:id="rId3"/>
-    <p:sldId id="257" r:id="rId4"/>
-    <p:sldId id="258" r:id="rId5"/>
-    <p:sldId id="259" r:id="rId6"/>
-    <p:sldId id="260" r:id="rId7"/>
-    <p:sldId id="265" r:id="rId8"/>
-    <p:sldId id="261" r:id="rId9"/>
-    <p:sldId id="262" r:id="rId10"/>
-    <p:sldId id="266" r:id="rId11"/>
-    <p:sldId id="263" r:id="rId12"/>
+    <p:sldId id="268" r:id="rId4"/>
+    <p:sldId id="257" r:id="rId5"/>
+    <p:sldId id="267" r:id="rId6"/>
+    <p:sldId id="258" r:id="rId7"/>
+    <p:sldId id="269" r:id="rId8"/>
+    <p:sldId id="259" r:id="rId9"/>
+    <p:sldId id="270" r:id="rId10"/>
+    <p:sldId id="260" r:id="rId11"/>
+    <p:sldId id="271" r:id="rId12"/>
+    <p:sldId id="265" r:id="rId13"/>
+    <p:sldId id="272" r:id="rId14"/>
+    <p:sldId id="261" r:id="rId15"/>
+    <p:sldId id="273" r:id="rId16"/>
+    <p:sldId id="262" r:id="rId17"/>
+    <p:sldId id="274" r:id="rId18"/>
+    <p:sldId id="266" r:id="rId19"/>
+    <p:sldId id="275" r:id="rId20"/>
+    <p:sldId id="263" r:id="rId21"/>
   </p:sldIdLst>
   <p:sldSz cx="12192000" cy="6858000"/>
   <p:notesSz cx="6858000" cy="9144000"/>
@@ -126,8 +135,8 @@
 <pc:chgInfo xmlns:a="http://schemas.openxmlformats.org/drawingml/2006/main" xmlns:r="http://schemas.openxmlformats.org/officeDocument/2006/relationships" xmlns:ac="http://schemas.microsoft.com/office/drawing/2013/main/command" xmlns:pc="http://schemas.microsoft.com/office/powerpoint/2013/main/command">
   <pc:docChgLst>
     <pc:chgData name="Alberto Velázquez Rapado" userId="b5275a5ea1bbeae7" providerId="LiveId" clId="{82D48C34-EA48-48CD-92C5-616C07D15ACA}"/>
-    <pc:docChg chg="undo custSel modSld sldOrd">
-      <pc:chgData name="Alberto Velázquez Rapado" userId="b5275a5ea1bbeae7" providerId="LiveId" clId="{82D48C34-EA48-48CD-92C5-616C07D15ACA}" dt="2023-06-21T10:02:23.332" v="603" actId="20577"/>
+    <pc:docChg chg="undo custSel addSld delSld modSld sldOrd">
+      <pc:chgData name="Alberto Velázquez Rapado" userId="b5275a5ea1bbeae7" providerId="LiveId" clId="{82D48C34-EA48-48CD-92C5-616C07D15ACA}" dt="2023-06-22T18:00:19.450" v="1452" actId="20577"/>
       <pc:docMkLst>
         <pc:docMk/>
       </pc:docMkLst>
@@ -147,22 +156,45 @@
         </pc:spChg>
       </pc:sldChg>
       <pc:sldChg chg="modSp mod">
-        <pc:chgData name="Alberto Velázquez Rapado" userId="b5275a5ea1bbeae7" providerId="LiveId" clId="{82D48C34-EA48-48CD-92C5-616C07D15ACA}" dt="2023-06-21T10:02:23.332" v="603" actId="20577"/>
+        <pc:chgData name="Alberto Velázquez Rapado" userId="b5275a5ea1bbeae7" providerId="LiveId" clId="{82D48C34-EA48-48CD-92C5-616C07D15ACA}" dt="2023-06-22T17:51:59.768" v="701" actId="108"/>
+        <pc:sldMkLst>
+          <pc:docMk/>
+          <pc:sldMk cId="1472778878" sldId="258"/>
+        </pc:sldMkLst>
+        <pc:spChg chg="mod">
+          <ac:chgData name="Alberto Velázquez Rapado" userId="b5275a5ea1bbeae7" providerId="LiveId" clId="{82D48C34-EA48-48CD-92C5-616C07D15ACA}" dt="2023-06-22T17:51:59.768" v="701" actId="108"/>
+          <ac:spMkLst>
+            <pc:docMk/>
+            <pc:sldMk cId="1472778878" sldId="258"/>
+            <ac:spMk id="3" creationId="{E91C1265-73DF-B355-C494-F5AE5C1690E2}"/>
+          </ac:spMkLst>
+        </pc:spChg>
+      </pc:sldChg>
+      <pc:sldChg chg="addSp delSp modSp mod">
+        <pc:chgData name="Alberto Velázquez Rapado" userId="b5275a5ea1bbeae7" providerId="LiveId" clId="{82D48C34-EA48-48CD-92C5-616C07D15ACA}" dt="2023-06-22T17:33:11.307" v="700" actId="27636"/>
         <pc:sldMkLst>
           <pc:docMk/>
           <pc:sldMk cId="1052401113" sldId="259"/>
         </pc:sldMkLst>
         <pc:spChg chg="mod">
-          <ac:chgData name="Alberto Velázquez Rapado" userId="b5275a5ea1bbeae7" providerId="LiveId" clId="{82D48C34-EA48-48CD-92C5-616C07D15ACA}" dt="2023-06-21T10:02:23.332" v="603" actId="20577"/>
+          <ac:chgData name="Alberto Velázquez Rapado" userId="b5275a5ea1bbeae7" providerId="LiveId" clId="{82D48C34-EA48-48CD-92C5-616C07D15ACA}" dt="2023-06-22T17:33:11.307" v="700" actId="27636"/>
           <ac:spMkLst>
             <pc:docMk/>
             <pc:sldMk cId="1052401113" sldId="259"/>
             <ac:spMk id="3" creationId="{4F8C50B0-0470-FF1F-FCAC-069A7FFAADE4}"/>
           </ac:spMkLst>
         </pc:spChg>
+        <pc:spChg chg="add del mod">
+          <ac:chgData name="Alberto Velázquez Rapado" userId="b5275a5ea1bbeae7" providerId="LiveId" clId="{82D48C34-EA48-48CD-92C5-616C07D15ACA}" dt="2023-06-22T17:30:50.476" v="639" actId="478"/>
+          <ac:spMkLst>
+            <pc:docMk/>
+            <pc:sldMk cId="1052401113" sldId="259"/>
+            <ac:spMk id="4" creationId="{10E8DEB1-D7E1-79D2-9C97-9517B09B5059}"/>
+          </ac:spMkLst>
+        </pc:spChg>
       </pc:sldChg>
       <pc:sldChg chg="addSp modSp mod">
-        <pc:chgData name="Alberto Velázquez Rapado" userId="b5275a5ea1bbeae7" providerId="LiveId" clId="{82D48C34-EA48-48CD-92C5-616C07D15ACA}" dt="2023-06-20T11:26:24.660" v="394" actId="14100"/>
+        <pc:chgData name="Alberto Velázquez Rapado" userId="b5275a5ea1bbeae7" providerId="LiveId" clId="{82D48C34-EA48-48CD-92C5-616C07D15ACA}" dt="2023-06-22T17:28:45.308" v="614" actId="1076"/>
         <pc:sldMkLst>
           <pc:docMk/>
           <pc:sldMk cId="3222557619" sldId="260"/>
@@ -207,6 +239,14 @@
             <ac:spMk id="12" creationId="{D54E105F-0198-14C0-138F-C54F3D3B6B66}"/>
           </ac:spMkLst>
         </pc:spChg>
+        <pc:picChg chg="add mod">
+          <ac:chgData name="Alberto Velázquez Rapado" userId="b5275a5ea1bbeae7" providerId="LiveId" clId="{82D48C34-EA48-48CD-92C5-616C07D15ACA}" dt="2023-06-22T17:28:45.308" v="614" actId="1076"/>
+          <ac:picMkLst>
+            <pc:docMk/>
+            <pc:sldMk cId="3222557619" sldId="260"/>
+            <ac:picMk id="9" creationId="{17F3CBF6-FC5B-623B-9EAF-56D2D29F0420}"/>
+          </ac:picMkLst>
+        </pc:picChg>
         <pc:picChg chg="add mod">
           <ac:chgData name="Alberto Velázquez Rapado" userId="b5275a5ea1bbeae7" providerId="LiveId" clId="{82D48C34-EA48-48CD-92C5-616C07D15ACA}" dt="2023-06-20T11:24:40.449" v="252" actId="1076"/>
           <ac:picMkLst>
@@ -280,7 +320,7 @@
           </ac:picMkLst>
         </pc:picChg>
         <pc:picChg chg="mod">
-          <ac:chgData name="Alberto Velázquez Rapado" userId="b5275a5ea1bbeae7" providerId="LiveId" clId="{82D48C34-EA48-48CD-92C5-616C07D15ACA}" dt="2023-06-20T11:25:00.590" v="275" actId="1076"/>
+          <ac:chgData name="Alberto Velázquez Rapado" userId="b5275a5ea1bbeae7" providerId="LiveId" clId="{82D48C34-EA48-48CD-92C5-616C07D15ACA}" dt="2023-06-22T17:28:43.006" v="613" actId="1076"/>
           <ac:picMkLst>
             <pc:docMk/>
             <pc:sldMk cId="3222557619" sldId="260"/>
@@ -336,13 +376,13 @@
         </pc:picChg>
       </pc:sldChg>
       <pc:sldChg chg="modSp mod">
-        <pc:chgData name="Alberto Velázquez Rapado" userId="b5275a5ea1bbeae7" providerId="LiveId" clId="{82D48C34-EA48-48CD-92C5-616C07D15ACA}" dt="2023-06-20T11:41:53.253" v="590" actId="207"/>
+        <pc:chgData name="Alberto Velázquez Rapado" userId="b5275a5ea1bbeae7" providerId="LiveId" clId="{82D48C34-EA48-48CD-92C5-616C07D15ACA}" dt="2023-06-22T17:53:03.672" v="722" actId="5793"/>
         <pc:sldMkLst>
           <pc:docMk/>
           <pc:sldMk cId="1928398243" sldId="262"/>
         </pc:sldMkLst>
         <pc:spChg chg="mod">
-          <ac:chgData name="Alberto Velázquez Rapado" userId="b5275a5ea1bbeae7" providerId="LiveId" clId="{82D48C34-EA48-48CD-92C5-616C07D15ACA}" dt="2023-06-20T11:41:53.253" v="590" actId="207"/>
+          <ac:chgData name="Alberto Velázquez Rapado" userId="b5275a5ea1bbeae7" providerId="LiveId" clId="{82D48C34-EA48-48CD-92C5-616C07D15ACA}" dt="2023-06-22T17:53:03.672" v="722" actId="5793"/>
           <ac:spMkLst>
             <pc:docMk/>
             <pc:sldMk cId="1928398243" sldId="262"/>
@@ -351,13 +391,13 @@
         </pc:spChg>
       </pc:sldChg>
       <pc:sldChg chg="modSp mod">
-        <pc:chgData name="Alberto Velázquez Rapado" userId="b5275a5ea1bbeae7" providerId="LiveId" clId="{82D48C34-EA48-48CD-92C5-616C07D15ACA}" dt="2023-06-20T11:41:05.273" v="545" actId="5793"/>
+        <pc:chgData name="Alberto Velázquez Rapado" userId="b5275a5ea1bbeae7" providerId="LiveId" clId="{82D48C34-EA48-48CD-92C5-616C07D15ACA}" dt="2023-06-22T17:54:36.064" v="792" actId="20577"/>
         <pc:sldMkLst>
           <pc:docMk/>
           <pc:sldMk cId="144551678" sldId="264"/>
         </pc:sldMkLst>
         <pc:spChg chg="mod">
-          <ac:chgData name="Alberto Velázquez Rapado" userId="b5275a5ea1bbeae7" providerId="LiveId" clId="{82D48C34-EA48-48CD-92C5-616C07D15ACA}" dt="2023-06-20T11:41:05.273" v="545" actId="5793"/>
+          <ac:chgData name="Alberto Velázquez Rapado" userId="b5275a5ea1bbeae7" providerId="LiveId" clId="{82D48C34-EA48-48CD-92C5-616C07D15ACA}" dt="2023-06-22T17:54:36.064" v="792" actId="20577"/>
           <ac:spMkLst>
             <pc:docMk/>
             <pc:sldMk cId="144551678" sldId="264"/>
@@ -377,6 +417,163 @@
             <pc:docMk/>
             <pc:sldMk cId="3251461164" sldId="265"/>
             <ac:spMk id="6" creationId="{FE673028-BA31-4425-A0DF-BF4C1EF31C56}"/>
+          </ac:spMkLst>
+        </pc:spChg>
+      </pc:sldChg>
+      <pc:sldChg chg="modSp mod">
+        <pc:chgData name="Alberto Velázquez Rapado" userId="b5275a5ea1bbeae7" providerId="LiveId" clId="{82D48C34-EA48-48CD-92C5-616C07D15ACA}" dt="2023-06-22T18:00:19.450" v="1452" actId="20577"/>
+        <pc:sldMkLst>
+          <pc:docMk/>
+          <pc:sldMk cId="1687958293" sldId="266"/>
+        </pc:sldMkLst>
+        <pc:spChg chg="mod">
+          <ac:chgData name="Alberto Velázquez Rapado" userId="b5275a5ea1bbeae7" providerId="LiveId" clId="{82D48C34-EA48-48CD-92C5-616C07D15ACA}" dt="2023-06-22T18:00:19.450" v="1452" actId="20577"/>
+          <ac:spMkLst>
+            <pc:docMk/>
+            <pc:sldMk cId="1687958293" sldId="266"/>
+            <ac:spMk id="3" creationId="{B925B571-44AD-9500-5DE4-637EE8EC8A0C}"/>
+          </ac:spMkLst>
+        </pc:spChg>
+      </pc:sldChg>
+      <pc:sldChg chg="modSp add mod ord">
+        <pc:chgData name="Alberto Velázquez Rapado" userId="b5275a5ea1bbeae7" providerId="LiveId" clId="{82D48C34-EA48-48CD-92C5-616C07D15ACA}" dt="2023-06-22T17:54:23.011" v="771" actId="27636"/>
+        <pc:sldMkLst>
+          <pc:docMk/>
+          <pc:sldMk cId="2648702181" sldId="267"/>
+        </pc:sldMkLst>
+        <pc:spChg chg="mod">
+          <ac:chgData name="Alberto Velázquez Rapado" userId="b5275a5ea1bbeae7" providerId="LiveId" clId="{82D48C34-EA48-48CD-92C5-616C07D15ACA}" dt="2023-06-22T17:54:23.011" v="771" actId="27636"/>
+          <ac:spMkLst>
+            <pc:docMk/>
+            <pc:sldMk cId="2648702181" sldId="267"/>
+            <ac:spMk id="3" creationId="{78669549-A335-3A34-3C1D-213FB03C61FD}"/>
+          </ac:spMkLst>
+        </pc:spChg>
+      </pc:sldChg>
+      <pc:sldChg chg="modSp add mod">
+        <pc:chgData name="Alberto Velázquez Rapado" userId="b5275a5ea1bbeae7" providerId="LiveId" clId="{82D48C34-EA48-48CD-92C5-616C07D15ACA}" dt="2023-06-22T17:54:27.975" v="776" actId="27636"/>
+        <pc:sldMkLst>
+          <pc:docMk/>
+          <pc:sldMk cId="3777196523" sldId="268"/>
+        </pc:sldMkLst>
+        <pc:spChg chg="mod">
+          <ac:chgData name="Alberto Velázquez Rapado" userId="b5275a5ea1bbeae7" providerId="LiveId" clId="{82D48C34-EA48-48CD-92C5-616C07D15ACA}" dt="2023-06-22T17:54:27.975" v="776" actId="27636"/>
+          <ac:spMkLst>
+            <pc:docMk/>
+            <pc:sldMk cId="3777196523" sldId="268"/>
+            <ac:spMk id="3" creationId="{78669549-A335-3A34-3C1D-213FB03C61FD}"/>
+          </ac:spMkLst>
+        </pc:spChg>
+      </pc:sldChg>
+      <pc:sldChg chg="modSp add mod">
+        <pc:chgData name="Alberto Velázquez Rapado" userId="b5275a5ea1bbeae7" providerId="LiveId" clId="{82D48C34-EA48-48CD-92C5-616C07D15ACA}" dt="2023-06-22T17:54:19.136" v="766" actId="27636"/>
+        <pc:sldMkLst>
+          <pc:docMk/>
+          <pc:sldMk cId="4026825388" sldId="269"/>
+        </pc:sldMkLst>
+        <pc:spChg chg="mod">
+          <ac:chgData name="Alberto Velázquez Rapado" userId="b5275a5ea1bbeae7" providerId="LiveId" clId="{82D48C34-EA48-48CD-92C5-616C07D15ACA}" dt="2023-06-22T17:54:19.136" v="766" actId="27636"/>
+          <ac:spMkLst>
+            <pc:docMk/>
+            <pc:sldMk cId="4026825388" sldId="269"/>
+            <ac:spMk id="3" creationId="{78669549-A335-3A34-3C1D-213FB03C61FD}"/>
+          </ac:spMkLst>
+        </pc:spChg>
+      </pc:sldChg>
+      <pc:sldChg chg="add del">
+        <pc:chgData name="Alberto Velázquez Rapado" userId="b5275a5ea1bbeae7" providerId="LiveId" clId="{82D48C34-EA48-48CD-92C5-616C07D15ACA}" dt="2023-06-22T17:52:06.647" v="703" actId="47"/>
+        <pc:sldMkLst>
+          <pc:docMk/>
+          <pc:sldMk cId="928070107" sldId="270"/>
+        </pc:sldMkLst>
+      </pc:sldChg>
+      <pc:sldChg chg="modSp add mod">
+        <pc:chgData name="Alberto Velázquez Rapado" userId="b5275a5ea1bbeae7" providerId="LiveId" clId="{82D48C34-EA48-48CD-92C5-616C07D15ACA}" dt="2023-06-22T17:54:15.013" v="761" actId="27636"/>
+        <pc:sldMkLst>
+          <pc:docMk/>
+          <pc:sldMk cId="2662567000" sldId="270"/>
+        </pc:sldMkLst>
+        <pc:spChg chg="mod">
+          <ac:chgData name="Alberto Velázquez Rapado" userId="b5275a5ea1bbeae7" providerId="LiveId" clId="{82D48C34-EA48-48CD-92C5-616C07D15ACA}" dt="2023-06-22T17:54:15.013" v="761" actId="27636"/>
+          <ac:spMkLst>
+            <pc:docMk/>
+            <pc:sldMk cId="2662567000" sldId="270"/>
+            <ac:spMk id="3" creationId="{78669549-A335-3A34-3C1D-213FB03C61FD}"/>
+          </ac:spMkLst>
+        </pc:spChg>
+      </pc:sldChg>
+      <pc:sldChg chg="modSp add mod">
+        <pc:chgData name="Alberto Velázquez Rapado" userId="b5275a5ea1bbeae7" providerId="LiveId" clId="{82D48C34-EA48-48CD-92C5-616C07D15ACA}" dt="2023-06-22T17:54:09.823" v="756" actId="27636"/>
+        <pc:sldMkLst>
+          <pc:docMk/>
+          <pc:sldMk cId="585227700" sldId="271"/>
+        </pc:sldMkLst>
+        <pc:spChg chg="mod">
+          <ac:chgData name="Alberto Velázquez Rapado" userId="b5275a5ea1bbeae7" providerId="LiveId" clId="{82D48C34-EA48-48CD-92C5-616C07D15ACA}" dt="2023-06-22T17:54:09.823" v="756" actId="27636"/>
+          <ac:spMkLst>
+            <pc:docMk/>
+            <pc:sldMk cId="585227700" sldId="271"/>
+            <ac:spMk id="3" creationId="{78669549-A335-3A34-3C1D-213FB03C61FD}"/>
+          </ac:spMkLst>
+        </pc:spChg>
+      </pc:sldChg>
+      <pc:sldChg chg="modSp add mod">
+        <pc:chgData name="Alberto Velázquez Rapado" userId="b5275a5ea1bbeae7" providerId="LiveId" clId="{82D48C34-EA48-48CD-92C5-616C07D15ACA}" dt="2023-06-22T17:54:02.901" v="751" actId="27636"/>
+        <pc:sldMkLst>
+          <pc:docMk/>
+          <pc:sldMk cId="2427219398" sldId="272"/>
+        </pc:sldMkLst>
+        <pc:spChg chg="mod">
+          <ac:chgData name="Alberto Velázquez Rapado" userId="b5275a5ea1bbeae7" providerId="LiveId" clId="{82D48C34-EA48-48CD-92C5-616C07D15ACA}" dt="2023-06-22T17:54:02.901" v="751" actId="27636"/>
+          <ac:spMkLst>
+            <pc:docMk/>
+            <pc:sldMk cId="2427219398" sldId="272"/>
+            <ac:spMk id="3" creationId="{78669549-A335-3A34-3C1D-213FB03C61FD}"/>
+          </ac:spMkLst>
+        </pc:spChg>
+      </pc:sldChg>
+      <pc:sldChg chg="modSp add mod">
+        <pc:chgData name="Alberto Velázquez Rapado" userId="b5275a5ea1bbeae7" providerId="LiveId" clId="{82D48C34-EA48-48CD-92C5-616C07D15ACA}" dt="2023-06-22T17:53:51.895" v="745" actId="20577"/>
+        <pc:sldMkLst>
+          <pc:docMk/>
+          <pc:sldMk cId="2374758224" sldId="273"/>
+        </pc:sldMkLst>
+        <pc:spChg chg="mod">
+          <ac:chgData name="Alberto Velázquez Rapado" userId="b5275a5ea1bbeae7" providerId="LiveId" clId="{82D48C34-EA48-48CD-92C5-616C07D15ACA}" dt="2023-06-22T17:53:51.895" v="745" actId="20577"/>
+          <ac:spMkLst>
+            <pc:docMk/>
+            <pc:sldMk cId="2374758224" sldId="273"/>
+            <ac:spMk id="3" creationId="{78669549-A335-3A34-3C1D-213FB03C61FD}"/>
+          </ac:spMkLst>
+        </pc:spChg>
+      </pc:sldChg>
+      <pc:sldChg chg="modSp add mod">
+        <pc:chgData name="Alberto Velázquez Rapado" userId="b5275a5ea1bbeae7" providerId="LiveId" clId="{82D48C34-EA48-48CD-92C5-616C07D15ACA}" dt="2023-06-22T17:55:04.804" v="795" actId="108"/>
+        <pc:sldMkLst>
+          <pc:docMk/>
+          <pc:sldMk cId="1074051263" sldId="274"/>
+        </pc:sldMkLst>
+        <pc:spChg chg="mod">
+          <ac:chgData name="Alberto Velázquez Rapado" userId="b5275a5ea1bbeae7" providerId="LiveId" clId="{82D48C34-EA48-48CD-92C5-616C07D15ACA}" dt="2023-06-22T17:55:04.804" v="795" actId="108"/>
+          <ac:spMkLst>
+            <pc:docMk/>
+            <pc:sldMk cId="1074051263" sldId="274"/>
+            <ac:spMk id="3" creationId="{78669549-A335-3A34-3C1D-213FB03C61FD}"/>
+          </ac:spMkLst>
+        </pc:spChg>
+      </pc:sldChg>
+      <pc:sldChg chg="modSp add mod">
+        <pc:chgData name="Alberto Velázquez Rapado" userId="b5275a5ea1bbeae7" providerId="LiveId" clId="{82D48C34-EA48-48CD-92C5-616C07D15ACA}" dt="2023-06-22T17:55:22.051" v="799" actId="108"/>
+        <pc:sldMkLst>
+          <pc:docMk/>
+          <pc:sldMk cId="465450142" sldId="275"/>
+        </pc:sldMkLst>
+        <pc:spChg chg="mod">
+          <ac:chgData name="Alberto Velázquez Rapado" userId="b5275a5ea1bbeae7" providerId="LiveId" clId="{82D48C34-EA48-48CD-92C5-616C07D15ACA}" dt="2023-06-22T17:55:22.051" v="799" actId="108"/>
+          <ac:spMkLst>
+            <pc:docMk/>
+            <pc:sldMk cId="465450142" sldId="275"/>
+            <ac:spMk id="3" creationId="{78669549-A335-3A34-3C1D-213FB03C61FD}"/>
           </ac:spMkLst>
         </pc:spChg>
       </pc:sldChg>
@@ -1107,7 +1304,7 @@
           <a:p>
             <a:fld id="{68FB41E2-212A-458D-84D8-C7300EE7A49C}" type="datetimeFigureOut">
               <a:rPr lang="es-ES" smtClean="0"/>
-              <a:t>21/06/2023</a:t>
+              <a:t>22/06/2023</a:t>
             </a:fld>
             <a:endParaRPr lang="es-ES"/>
           </a:p>
@@ -1358,7 +1555,7 @@
           <a:p>
             <a:fld id="{68FB41E2-212A-458D-84D8-C7300EE7A49C}" type="datetimeFigureOut">
               <a:rPr lang="es-ES" smtClean="0"/>
-              <a:t>21/06/2023</a:t>
+              <a:t>22/06/2023</a:t>
             </a:fld>
             <a:endParaRPr lang="es-ES"/>
           </a:p>
@@ -1672,7 +1869,7 @@
           <a:p>
             <a:fld id="{68FB41E2-212A-458D-84D8-C7300EE7A49C}" type="datetimeFigureOut">
               <a:rPr lang="es-ES" smtClean="0"/>
-              <a:t>21/06/2023</a:t>
+              <a:t>22/06/2023</a:t>
             </a:fld>
             <a:endParaRPr lang="es-ES"/>
           </a:p>
@@ -2013,7 +2210,7 @@
           <a:p>
             <a:fld id="{68FB41E2-212A-458D-84D8-C7300EE7A49C}" type="datetimeFigureOut">
               <a:rPr lang="es-ES" smtClean="0"/>
-              <a:t>21/06/2023</a:t>
+              <a:t>22/06/2023</a:t>
             </a:fld>
             <a:endParaRPr lang="es-ES"/>
           </a:p>
@@ -2327,7 +2524,7 @@
           <a:p>
             <a:fld id="{68FB41E2-212A-458D-84D8-C7300EE7A49C}" type="datetimeFigureOut">
               <a:rPr lang="es-ES" smtClean="0"/>
-              <a:t>21/06/2023</a:t>
+              <a:t>22/06/2023</a:t>
             </a:fld>
             <a:endParaRPr lang="es-ES"/>
           </a:p>
@@ -2720,7 +2917,7 @@
           <a:p>
             <a:fld id="{68FB41E2-212A-458D-84D8-C7300EE7A49C}" type="datetimeFigureOut">
               <a:rPr lang="es-ES" smtClean="0"/>
-              <a:t>21/06/2023</a:t>
+              <a:t>22/06/2023</a:t>
             </a:fld>
             <a:endParaRPr lang="es-ES"/>
           </a:p>
@@ -2890,7 +3087,7 @@
           <a:p>
             <a:fld id="{68FB41E2-212A-458D-84D8-C7300EE7A49C}" type="datetimeFigureOut">
               <a:rPr lang="es-ES" smtClean="0"/>
-              <a:t>21/06/2023</a:t>
+              <a:t>22/06/2023</a:t>
             </a:fld>
             <a:endParaRPr lang="es-ES"/>
           </a:p>
@@ -3070,7 +3267,7 @@
           <a:p>
             <a:fld id="{68FB41E2-212A-458D-84D8-C7300EE7A49C}" type="datetimeFigureOut">
               <a:rPr lang="es-ES" smtClean="0"/>
-              <a:t>21/06/2023</a:t>
+              <a:t>22/06/2023</a:t>
             </a:fld>
             <a:endParaRPr lang="es-ES"/>
           </a:p>
@@ -3246,7 +3443,7 @@
           <a:p>
             <a:fld id="{68FB41E2-212A-458D-84D8-C7300EE7A49C}" type="datetimeFigureOut">
               <a:rPr lang="es-ES" smtClean="0"/>
-              <a:t>21/06/2023</a:t>
+              <a:t>22/06/2023</a:t>
             </a:fld>
             <a:endParaRPr lang="es-ES"/>
           </a:p>
@@ -3493,7 +3690,7 @@
           <a:p>
             <a:fld id="{68FB41E2-212A-458D-84D8-C7300EE7A49C}" type="datetimeFigureOut">
               <a:rPr lang="es-ES" smtClean="0"/>
-              <a:t>21/06/2023</a:t>
+              <a:t>22/06/2023</a:t>
             </a:fld>
             <a:endParaRPr lang="es-ES"/>
           </a:p>
@@ -3725,7 +3922,7 @@
           <a:p>
             <a:fld id="{68FB41E2-212A-458D-84D8-C7300EE7A49C}" type="datetimeFigureOut">
               <a:rPr lang="es-ES" smtClean="0"/>
-              <a:t>21/06/2023</a:t>
+              <a:t>22/06/2023</a:t>
             </a:fld>
             <a:endParaRPr lang="es-ES"/>
           </a:p>
@@ -4099,7 +4296,7 @@
           <a:p>
             <a:fld id="{68FB41E2-212A-458D-84D8-C7300EE7A49C}" type="datetimeFigureOut">
               <a:rPr lang="es-ES" smtClean="0"/>
-              <a:t>21/06/2023</a:t>
+              <a:t>22/06/2023</a:t>
             </a:fld>
             <a:endParaRPr lang="es-ES"/>
           </a:p>
@@ -4222,7 +4419,7 @@
           <a:p>
             <a:fld id="{68FB41E2-212A-458D-84D8-C7300EE7A49C}" type="datetimeFigureOut">
               <a:rPr lang="es-ES" smtClean="0"/>
-              <a:t>21/06/2023</a:t>
+              <a:t>22/06/2023</a:t>
             </a:fld>
             <a:endParaRPr lang="es-ES"/>
           </a:p>
@@ -4317,7 +4514,7 @@
           <a:p>
             <a:fld id="{68FB41E2-212A-458D-84D8-C7300EE7A49C}" type="datetimeFigureOut">
               <a:rPr lang="es-ES" smtClean="0"/>
-              <a:t>21/06/2023</a:t>
+              <a:t>22/06/2023</a:t>
             </a:fld>
             <a:endParaRPr lang="es-ES"/>
           </a:p>
@@ -4572,7 +4769,7 @@
           <a:p>
             <a:fld id="{68FB41E2-212A-458D-84D8-C7300EE7A49C}" type="datetimeFigureOut">
               <a:rPr lang="es-ES" smtClean="0"/>
-              <a:t>21/06/2023</a:t>
+              <a:t>22/06/2023</a:t>
             </a:fld>
             <a:endParaRPr lang="es-ES"/>
           </a:p>
@@ -4835,7 +5032,7 @@
           <a:p>
             <a:fld id="{68FB41E2-212A-458D-84D8-C7300EE7A49C}" type="datetimeFigureOut">
               <a:rPr lang="es-ES" smtClean="0"/>
-              <a:t>21/06/2023</a:t>
+              <a:t>22/06/2023</a:t>
             </a:fld>
             <a:endParaRPr lang="es-ES"/>
           </a:p>
@@ -5578,7 +5775,7 @@
           <a:p>
             <a:fld id="{68FB41E2-212A-458D-84D8-C7300EE7A49C}" type="datetimeFigureOut">
               <a:rPr lang="es-ES" smtClean="0"/>
-              <a:t>21/06/2023</a:t>
+              <a:t>22/06/2023</a:t>
             </a:fld>
             <a:endParaRPr lang="es-ES"/>
           </a:p>
@@ -6258,998 +6455,6 @@
       </p:grpSpPr>
       <p:sp>
         <p:nvSpPr>
-          <p:cNvPr id="2" name="Título 1">
-            <a:extLst>
-              <a:ext uri="{FF2B5EF4-FFF2-40B4-BE49-F238E27FC236}">
-                <a16:creationId xmlns:a16="http://schemas.microsoft.com/office/drawing/2014/main" id="{D986E5BC-5F83-73C7-C180-DA40CF7220B8}"/>
-              </a:ext>
-            </a:extLst>
-          </p:cNvPr>
-          <p:cNvSpPr>
-            <a:spLocks noGrp="1"/>
-          </p:cNvSpPr>
-          <p:nvPr>
-            <p:ph type="title"/>
-          </p:nvPr>
-        </p:nvSpPr>
-        <p:spPr/>
-        <p:txBody>
-          <a:bodyPr/>
-          <a:lstStyle/>
-          <a:p>
-            <a:r>
-              <a:rPr lang="es-ES" dirty="0"/>
-              <a:t>Conclusiones</a:t>
-            </a:r>
-          </a:p>
-        </p:txBody>
-      </p:sp>
-      <p:sp>
-        <p:nvSpPr>
-          <p:cNvPr id="3" name="Marcador de contenido 2">
-            <a:extLst>
-              <a:ext uri="{FF2B5EF4-FFF2-40B4-BE49-F238E27FC236}">
-                <a16:creationId xmlns:a16="http://schemas.microsoft.com/office/drawing/2014/main" id="{B925B571-44AD-9500-5DE4-637EE8EC8A0C}"/>
-              </a:ext>
-            </a:extLst>
-          </p:cNvPr>
-          <p:cNvSpPr>
-            <a:spLocks noGrp="1"/>
-          </p:cNvSpPr>
-          <p:nvPr>
-            <p:ph idx="1"/>
-          </p:nvPr>
-        </p:nvSpPr>
-        <p:spPr/>
-        <p:txBody>
-          <a:bodyPr/>
-          <a:lstStyle/>
-          <a:p>
-            <a:r>
-              <a:rPr lang="es-ES" dirty="0"/>
-              <a:t>Ahora procederé a mostrar una demo de la aplicación y su funcionamiento</a:t>
-            </a:r>
-          </a:p>
-          <a:p>
-            <a:endParaRPr lang="es-ES" dirty="0"/>
-          </a:p>
-          <a:p>
-            <a:r>
-              <a:rPr lang="es-ES" dirty="0">
-                <a:solidFill>
-                  <a:srgbClr val="FF0000"/>
-                </a:solidFill>
-              </a:rPr>
-              <a:t>PONER AQUÍ EL LINK EN CASO DE DESPLEGARLO</a:t>
-            </a:r>
-          </a:p>
-        </p:txBody>
-      </p:sp>
-    </p:spTree>
-    <p:extLst>
-      <p:ext uri="{BB962C8B-B14F-4D97-AF65-F5344CB8AC3E}">
-        <p14:creationId xmlns:p14="http://schemas.microsoft.com/office/powerpoint/2010/main" val="1687958293"/>
-      </p:ext>
-    </p:extLst>
-  </p:cSld>
-  <p:clrMapOvr>
-    <a:masterClrMapping/>
-  </p:clrMapOvr>
-</p:sld>
-</file>
-
-<file path=ppt/slides/slide11.xml><?xml version="1.0" encoding="utf-8"?>
-<p:sld xmlns:a="http://schemas.openxmlformats.org/drawingml/2006/main" xmlns:r="http://schemas.openxmlformats.org/officeDocument/2006/relationships" xmlns:p="http://schemas.openxmlformats.org/presentationml/2006/main">
-  <p:cSld>
-    <p:spTree>
-      <p:nvGrpSpPr>
-        <p:cNvPr id="1" name=""/>
-        <p:cNvGrpSpPr/>
-        <p:nvPr/>
-      </p:nvGrpSpPr>
-      <p:grpSpPr>
-        <a:xfrm>
-          <a:off x="0" y="0"/>
-          <a:ext cx="0" cy="0"/>
-          <a:chOff x="0" y="0"/>
-          <a:chExt cx="0" cy="0"/>
-        </a:xfrm>
-      </p:grpSpPr>
-      <p:sp>
-        <p:nvSpPr>
-          <p:cNvPr id="2" name="Título 1">
-            <a:extLst>
-              <a:ext uri="{FF2B5EF4-FFF2-40B4-BE49-F238E27FC236}">
-                <a16:creationId xmlns:a16="http://schemas.microsoft.com/office/drawing/2014/main" id="{7AE95EF9-15C3-142E-4017-8EE903C905F2}"/>
-              </a:ext>
-            </a:extLst>
-          </p:cNvPr>
-          <p:cNvSpPr>
-            <a:spLocks noGrp="1"/>
-          </p:cNvSpPr>
-          <p:nvPr>
-            <p:ph type="title"/>
-          </p:nvPr>
-        </p:nvSpPr>
-        <p:spPr>
-          <a:xfrm>
-            <a:off x="1797666" y="3042082"/>
-            <a:ext cx="8596668" cy="1320800"/>
-          </a:xfrm>
-        </p:spPr>
-        <p:txBody>
-          <a:bodyPr/>
-          <a:lstStyle/>
-          <a:p>
-            <a:pPr algn="ctr"/>
-            <a:r>
-              <a:rPr lang="es-ES" dirty="0"/>
-              <a:t>Muchas gracias por su atención. </a:t>
-            </a:r>
-            <a:br>
-              <a:rPr lang="es-ES" dirty="0"/>
-            </a:br>
-            <a:r>
-              <a:rPr lang="es-ES" dirty="0"/>
-              <a:t>Ruegos y Preguntas</a:t>
-            </a:r>
-          </a:p>
-        </p:txBody>
-      </p:sp>
-    </p:spTree>
-    <p:extLst>
-      <p:ext uri="{BB962C8B-B14F-4D97-AF65-F5344CB8AC3E}">
-        <p14:creationId xmlns:p14="http://schemas.microsoft.com/office/powerpoint/2010/main" val="3193451268"/>
-      </p:ext>
-    </p:extLst>
-  </p:cSld>
-  <p:clrMapOvr>
-    <a:masterClrMapping/>
-  </p:clrMapOvr>
-</p:sld>
-</file>
-
-<file path=ppt/slides/slide2.xml><?xml version="1.0" encoding="utf-8"?>
-<p:sld xmlns:a="http://schemas.openxmlformats.org/drawingml/2006/main" xmlns:r="http://schemas.openxmlformats.org/officeDocument/2006/relationships" xmlns:p="http://schemas.openxmlformats.org/presentationml/2006/main">
-  <p:cSld>
-    <p:spTree>
-      <p:nvGrpSpPr>
-        <p:cNvPr id="1" name=""/>
-        <p:cNvGrpSpPr/>
-        <p:nvPr/>
-      </p:nvGrpSpPr>
-      <p:grpSpPr>
-        <a:xfrm>
-          <a:off x="0" y="0"/>
-          <a:ext cx="0" cy="0"/>
-          <a:chOff x="0" y="0"/>
-          <a:chExt cx="0" cy="0"/>
-        </a:xfrm>
-      </p:grpSpPr>
-      <p:sp>
-        <p:nvSpPr>
-          <p:cNvPr id="2" name="Título 1">
-            <a:extLst>
-              <a:ext uri="{FF2B5EF4-FFF2-40B4-BE49-F238E27FC236}">
-                <a16:creationId xmlns:a16="http://schemas.microsoft.com/office/drawing/2014/main" id="{A91E6ED1-188B-76DC-341C-CE194FBB672B}"/>
-              </a:ext>
-            </a:extLst>
-          </p:cNvPr>
-          <p:cNvSpPr>
-            <a:spLocks noGrp="1"/>
-          </p:cNvSpPr>
-          <p:nvPr>
-            <p:ph type="title"/>
-          </p:nvPr>
-        </p:nvSpPr>
-        <p:spPr/>
-        <p:txBody>
-          <a:bodyPr/>
-          <a:lstStyle/>
-          <a:p>
-            <a:r>
-              <a:rPr lang="es-ES" dirty="0"/>
-              <a:t>Índice</a:t>
-            </a:r>
-          </a:p>
-        </p:txBody>
-      </p:sp>
-      <p:sp>
-        <p:nvSpPr>
-          <p:cNvPr id="3" name="Marcador de contenido 2">
-            <a:extLst>
-              <a:ext uri="{FF2B5EF4-FFF2-40B4-BE49-F238E27FC236}">
-                <a16:creationId xmlns:a16="http://schemas.microsoft.com/office/drawing/2014/main" id="{78669549-A335-3A34-3C1D-213FB03C61FD}"/>
-              </a:ext>
-            </a:extLst>
-          </p:cNvPr>
-          <p:cNvSpPr>
-            <a:spLocks noGrp="1"/>
-          </p:cNvSpPr>
-          <p:nvPr>
-            <p:ph idx="1"/>
-          </p:nvPr>
-        </p:nvSpPr>
-        <p:spPr/>
-        <p:txBody>
-          <a:bodyPr>
-            <a:normAutofit/>
-          </a:bodyPr>
-          <a:lstStyle/>
-          <a:p>
-            <a:r>
-              <a:rPr lang="es-ES" dirty="0"/>
-              <a:t>Motivación</a:t>
-            </a:r>
-          </a:p>
-          <a:p>
-            <a:r>
-              <a:rPr lang="es-ES" dirty="0"/>
-              <a:t>Objetivos</a:t>
-            </a:r>
-          </a:p>
-          <a:p>
-            <a:r>
-              <a:rPr lang="es-ES" dirty="0"/>
-              <a:t>Plan de trabajo y Temporalización</a:t>
-            </a:r>
-          </a:p>
-          <a:p>
-            <a:r>
-              <a:rPr lang="es-ES" dirty="0"/>
-              <a:t>Tecnologías utilizadas</a:t>
-            </a:r>
-          </a:p>
-          <a:p>
-            <a:r>
-              <a:rPr lang="es-ES" dirty="0"/>
-              <a:t>Prototipo</a:t>
-            </a:r>
-          </a:p>
-          <a:p>
-            <a:r>
-              <a:rPr lang="es-ES" dirty="0"/>
-              <a:t>Base de Datos</a:t>
-            </a:r>
-          </a:p>
-          <a:p>
-            <a:r>
-              <a:rPr lang="es-ES" dirty="0"/>
-              <a:t>Demo</a:t>
-            </a:r>
-          </a:p>
-          <a:p>
-            <a:r>
-              <a:rPr lang="es-ES" dirty="0"/>
-              <a:t>Preguntas</a:t>
-            </a:r>
-          </a:p>
-          <a:p>
-            <a:endParaRPr lang="es-ES" dirty="0"/>
-          </a:p>
-        </p:txBody>
-      </p:sp>
-    </p:spTree>
-    <p:extLst>
-      <p:ext uri="{BB962C8B-B14F-4D97-AF65-F5344CB8AC3E}">
-        <p14:creationId xmlns:p14="http://schemas.microsoft.com/office/powerpoint/2010/main" val="144551678"/>
-      </p:ext>
-    </p:extLst>
-  </p:cSld>
-  <p:clrMapOvr>
-    <a:masterClrMapping/>
-  </p:clrMapOvr>
-</p:sld>
-</file>
-
-<file path=ppt/slides/slide3.xml><?xml version="1.0" encoding="utf-8"?>
-<p:sld xmlns:a="http://schemas.openxmlformats.org/drawingml/2006/main" xmlns:r="http://schemas.openxmlformats.org/officeDocument/2006/relationships" xmlns:p="http://schemas.openxmlformats.org/presentationml/2006/main">
-  <p:cSld>
-    <p:spTree>
-      <p:nvGrpSpPr>
-        <p:cNvPr id="1" name=""/>
-        <p:cNvGrpSpPr/>
-        <p:nvPr/>
-      </p:nvGrpSpPr>
-      <p:grpSpPr>
-        <a:xfrm>
-          <a:off x="0" y="0"/>
-          <a:ext cx="0" cy="0"/>
-          <a:chOff x="0" y="0"/>
-          <a:chExt cx="0" cy="0"/>
-        </a:xfrm>
-      </p:grpSpPr>
-      <p:sp>
-        <p:nvSpPr>
-          <p:cNvPr id="2" name="Título 1">
-            <a:extLst>
-              <a:ext uri="{FF2B5EF4-FFF2-40B4-BE49-F238E27FC236}">
-                <a16:creationId xmlns:a16="http://schemas.microsoft.com/office/drawing/2014/main" id="{4B477183-65D0-E767-F6C6-B8965E5686F5}"/>
-              </a:ext>
-            </a:extLst>
-          </p:cNvPr>
-          <p:cNvSpPr>
-            <a:spLocks noGrp="1"/>
-          </p:cNvSpPr>
-          <p:nvPr>
-            <p:ph type="title"/>
-          </p:nvPr>
-        </p:nvSpPr>
-        <p:spPr/>
-        <p:txBody>
-          <a:bodyPr/>
-          <a:lstStyle/>
-          <a:p>
-            <a:r>
-              <a:rPr lang="es-ES" dirty="0"/>
-              <a:t>Motivación</a:t>
-            </a:r>
-          </a:p>
-        </p:txBody>
-      </p:sp>
-      <p:sp>
-        <p:nvSpPr>
-          <p:cNvPr id="3" name="Marcador de contenido 2">
-            <a:extLst>
-              <a:ext uri="{FF2B5EF4-FFF2-40B4-BE49-F238E27FC236}">
-                <a16:creationId xmlns:a16="http://schemas.microsoft.com/office/drawing/2014/main" id="{515BB6CB-CFA5-D552-71B1-74D84E7D6E5A}"/>
-              </a:ext>
-            </a:extLst>
-          </p:cNvPr>
-          <p:cNvSpPr>
-            <a:spLocks noGrp="1"/>
-          </p:cNvSpPr>
-          <p:nvPr>
-            <p:ph idx="1"/>
-          </p:nvPr>
-        </p:nvSpPr>
-        <p:spPr/>
-        <p:txBody>
-          <a:bodyPr/>
-          <a:lstStyle/>
-          <a:p>
-            <a:r>
-              <a:rPr lang="es-ES" dirty="0"/>
-              <a:t>Este proyecto busca aplicar los conocimientos en:</a:t>
-            </a:r>
-          </a:p>
-          <a:p>
-            <a:pPr marL="742950" lvl="2" indent="-342900"/>
-            <a:r>
-              <a:rPr lang="es-ES" sz="1600" dirty="0"/>
-              <a:t>Diseño</a:t>
-            </a:r>
-          </a:p>
-          <a:p>
-            <a:pPr marL="742950" lvl="2" indent="-342900"/>
-            <a:r>
-              <a:rPr lang="es-ES" sz="1600" dirty="0"/>
-              <a:t>Programación</a:t>
-            </a:r>
-          </a:p>
-          <a:p>
-            <a:pPr marL="742950" lvl="2" indent="-342900"/>
-            <a:r>
-              <a:rPr lang="es-ES" sz="1600" dirty="0"/>
-              <a:t>Despliegue</a:t>
-            </a:r>
-          </a:p>
-          <a:p>
-            <a:r>
-              <a:rPr lang="es-ES" dirty="0"/>
-              <a:t>También busca:</a:t>
-            </a:r>
-          </a:p>
-          <a:p>
-            <a:pPr lvl="1"/>
-            <a:r>
-              <a:rPr lang="es-ES" dirty="0"/>
-              <a:t>Generar un Gestor de Dietas para clientes.</a:t>
-            </a:r>
-          </a:p>
-          <a:p>
-            <a:pPr lvl="1"/>
-            <a:r>
-              <a:rPr lang="es-ES" dirty="0"/>
-              <a:t>Trabajar con nuevas tecnologías.</a:t>
-            </a:r>
-          </a:p>
-        </p:txBody>
-      </p:sp>
-    </p:spTree>
-    <p:extLst>
-      <p:ext uri="{BB962C8B-B14F-4D97-AF65-F5344CB8AC3E}">
-        <p14:creationId xmlns:p14="http://schemas.microsoft.com/office/powerpoint/2010/main" val="4107352885"/>
-      </p:ext>
-    </p:extLst>
-  </p:cSld>
-  <p:clrMapOvr>
-    <a:masterClrMapping/>
-  </p:clrMapOvr>
-</p:sld>
-</file>
-
-<file path=ppt/slides/slide4.xml><?xml version="1.0" encoding="utf-8"?>
-<p:sld xmlns:a="http://schemas.openxmlformats.org/drawingml/2006/main" xmlns:r="http://schemas.openxmlformats.org/officeDocument/2006/relationships" xmlns:p="http://schemas.openxmlformats.org/presentationml/2006/main">
-  <p:cSld>
-    <p:spTree>
-      <p:nvGrpSpPr>
-        <p:cNvPr id="1" name=""/>
-        <p:cNvGrpSpPr/>
-        <p:nvPr/>
-      </p:nvGrpSpPr>
-      <p:grpSpPr>
-        <a:xfrm>
-          <a:off x="0" y="0"/>
-          <a:ext cx="0" cy="0"/>
-          <a:chOff x="0" y="0"/>
-          <a:chExt cx="0" cy="0"/>
-        </a:xfrm>
-      </p:grpSpPr>
-      <p:sp>
-        <p:nvSpPr>
-          <p:cNvPr id="2" name="Título 1">
-            <a:extLst>
-              <a:ext uri="{FF2B5EF4-FFF2-40B4-BE49-F238E27FC236}">
-                <a16:creationId xmlns:a16="http://schemas.microsoft.com/office/drawing/2014/main" id="{EC75CDF1-52C1-3B06-1F0A-6D17F6888232}"/>
-              </a:ext>
-            </a:extLst>
-          </p:cNvPr>
-          <p:cNvSpPr>
-            <a:spLocks noGrp="1"/>
-          </p:cNvSpPr>
-          <p:nvPr>
-            <p:ph type="title"/>
-          </p:nvPr>
-        </p:nvSpPr>
-        <p:spPr/>
-        <p:txBody>
-          <a:bodyPr/>
-          <a:lstStyle/>
-          <a:p>
-            <a:r>
-              <a:rPr lang="es-ES" dirty="0"/>
-              <a:t>Objetivos</a:t>
-            </a:r>
-          </a:p>
-        </p:txBody>
-      </p:sp>
-      <p:sp>
-        <p:nvSpPr>
-          <p:cNvPr id="3" name="Marcador de contenido 2">
-            <a:extLst>
-              <a:ext uri="{FF2B5EF4-FFF2-40B4-BE49-F238E27FC236}">
-                <a16:creationId xmlns:a16="http://schemas.microsoft.com/office/drawing/2014/main" id="{E91C1265-73DF-B355-C494-F5AE5C1690E2}"/>
-              </a:ext>
-            </a:extLst>
-          </p:cNvPr>
-          <p:cNvSpPr>
-            <a:spLocks noGrp="1"/>
-          </p:cNvSpPr>
-          <p:nvPr>
-            <p:ph idx="1"/>
-          </p:nvPr>
-        </p:nvSpPr>
-        <p:spPr/>
-        <p:txBody>
-          <a:bodyPr>
-            <a:normAutofit/>
-          </a:bodyPr>
-          <a:lstStyle/>
-          <a:p>
-            <a:pPr algn="just"/>
-            <a:r>
-              <a:rPr lang="es-ES" sz="1800" b="1" dirty="0">
-                <a:solidFill>
-                  <a:srgbClr val="000000"/>
-                </a:solidFill>
-                <a:effectLst/>
-                <a:latin typeface="Calibri" panose="020F0502020204030204" pitchFamily="34" charset="0"/>
-                <a:ea typeface="Calibri" panose="020F0502020204030204" pitchFamily="34" charset="0"/>
-              </a:rPr>
-              <a:t>A nivel profesional:</a:t>
-            </a:r>
-            <a:endParaRPr lang="es-ES" sz="1800" dirty="0">
-              <a:solidFill>
-                <a:srgbClr val="000000"/>
-              </a:solidFill>
-              <a:effectLst/>
-              <a:latin typeface="Calibri" panose="020F0502020204030204" pitchFamily="34" charset="0"/>
-              <a:ea typeface="Calibri" panose="020F0502020204030204" pitchFamily="34" charset="0"/>
-            </a:endParaRPr>
-          </a:p>
-          <a:p>
-            <a:pPr lvl="1" indent="-342900" algn="just">
-              <a:buFont typeface="Symbol" panose="05050102010706020507" pitchFamily="18" charset="2"/>
-              <a:buChar char=""/>
-            </a:pPr>
-            <a:r>
-              <a:rPr lang="es-ES" dirty="0">
-                <a:solidFill>
-                  <a:srgbClr val="000000"/>
-                </a:solidFill>
-                <a:effectLst/>
-                <a:latin typeface="Calibri" panose="020F0502020204030204" pitchFamily="34" charset="0"/>
-                <a:ea typeface="Calibri" panose="020F0502020204030204" pitchFamily="34" charset="0"/>
-              </a:rPr>
-              <a:t>Desarrollar una aplicación desde el comienzo hasta el final.</a:t>
-            </a:r>
-          </a:p>
-          <a:p>
-            <a:pPr lvl="1" indent="-342900" algn="just">
-              <a:buFont typeface="Symbol" panose="05050102010706020507" pitchFamily="18" charset="2"/>
-              <a:buChar char=""/>
-            </a:pPr>
-            <a:r>
-              <a:rPr lang="es-ES" dirty="0">
-                <a:solidFill>
-                  <a:srgbClr val="000000"/>
-                </a:solidFill>
-                <a:effectLst/>
-                <a:latin typeface="Calibri" panose="020F0502020204030204" pitchFamily="34" charset="0"/>
-                <a:ea typeface="Calibri" panose="020F0502020204030204" pitchFamily="34" charset="0"/>
-              </a:rPr>
-              <a:t>Conocer y utilizar nuevas tecnologías.</a:t>
-            </a:r>
-          </a:p>
-          <a:p>
-            <a:pPr lvl="1" indent="-342900" algn="just">
-              <a:buFont typeface="Symbol" panose="05050102010706020507" pitchFamily="18" charset="2"/>
-              <a:buChar char=""/>
-            </a:pPr>
-            <a:r>
-              <a:rPr lang="es-ES" dirty="0">
-                <a:solidFill>
-                  <a:srgbClr val="000000"/>
-                </a:solidFill>
-                <a:latin typeface="Calibri" panose="020F0502020204030204" pitchFamily="34" charset="0"/>
-                <a:ea typeface="Calibri" panose="020F0502020204030204" pitchFamily="34" charset="0"/>
-              </a:rPr>
-              <a:t>Separar el </a:t>
-            </a:r>
-            <a:r>
-              <a:rPr lang="es-ES" dirty="0" err="1">
-                <a:solidFill>
-                  <a:srgbClr val="000000"/>
-                </a:solidFill>
-                <a:latin typeface="Calibri" panose="020F0502020204030204" pitchFamily="34" charset="0"/>
-                <a:ea typeface="Calibri" panose="020F0502020204030204" pitchFamily="34" charset="0"/>
-              </a:rPr>
-              <a:t>backend</a:t>
-            </a:r>
-            <a:r>
-              <a:rPr lang="es-ES" dirty="0">
-                <a:solidFill>
-                  <a:srgbClr val="000000"/>
-                </a:solidFill>
-                <a:latin typeface="Calibri" panose="020F0502020204030204" pitchFamily="34" charset="0"/>
-                <a:ea typeface="Calibri" panose="020F0502020204030204" pitchFamily="34" charset="0"/>
-              </a:rPr>
-              <a:t> del </a:t>
-            </a:r>
-            <a:r>
-              <a:rPr lang="es-ES" dirty="0" err="1">
-                <a:solidFill>
-                  <a:srgbClr val="000000"/>
-                </a:solidFill>
-                <a:latin typeface="Calibri" panose="020F0502020204030204" pitchFamily="34" charset="0"/>
-                <a:ea typeface="Calibri" panose="020F0502020204030204" pitchFamily="34" charset="0"/>
-              </a:rPr>
-              <a:t>frontend</a:t>
-            </a:r>
-            <a:endParaRPr lang="es-ES" dirty="0">
-              <a:solidFill>
-                <a:srgbClr val="000000"/>
-              </a:solidFill>
-              <a:effectLst/>
-              <a:latin typeface="Calibri" panose="020F0502020204030204" pitchFamily="34" charset="0"/>
-              <a:ea typeface="Calibri" panose="020F0502020204030204" pitchFamily="34" charset="0"/>
-            </a:endParaRPr>
-          </a:p>
-          <a:p>
-            <a:pPr lvl="1" indent="-342900" algn="just">
-              <a:buFont typeface="Symbol" panose="05050102010706020507" pitchFamily="18" charset="2"/>
-              <a:buChar char=""/>
-            </a:pPr>
-            <a:r>
-              <a:rPr lang="es-ES" dirty="0">
-                <a:solidFill>
-                  <a:schemeClr val="accent5"/>
-                </a:solidFill>
-                <a:effectLst/>
-                <a:latin typeface="Calibri" panose="020F0502020204030204" pitchFamily="34" charset="0"/>
-                <a:ea typeface="Calibri" panose="020F0502020204030204" pitchFamily="34" charset="0"/>
-              </a:rPr>
-              <a:t>Desplegar una página web.</a:t>
-            </a:r>
-          </a:p>
-          <a:p>
-            <a:pPr algn="just"/>
-            <a:r>
-              <a:rPr lang="es-ES" sz="1800" b="1" dirty="0">
-                <a:solidFill>
-                  <a:srgbClr val="000000"/>
-                </a:solidFill>
-                <a:effectLst/>
-                <a:latin typeface="Calibri" panose="020F0502020204030204" pitchFamily="34" charset="0"/>
-                <a:ea typeface="Calibri" panose="020F0502020204030204" pitchFamily="34" charset="0"/>
-              </a:rPr>
-              <a:t>A nivel personal:</a:t>
-            </a:r>
-            <a:endParaRPr lang="es-ES" sz="1800" dirty="0">
-              <a:solidFill>
-                <a:srgbClr val="000000"/>
-              </a:solidFill>
-              <a:effectLst/>
-              <a:latin typeface="Calibri" panose="020F0502020204030204" pitchFamily="34" charset="0"/>
-              <a:ea typeface="Calibri" panose="020F0502020204030204" pitchFamily="34" charset="0"/>
-            </a:endParaRPr>
-          </a:p>
-          <a:p>
-            <a:pPr lvl="1" indent="-342900" algn="just">
-              <a:buFont typeface="Symbol" panose="05050102010706020507" pitchFamily="18" charset="2"/>
-              <a:buChar char=""/>
-            </a:pPr>
-            <a:r>
-              <a:rPr lang="es-ES" dirty="0">
-                <a:solidFill>
-                  <a:srgbClr val="000000"/>
-                </a:solidFill>
-                <a:effectLst/>
-                <a:latin typeface="Calibri" panose="020F0502020204030204" pitchFamily="34" charset="0"/>
-                <a:ea typeface="Calibri" panose="020F0502020204030204" pitchFamily="34" charset="0"/>
-              </a:rPr>
-              <a:t>Lidiar con los problemas de trabajar con tecnologías desconocidas.</a:t>
-            </a:r>
-          </a:p>
-          <a:p>
-            <a:pPr lvl="1" indent="-342900" algn="just">
-              <a:buFont typeface="Symbol" panose="05050102010706020507" pitchFamily="18" charset="2"/>
-              <a:buChar char=""/>
-            </a:pPr>
-            <a:r>
-              <a:rPr lang="es-ES" dirty="0">
-                <a:solidFill>
-                  <a:srgbClr val="000000"/>
-                </a:solidFill>
-                <a:effectLst/>
-                <a:latin typeface="Calibri" panose="020F0502020204030204" pitchFamily="34" charset="0"/>
-                <a:ea typeface="Calibri" panose="020F0502020204030204" pitchFamily="34" charset="0"/>
-              </a:rPr>
-              <a:t>Gestionar los tiempos.</a:t>
-            </a:r>
-          </a:p>
-          <a:p>
-            <a:pPr lvl="1" indent="-342900" algn="just">
-              <a:buFont typeface="Symbol" panose="05050102010706020507" pitchFamily="18" charset="2"/>
-              <a:buChar char=""/>
-            </a:pPr>
-            <a:r>
-              <a:rPr lang="es-ES" dirty="0">
-                <a:solidFill>
-                  <a:srgbClr val="000000"/>
-                </a:solidFill>
-                <a:latin typeface="Calibri" panose="020F0502020204030204" pitchFamily="34" charset="0"/>
-                <a:ea typeface="Calibri" panose="020F0502020204030204" pitchFamily="34" charset="0"/>
-              </a:rPr>
-              <a:t>Tener que tomar decisiones.</a:t>
-            </a:r>
-            <a:endParaRPr lang="es-ES" dirty="0">
-              <a:solidFill>
-                <a:srgbClr val="000000"/>
-              </a:solidFill>
-              <a:effectLst/>
-              <a:latin typeface="Calibri" panose="020F0502020204030204" pitchFamily="34" charset="0"/>
-              <a:ea typeface="Calibri" panose="020F0502020204030204" pitchFamily="34" charset="0"/>
-            </a:endParaRPr>
-          </a:p>
-          <a:p>
-            <a:endParaRPr lang="es-ES" dirty="0"/>
-          </a:p>
-        </p:txBody>
-      </p:sp>
-    </p:spTree>
-    <p:extLst>
-      <p:ext uri="{BB962C8B-B14F-4D97-AF65-F5344CB8AC3E}">
-        <p14:creationId xmlns:p14="http://schemas.microsoft.com/office/powerpoint/2010/main" val="1472778878"/>
-      </p:ext>
-    </p:extLst>
-  </p:cSld>
-  <p:clrMapOvr>
-    <a:masterClrMapping/>
-  </p:clrMapOvr>
-</p:sld>
-</file>
-
-<file path=ppt/slides/slide5.xml><?xml version="1.0" encoding="utf-8"?>
-<p:sld xmlns:a="http://schemas.openxmlformats.org/drawingml/2006/main" xmlns:r="http://schemas.openxmlformats.org/officeDocument/2006/relationships" xmlns:p="http://schemas.openxmlformats.org/presentationml/2006/main">
-  <p:cSld>
-    <p:spTree>
-      <p:nvGrpSpPr>
-        <p:cNvPr id="1" name=""/>
-        <p:cNvGrpSpPr/>
-        <p:nvPr/>
-      </p:nvGrpSpPr>
-      <p:grpSpPr>
-        <a:xfrm>
-          <a:off x="0" y="0"/>
-          <a:ext cx="0" cy="0"/>
-          <a:chOff x="0" y="0"/>
-          <a:chExt cx="0" cy="0"/>
-        </a:xfrm>
-      </p:grpSpPr>
-      <p:sp>
-        <p:nvSpPr>
-          <p:cNvPr id="2" name="Título 1">
-            <a:extLst>
-              <a:ext uri="{FF2B5EF4-FFF2-40B4-BE49-F238E27FC236}">
-                <a16:creationId xmlns:a16="http://schemas.microsoft.com/office/drawing/2014/main" id="{8B59851B-67E1-027F-1829-260C3B5518DB}"/>
-              </a:ext>
-            </a:extLst>
-          </p:cNvPr>
-          <p:cNvSpPr>
-            <a:spLocks noGrp="1"/>
-          </p:cNvSpPr>
-          <p:nvPr>
-            <p:ph type="title"/>
-          </p:nvPr>
-        </p:nvSpPr>
-        <p:spPr/>
-        <p:txBody>
-          <a:bodyPr/>
-          <a:lstStyle/>
-          <a:p>
-            <a:r>
-              <a:rPr lang="es-ES" dirty="0"/>
-              <a:t>Plan de trabajo y Temporalización</a:t>
-            </a:r>
-          </a:p>
-        </p:txBody>
-      </p:sp>
-      <p:sp>
-        <p:nvSpPr>
-          <p:cNvPr id="3" name="Marcador de contenido 2">
-            <a:extLst>
-              <a:ext uri="{FF2B5EF4-FFF2-40B4-BE49-F238E27FC236}">
-                <a16:creationId xmlns:a16="http://schemas.microsoft.com/office/drawing/2014/main" id="{4F8C50B0-0470-FF1F-FCAC-069A7FFAADE4}"/>
-              </a:ext>
-            </a:extLst>
-          </p:cNvPr>
-          <p:cNvSpPr>
-            <a:spLocks noGrp="1"/>
-          </p:cNvSpPr>
-          <p:nvPr>
-            <p:ph idx="1"/>
-          </p:nvPr>
-        </p:nvSpPr>
-        <p:spPr/>
-        <p:txBody>
-          <a:bodyPr/>
-          <a:lstStyle/>
-          <a:p>
-            <a:r>
-              <a:rPr lang="es-ES" dirty="0"/>
-              <a:t>El proyecto se ha dividido en las siguientes fases:</a:t>
-            </a:r>
-          </a:p>
-          <a:p>
-            <a:pPr lvl="1" indent="-342900" algn="just">
-              <a:buFont typeface="Symbol" panose="05050102010706020507" pitchFamily="18" charset="2"/>
-              <a:buChar char=""/>
-            </a:pPr>
-            <a:r>
-              <a:rPr lang="es-ES" b="1" dirty="0">
-                <a:solidFill>
-                  <a:srgbClr val="000000"/>
-                </a:solidFill>
-                <a:effectLst/>
-                <a:latin typeface="Calibri" panose="020F0502020204030204" pitchFamily="34" charset="0"/>
-                <a:ea typeface="Calibri" panose="020F0502020204030204" pitchFamily="34" charset="0"/>
-              </a:rPr>
-              <a:t>Análisis (3h)</a:t>
-            </a:r>
-          </a:p>
-          <a:p>
-            <a:pPr lvl="1" indent="-342900" algn="just">
-              <a:buFont typeface="Symbol" panose="05050102010706020507" pitchFamily="18" charset="2"/>
-              <a:buChar char=""/>
-            </a:pPr>
-            <a:r>
-              <a:rPr lang="es-ES" b="1" dirty="0">
-                <a:solidFill>
-                  <a:srgbClr val="000000"/>
-                </a:solidFill>
-                <a:effectLst/>
-                <a:latin typeface="Calibri" panose="020F0502020204030204" pitchFamily="34" charset="0"/>
-                <a:ea typeface="Calibri" panose="020F0502020204030204" pitchFamily="34" charset="0"/>
-              </a:rPr>
-              <a:t>Diseño (20h)</a:t>
-            </a:r>
-          </a:p>
-          <a:p>
-            <a:pPr lvl="1" indent="-342900" algn="just">
-              <a:buFont typeface="Symbol" panose="05050102010706020507" pitchFamily="18" charset="2"/>
-              <a:buChar char=""/>
-            </a:pPr>
-            <a:r>
-              <a:rPr lang="es-ES" b="1" dirty="0">
-                <a:solidFill>
-                  <a:srgbClr val="000000"/>
-                </a:solidFill>
-                <a:effectLst/>
-                <a:latin typeface="Calibri" panose="020F0502020204030204" pitchFamily="34" charset="0"/>
-                <a:ea typeface="Calibri" panose="020F0502020204030204" pitchFamily="34" charset="0"/>
-              </a:rPr>
-              <a:t>Desarrollo (92h total)	</a:t>
-            </a:r>
-          </a:p>
-          <a:p>
-            <a:pPr lvl="2" indent="-342900" algn="just">
-              <a:buFont typeface="Symbol" panose="05050102010706020507" pitchFamily="18" charset="2"/>
-              <a:buChar char=""/>
-            </a:pPr>
-            <a:r>
-              <a:rPr lang="es-ES" b="1" dirty="0">
-                <a:solidFill>
-                  <a:srgbClr val="000000"/>
-                </a:solidFill>
-                <a:latin typeface="Calibri" panose="020F0502020204030204" pitchFamily="34" charset="0"/>
-                <a:ea typeface="Calibri" panose="020F0502020204030204" pitchFamily="34" charset="0"/>
-              </a:rPr>
-              <a:t>Base de Datos (4h)</a:t>
-            </a:r>
-          </a:p>
-          <a:p>
-            <a:pPr lvl="2" indent="-342900" algn="just">
-              <a:buFont typeface="Symbol" panose="05050102010706020507" pitchFamily="18" charset="2"/>
-              <a:buChar char=""/>
-            </a:pPr>
-            <a:r>
-              <a:rPr lang="es-ES" b="1" dirty="0" err="1">
-                <a:solidFill>
-                  <a:srgbClr val="000000"/>
-                </a:solidFill>
-                <a:effectLst/>
-                <a:latin typeface="Calibri" panose="020F0502020204030204" pitchFamily="34" charset="0"/>
-                <a:ea typeface="Calibri" panose="020F0502020204030204" pitchFamily="34" charset="0"/>
-              </a:rPr>
-              <a:t>BackEnd</a:t>
-            </a:r>
-            <a:r>
-              <a:rPr lang="es-ES" b="1" dirty="0">
-                <a:solidFill>
-                  <a:srgbClr val="000000"/>
-                </a:solidFill>
-                <a:effectLst/>
-                <a:latin typeface="Calibri" panose="020F0502020204030204" pitchFamily="34" charset="0"/>
-                <a:ea typeface="Calibri" panose="020F0502020204030204" pitchFamily="34" charset="0"/>
-              </a:rPr>
-              <a:t> (8h)</a:t>
-            </a:r>
-          </a:p>
-          <a:p>
-            <a:pPr lvl="2" indent="-342900" algn="just">
-              <a:buFont typeface="Symbol" panose="05050102010706020507" pitchFamily="18" charset="2"/>
-              <a:buChar char=""/>
-            </a:pPr>
-            <a:r>
-              <a:rPr lang="es-ES" b="1" dirty="0" err="1">
-                <a:solidFill>
-                  <a:srgbClr val="000000"/>
-                </a:solidFill>
-                <a:latin typeface="Calibri" panose="020F0502020204030204" pitchFamily="34" charset="0"/>
-                <a:ea typeface="Calibri" panose="020F0502020204030204" pitchFamily="34" charset="0"/>
-              </a:rPr>
-              <a:t>FrontEnd</a:t>
-            </a:r>
-            <a:r>
-              <a:rPr lang="es-ES" b="1" dirty="0">
-                <a:solidFill>
-                  <a:srgbClr val="000000"/>
-                </a:solidFill>
-                <a:latin typeface="Calibri" panose="020F0502020204030204" pitchFamily="34" charset="0"/>
-                <a:ea typeface="Calibri" panose="020F0502020204030204" pitchFamily="34" charset="0"/>
-              </a:rPr>
-              <a:t> (60h)</a:t>
-            </a:r>
-          </a:p>
-          <a:p>
-            <a:pPr lvl="2" indent="-342900" algn="just">
-              <a:buFont typeface="Symbol" panose="05050102010706020507" pitchFamily="18" charset="2"/>
-              <a:buChar char=""/>
-            </a:pPr>
-            <a:r>
-              <a:rPr lang="es-ES" b="1" dirty="0">
-                <a:solidFill>
-                  <a:srgbClr val="000000"/>
-                </a:solidFill>
-                <a:effectLst/>
-                <a:latin typeface="Calibri" panose="020F0502020204030204" pitchFamily="34" charset="0"/>
-                <a:ea typeface="Calibri" panose="020F0502020204030204" pitchFamily="34" charset="0"/>
-              </a:rPr>
-              <a:t>Corrección de Bugs (20h)</a:t>
-            </a:r>
-          </a:p>
-          <a:p>
-            <a:pPr lvl="1" indent="-342900" algn="just">
-              <a:buFont typeface="Symbol" panose="05050102010706020507" pitchFamily="18" charset="2"/>
-              <a:buChar char=""/>
-            </a:pPr>
-            <a:r>
-              <a:rPr lang="es-ES" b="1" dirty="0">
-                <a:solidFill>
-                  <a:srgbClr val="000000"/>
-                </a:solidFill>
-                <a:effectLst/>
-                <a:latin typeface="Calibri" panose="020F0502020204030204" pitchFamily="34" charset="0"/>
-                <a:ea typeface="Calibri" panose="020F0502020204030204" pitchFamily="34" charset="0"/>
-              </a:rPr>
-              <a:t>Compilación (4h)</a:t>
-            </a:r>
-            <a:endParaRPr lang="es-ES" b="1" dirty="0">
-              <a:solidFill>
-                <a:srgbClr val="000000"/>
-              </a:solidFill>
-              <a:latin typeface="Calibri" panose="020F0502020204030204" pitchFamily="34" charset="0"/>
-              <a:ea typeface="Calibri" panose="020F0502020204030204" pitchFamily="34" charset="0"/>
-            </a:endParaRPr>
-          </a:p>
-          <a:p>
-            <a:pPr lvl="1" indent="-342900" algn="just">
-              <a:buFont typeface="Symbol" panose="05050102010706020507" pitchFamily="18" charset="2"/>
-              <a:buChar char=""/>
-            </a:pPr>
-            <a:r>
-              <a:rPr lang="es-ES" b="1" dirty="0">
-                <a:solidFill>
-                  <a:schemeClr val="accent5"/>
-                </a:solidFill>
-                <a:effectLst/>
-                <a:latin typeface="Calibri" panose="020F0502020204030204" pitchFamily="34" charset="0"/>
-                <a:ea typeface="Calibri" panose="020F0502020204030204" pitchFamily="34" charset="0"/>
-              </a:rPr>
-              <a:t>Despliegue (?¿)</a:t>
-            </a:r>
-            <a:endParaRPr lang="es-ES" dirty="0">
-              <a:solidFill>
-                <a:schemeClr val="accent5"/>
-              </a:solidFill>
-            </a:endParaRPr>
-          </a:p>
-        </p:txBody>
-      </p:sp>
-    </p:spTree>
-    <p:extLst>
-      <p:ext uri="{BB962C8B-B14F-4D97-AF65-F5344CB8AC3E}">
-        <p14:creationId xmlns:p14="http://schemas.microsoft.com/office/powerpoint/2010/main" val="1052401113"/>
-      </p:ext>
-    </p:extLst>
-  </p:cSld>
-  <p:clrMapOvr>
-    <a:masterClrMapping/>
-  </p:clrMapOvr>
-</p:sld>
-</file>
-
-<file path=ppt/slides/slide6.xml><?xml version="1.0" encoding="utf-8"?>
-<p:sld xmlns:a="http://schemas.openxmlformats.org/drawingml/2006/main" xmlns:r="http://schemas.openxmlformats.org/officeDocument/2006/relationships" xmlns:p="http://schemas.openxmlformats.org/presentationml/2006/main">
-  <p:cSld>
-    <p:spTree>
-      <p:nvGrpSpPr>
-        <p:cNvPr id="1" name=""/>
-        <p:cNvGrpSpPr/>
-        <p:nvPr/>
-      </p:nvGrpSpPr>
-      <p:grpSpPr>
-        <a:xfrm>
-          <a:off x="0" y="0"/>
-          <a:ext cx="0" cy="0"/>
-          <a:chOff x="0" y="0"/>
-          <a:chExt cx="0" cy="0"/>
-        </a:xfrm>
-      </p:grpSpPr>
-      <p:sp>
-        <p:nvSpPr>
           <p:cNvPr id="6" name="Marcador de contenido 2">
             <a:extLst>
               <a:ext uri="{FF2B5EF4-FFF2-40B4-BE49-F238E27FC236}">
@@ -8855,8 +8060,8 @@
         </p:blipFill>
         <p:spPr bwMode="auto">
           <a:xfrm>
-            <a:off x="9486995" y="2773488"/>
-            <a:ext cx="1873179" cy="1572204"/>
+            <a:off x="10272655" y="3537145"/>
+            <a:ext cx="1161088" cy="974529"/>
           </a:xfrm>
           <a:prstGeom prst="rect">
             <a:avLst/>
@@ -9426,6 +8631,53 @@
           </a:extLst>
         </p:spPr>
       </p:pic>
+      <p:pic>
+        <p:nvPicPr>
+          <p:cNvPr id="9" name="Picture 2">
+            <a:extLst>
+              <a:ext uri="{FF2B5EF4-FFF2-40B4-BE49-F238E27FC236}">
+                <a16:creationId xmlns:a16="http://schemas.microsoft.com/office/drawing/2014/main" id="{17F3CBF6-FC5B-623B-9EAF-56D2D29F0420}"/>
+              </a:ext>
+            </a:extLst>
+          </p:cNvPr>
+          <p:cNvPicPr>
+            <a:picLocks noChangeAspect="1" noChangeArrowheads="1"/>
+          </p:cNvPicPr>
+          <p:nvPr/>
+        </p:nvPicPr>
+        <p:blipFill>
+          <a:blip r:embed="rId17">
+            <a:extLst>
+              <a:ext uri="{28A0092B-C50C-407E-A947-70E740481C1C}">
+                <a14:useLocalDpi xmlns:a14="http://schemas.microsoft.com/office/drawing/2010/main" val="0"/>
+              </a:ext>
+            </a:extLst>
+          </a:blip>
+          <a:srcRect/>
+          <a:stretch>
+            <a:fillRect/>
+          </a:stretch>
+        </p:blipFill>
+        <p:spPr bwMode="auto">
+          <a:xfrm>
+            <a:off x="9338441" y="2658490"/>
+            <a:ext cx="1285319" cy="1285319"/>
+          </a:xfrm>
+          <a:prstGeom prst="rect">
+            <a:avLst/>
+          </a:prstGeom>
+          <a:noFill/>
+          <a:extLst>
+            <a:ext uri="{909E8E84-426E-40DD-AFC4-6F175D3DCCD1}">
+              <a14:hiddenFill xmlns:a14="http://schemas.microsoft.com/office/drawing/2010/main">
+                <a:solidFill>
+                  <a:srgbClr val="FFFFFF"/>
+                </a:solidFill>
+              </a14:hiddenFill>
+            </a:ext>
+          </a:extLst>
+        </p:spPr>
+      </p:pic>
     </p:spTree>
     <p:extLst>
       <p:ext uri="{BB962C8B-B14F-4D97-AF65-F5344CB8AC3E}">
@@ -9439,7 +8691,194 @@
 </p:sld>
 </file>
 
-<file path=ppt/slides/slide7.xml><?xml version="1.0" encoding="utf-8"?>
+<file path=ppt/slides/slide11.xml><?xml version="1.0" encoding="utf-8"?>
+<p:sld xmlns:a="http://schemas.openxmlformats.org/drawingml/2006/main" xmlns:r="http://schemas.openxmlformats.org/officeDocument/2006/relationships" xmlns:p="http://schemas.openxmlformats.org/presentationml/2006/main">
+  <p:cSld>
+    <p:spTree>
+      <p:nvGrpSpPr>
+        <p:cNvPr id="1" name=""/>
+        <p:cNvGrpSpPr/>
+        <p:nvPr/>
+      </p:nvGrpSpPr>
+      <p:grpSpPr>
+        <a:xfrm>
+          <a:off x="0" y="0"/>
+          <a:ext cx="0" cy="0"/>
+          <a:chOff x="0" y="0"/>
+          <a:chExt cx="0" cy="0"/>
+        </a:xfrm>
+      </p:grpSpPr>
+      <p:sp>
+        <p:nvSpPr>
+          <p:cNvPr id="2" name="Título 1">
+            <a:extLst>
+              <a:ext uri="{FF2B5EF4-FFF2-40B4-BE49-F238E27FC236}">
+                <a16:creationId xmlns:a16="http://schemas.microsoft.com/office/drawing/2014/main" id="{A91E6ED1-188B-76DC-341C-CE194FBB672B}"/>
+              </a:ext>
+            </a:extLst>
+          </p:cNvPr>
+          <p:cNvSpPr>
+            <a:spLocks noGrp="1"/>
+          </p:cNvSpPr>
+          <p:nvPr>
+            <p:ph type="title"/>
+          </p:nvPr>
+        </p:nvSpPr>
+        <p:spPr/>
+        <p:txBody>
+          <a:bodyPr/>
+          <a:lstStyle/>
+          <a:p>
+            <a:r>
+              <a:rPr lang="es-ES" dirty="0"/>
+              <a:t>Índice</a:t>
+            </a:r>
+          </a:p>
+        </p:txBody>
+      </p:sp>
+      <p:sp>
+        <p:nvSpPr>
+          <p:cNvPr id="3" name="Marcador de contenido 2">
+            <a:extLst>
+              <a:ext uri="{FF2B5EF4-FFF2-40B4-BE49-F238E27FC236}">
+                <a16:creationId xmlns:a16="http://schemas.microsoft.com/office/drawing/2014/main" id="{78669549-A335-3A34-3C1D-213FB03C61FD}"/>
+              </a:ext>
+            </a:extLst>
+          </p:cNvPr>
+          <p:cNvSpPr>
+            <a:spLocks noGrp="1"/>
+          </p:cNvSpPr>
+          <p:nvPr>
+            <p:ph idx="1"/>
+          </p:nvPr>
+        </p:nvSpPr>
+        <p:spPr/>
+        <p:txBody>
+          <a:bodyPr>
+            <a:normAutofit/>
+          </a:bodyPr>
+          <a:lstStyle/>
+          <a:p>
+            <a:r>
+              <a:rPr lang="es-ES" dirty="0">
+                <a:solidFill>
+                  <a:schemeClr val="bg2">
+                    <a:lumMod val="75000"/>
+                  </a:schemeClr>
+                </a:solidFill>
+              </a:rPr>
+              <a:t>Motivación</a:t>
+            </a:r>
+          </a:p>
+          <a:p>
+            <a:r>
+              <a:rPr lang="es-ES" dirty="0">
+                <a:solidFill>
+                  <a:schemeClr val="bg2">
+                    <a:lumMod val="75000"/>
+                  </a:schemeClr>
+                </a:solidFill>
+              </a:rPr>
+              <a:t>Objetivos</a:t>
+            </a:r>
+          </a:p>
+          <a:p>
+            <a:r>
+              <a:rPr lang="es-ES" dirty="0">
+                <a:solidFill>
+                  <a:schemeClr val="bg2">
+                    <a:lumMod val="75000"/>
+                  </a:schemeClr>
+                </a:solidFill>
+              </a:rPr>
+              <a:t>Plan de trabajo y Temporalización</a:t>
+            </a:r>
+          </a:p>
+          <a:p>
+            <a:r>
+              <a:rPr lang="es-ES" dirty="0">
+                <a:solidFill>
+                  <a:schemeClr val="bg2">
+                    <a:lumMod val="75000"/>
+                  </a:schemeClr>
+                </a:solidFill>
+              </a:rPr>
+              <a:t>Tecnologías utilizadas</a:t>
+            </a:r>
+          </a:p>
+          <a:p>
+            <a:r>
+              <a:rPr lang="es-ES" sz="2400" dirty="0"/>
+              <a:t>Prototipo</a:t>
+            </a:r>
+          </a:p>
+          <a:p>
+            <a:r>
+              <a:rPr lang="es-ES" dirty="0">
+                <a:solidFill>
+                  <a:schemeClr val="bg2">
+                    <a:lumMod val="75000"/>
+                  </a:schemeClr>
+                </a:solidFill>
+              </a:rPr>
+              <a:t>Base de Datos</a:t>
+            </a:r>
+          </a:p>
+          <a:p>
+            <a:r>
+              <a:rPr lang="es-ES" dirty="0">
+                <a:solidFill>
+                  <a:schemeClr val="bg2">
+                    <a:lumMod val="75000"/>
+                  </a:schemeClr>
+                </a:solidFill>
+              </a:rPr>
+              <a:t>Demo</a:t>
+            </a:r>
+          </a:p>
+          <a:p>
+            <a:r>
+              <a:rPr lang="es-ES" dirty="0">
+                <a:solidFill>
+                  <a:schemeClr val="bg2">
+                    <a:lumMod val="75000"/>
+                  </a:schemeClr>
+                </a:solidFill>
+              </a:rPr>
+              <a:t>Conclusiones</a:t>
+            </a:r>
+          </a:p>
+          <a:p>
+            <a:r>
+              <a:rPr lang="es-ES" dirty="0">
+                <a:solidFill>
+                  <a:schemeClr val="bg2">
+                    <a:lumMod val="75000"/>
+                  </a:schemeClr>
+                </a:solidFill>
+              </a:rPr>
+              <a:t>Preguntas</a:t>
+            </a:r>
+          </a:p>
+          <a:p>
+            <a:endParaRPr lang="es-ES" dirty="0"/>
+          </a:p>
+        </p:txBody>
+      </p:sp>
+    </p:spTree>
+    <p:extLst>
+      <p:ext uri="{BB962C8B-B14F-4D97-AF65-F5344CB8AC3E}">
+        <p14:creationId xmlns:p14="http://schemas.microsoft.com/office/powerpoint/2010/main" val="585227700"/>
+      </p:ext>
+    </p:extLst>
+  </p:cSld>
+  <p:clrMapOvr>
+    <a:masterClrMapping/>
+  </p:clrMapOvr>
+</p:sld>
+</file>
+
+<file path=ppt/slides/slide12.xml><?xml version="1.0" encoding="utf-8"?>
 <p:sld xmlns:a="http://schemas.openxmlformats.org/drawingml/2006/main" xmlns:r="http://schemas.openxmlformats.org/officeDocument/2006/relationships" xmlns:p="http://schemas.openxmlformats.org/presentationml/2006/main">
   <p:cSld>
     <p:spTree>
@@ -9850,7 +9289,194 @@
 </p:sld>
 </file>
 
-<file path=ppt/slides/slide8.xml><?xml version="1.0" encoding="utf-8"?>
+<file path=ppt/slides/slide13.xml><?xml version="1.0" encoding="utf-8"?>
+<p:sld xmlns:a="http://schemas.openxmlformats.org/drawingml/2006/main" xmlns:r="http://schemas.openxmlformats.org/officeDocument/2006/relationships" xmlns:p="http://schemas.openxmlformats.org/presentationml/2006/main">
+  <p:cSld>
+    <p:spTree>
+      <p:nvGrpSpPr>
+        <p:cNvPr id="1" name=""/>
+        <p:cNvGrpSpPr/>
+        <p:nvPr/>
+      </p:nvGrpSpPr>
+      <p:grpSpPr>
+        <a:xfrm>
+          <a:off x="0" y="0"/>
+          <a:ext cx="0" cy="0"/>
+          <a:chOff x="0" y="0"/>
+          <a:chExt cx="0" cy="0"/>
+        </a:xfrm>
+      </p:grpSpPr>
+      <p:sp>
+        <p:nvSpPr>
+          <p:cNvPr id="2" name="Título 1">
+            <a:extLst>
+              <a:ext uri="{FF2B5EF4-FFF2-40B4-BE49-F238E27FC236}">
+                <a16:creationId xmlns:a16="http://schemas.microsoft.com/office/drawing/2014/main" id="{A91E6ED1-188B-76DC-341C-CE194FBB672B}"/>
+              </a:ext>
+            </a:extLst>
+          </p:cNvPr>
+          <p:cNvSpPr>
+            <a:spLocks noGrp="1"/>
+          </p:cNvSpPr>
+          <p:nvPr>
+            <p:ph type="title"/>
+          </p:nvPr>
+        </p:nvSpPr>
+        <p:spPr/>
+        <p:txBody>
+          <a:bodyPr/>
+          <a:lstStyle/>
+          <a:p>
+            <a:r>
+              <a:rPr lang="es-ES" dirty="0"/>
+              <a:t>Índice</a:t>
+            </a:r>
+          </a:p>
+        </p:txBody>
+      </p:sp>
+      <p:sp>
+        <p:nvSpPr>
+          <p:cNvPr id="3" name="Marcador de contenido 2">
+            <a:extLst>
+              <a:ext uri="{FF2B5EF4-FFF2-40B4-BE49-F238E27FC236}">
+                <a16:creationId xmlns:a16="http://schemas.microsoft.com/office/drawing/2014/main" id="{78669549-A335-3A34-3C1D-213FB03C61FD}"/>
+              </a:ext>
+            </a:extLst>
+          </p:cNvPr>
+          <p:cNvSpPr>
+            <a:spLocks noGrp="1"/>
+          </p:cNvSpPr>
+          <p:nvPr>
+            <p:ph idx="1"/>
+          </p:nvPr>
+        </p:nvSpPr>
+        <p:spPr/>
+        <p:txBody>
+          <a:bodyPr>
+            <a:normAutofit/>
+          </a:bodyPr>
+          <a:lstStyle/>
+          <a:p>
+            <a:r>
+              <a:rPr lang="es-ES" dirty="0">
+                <a:solidFill>
+                  <a:schemeClr val="bg2">
+                    <a:lumMod val="75000"/>
+                  </a:schemeClr>
+                </a:solidFill>
+              </a:rPr>
+              <a:t>Motivación</a:t>
+            </a:r>
+          </a:p>
+          <a:p>
+            <a:r>
+              <a:rPr lang="es-ES" dirty="0">
+                <a:solidFill>
+                  <a:schemeClr val="bg2">
+                    <a:lumMod val="75000"/>
+                  </a:schemeClr>
+                </a:solidFill>
+              </a:rPr>
+              <a:t>Objetivos</a:t>
+            </a:r>
+          </a:p>
+          <a:p>
+            <a:r>
+              <a:rPr lang="es-ES" dirty="0">
+                <a:solidFill>
+                  <a:schemeClr val="bg2">
+                    <a:lumMod val="75000"/>
+                  </a:schemeClr>
+                </a:solidFill>
+              </a:rPr>
+              <a:t>Plan de trabajo y Temporalización</a:t>
+            </a:r>
+          </a:p>
+          <a:p>
+            <a:r>
+              <a:rPr lang="es-ES" dirty="0">
+                <a:solidFill>
+                  <a:schemeClr val="bg2">
+                    <a:lumMod val="75000"/>
+                  </a:schemeClr>
+                </a:solidFill>
+              </a:rPr>
+              <a:t>Tecnologías utilizadas</a:t>
+            </a:r>
+          </a:p>
+          <a:p>
+            <a:r>
+              <a:rPr lang="es-ES" dirty="0">
+                <a:solidFill>
+                  <a:schemeClr val="bg2">
+                    <a:lumMod val="75000"/>
+                  </a:schemeClr>
+                </a:solidFill>
+              </a:rPr>
+              <a:t>Prototipo</a:t>
+            </a:r>
+          </a:p>
+          <a:p>
+            <a:r>
+              <a:rPr lang="es-ES" sz="2400" dirty="0"/>
+              <a:t>Base de Datos</a:t>
+            </a:r>
+          </a:p>
+          <a:p>
+            <a:r>
+              <a:rPr lang="es-ES" dirty="0">
+                <a:solidFill>
+                  <a:schemeClr val="bg2">
+                    <a:lumMod val="75000"/>
+                  </a:schemeClr>
+                </a:solidFill>
+              </a:rPr>
+              <a:t>Demo</a:t>
+            </a:r>
+          </a:p>
+          <a:p>
+            <a:r>
+              <a:rPr lang="es-ES" dirty="0">
+                <a:solidFill>
+                  <a:schemeClr val="bg2">
+                    <a:lumMod val="75000"/>
+                  </a:schemeClr>
+                </a:solidFill>
+              </a:rPr>
+              <a:t>Conclusiones</a:t>
+            </a:r>
+          </a:p>
+          <a:p>
+            <a:r>
+              <a:rPr lang="es-ES" dirty="0">
+                <a:solidFill>
+                  <a:schemeClr val="bg2">
+                    <a:lumMod val="75000"/>
+                  </a:schemeClr>
+                </a:solidFill>
+              </a:rPr>
+              <a:t>Preguntas</a:t>
+            </a:r>
+          </a:p>
+          <a:p>
+            <a:endParaRPr lang="es-ES" dirty="0"/>
+          </a:p>
+        </p:txBody>
+      </p:sp>
+    </p:spTree>
+    <p:extLst>
+      <p:ext uri="{BB962C8B-B14F-4D97-AF65-F5344CB8AC3E}">
+        <p14:creationId xmlns:p14="http://schemas.microsoft.com/office/powerpoint/2010/main" val="2427219398"/>
+      </p:ext>
+    </p:extLst>
+  </p:cSld>
+  <p:clrMapOvr>
+    <a:masterClrMapping/>
+  </p:clrMapOvr>
+</p:sld>
+</file>
+
+<file path=ppt/slides/slide14.xml><?xml version="1.0" encoding="utf-8"?>
 <p:sld xmlns:a="http://schemas.openxmlformats.org/drawingml/2006/main" xmlns:r="http://schemas.openxmlformats.org/officeDocument/2006/relationships" xmlns:p="http://schemas.openxmlformats.org/presentationml/2006/main">
   <p:cSld>
     <p:spTree>
@@ -9943,6 +9569,2258 @@
 </p:sld>
 </file>
 
+<file path=ppt/slides/slide15.xml><?xml version="1.0" encoding="utf-8"?>
+<p:sld xmlns:a="http://schemas.openxmlformats.org/drawingml/2006/main" xmlns:r="http://schemas.openxmlformats.org/officeDocument/2006/relationships" xmlns:p="http://schemas.openxmlformats.org/presentationml/2006/main">
+  <p:cSld>
+    <p:spTree>
+      <p:nvGrpSpPr>
+        <p:cNvPr id="1" name=""/>
+        <p:cNvGrpSpPr/>
+        <p:nvPr/>
+      </p:nvGrpSpPr>
+      <p:grpSpPr>
+        <a:xfrm>
+          <a:off x="0" y="0"/>
+          <a:ext cx="0" cy="0"/>
+          <a:chOff x="0" y="0"/>
+          <a:chExt cx="0" cy="0"/>
+        </a:xfrm>
+      </p:grpSpPr>
+      <p:sp>
+        <p:nvSpPr>
+          <p:cNvPr id="2" name="Título 1">
+            <a:extLst>
+              <a:ext uri="{FF2B5EF4-FFF2-40B4-BE49-F238E27FC236}">
+                <a16:creationId xmlns:a16="http://schemas.microsoft.com/office/drawing/2014/main" id="{A91E6ED1-188B-76DC-341C-CE194FBB672B}"/>
+              </a:ext>
+            </a:extLst>
+          </p:cNvPr>
+          <p:cNvSpPr>
+            <a:spLocks noGrp="1"/>
+          </p:cNvSpPr>
+          <p:nvPr>
+            <p:ph type="title"/>
+          </p:nvPr>
+        </p:nvSpPr>
+        <p:spPr/>
+        <p:txBody>
+          <a:bodyPr/>
+          <a:lstStyle/>
+          <a:p>
+            <a:r>
+              <a:rPr lang="es-ES" dirty="0"/>
+              <a:t>Índice</a:t>
+            </a:r>
+          </a:p>
+        </p:txBody>
+      </p:sp>
+      <p:sp>
+        <p:nvSpPr>
+          <p:cNvPr id="3" name="Marcador de contenido 2">
+            <a:extLst>
+              <a:ext uri="{FF2B5EF4-FFF2-40B4-BE49-F238E27FC236}">
+                <a16:creationId xmlns:a16="http://schemas.microsoft.com/office/drawing/2014/main" id="{78669549-A335-3A34-3C1D-213FB03C61FD}"/>
+              </a:ext>
+            </a:extLst>
+          </p:cNvPr>
+          <p:cNvSpPr>
+            <a:spLocks noGrp="1"/>
+          </p:cNvSpPr>
+          <p:nvPr>
+            <p:ph idx="1"/>
+          </p:nvPr>
+        </p:nvSpPr>
+        <p:spPr/>
+        <p:txBody>
+          <a:bodyPr>
+            <a:normAutofit/>
+          </a:bodyPr>
+          <a:lstStyle/>
+          <a:p>
+            <a:r>
+              <a:rPr lang="es-ES" dirty="0">
+                <a:solidFill>
+                  <a:schemeClr val="bg2">
+                    <a:lumMod val="75000"/>
+                  </a:schemeClr>
+                </a:solidFill>
+              </a:rPr>
+              <a:t>Motivación</a:t>
+            </a:r>
+          </a:p>
+          <a:p>
+            <a:r>
+              <a:rPr lang="es-ES" dirty="0">
+                <a:solidFill>
+                  <a:schemeClr val="bg2">
+                    <a:lumMod val="75000"/>
+                  </a:schemeClr>
+                </a:solidFill>
+              </a:rPr>
+              <a:t>Objetivos</a:t>
+            </a:r>
+          </a:p>
+          <a:p>
+            <a:r>
+              <a:rPr lang="es-ES" dirty="0">
+                <a:solidFill>
+                  <a:schemeClr val="bg2">
+                    <a:lumMod val="75000"/>
+                  </a:schemeClr>
+                </a:solidFill>
+              </a:rPr>
+              <a:t>Plan de trabajo y Temporalización</a:t>
+            </a:r>
+          </a:p>
+          <a:p>
+            <a:r>
+              <a:rPr lang="es-ES" dirty="0">
+                <a:solidFill>
+                  <a:schemeClr val="bg2">
+                    <a:lumMod val="75000"/>
+                  </a:schemeClr>
+                </a:solidFill>
+              </a:rPr>
+              <a:t>Tecnologías utilizadas</a:t>
+            </a:r>
+          </a:p>
+          <a:p>
+            <a:r>
+              <a:rPr lang="es-ES" dirty="0">
+                <a:solidFill>
+                  <a:schemeClr val="bg2">
+                    <a:lumMod val="75000"/>
+                  </a:schemeClr>
+                </a:solidFill>
+              </a:rPr>
+              <a:t>Prototipo</a:t>
+            </a:r>
+          </a:p>
+          <a:p>
+            <a:r>
+              <a:rPr lang="es-ES" dirty="0">
+                <a:solidFill>
+                  <a:schemeClr val="bg2">
+                    <a:lumMod val="75000"/>
+                  </a:schemeClr>
+                </a:solidFill>
+              </a:rPr>
+              <a:t>Base de Datos</a:t>
+            </a:r>
+          </a:p>
+          <a:p>
+            <a:r>
+              <a:rPr lang="es-ES" sz="2400" dirty="0"/>
+              <a:t>Demo</a:t>
+            </a:r>
+          </a:p>
+          <a:p>
+            <a:r>
+              <a:rPr lang="es-ES" dirty="0">
+                <a:solidFill>
+                  <a:schemeClr val="bg2">
+                    <a:lumMod val="75000"/>
+                  </a:schemeClr>
+                </a:solidFill>
+              </a:rPr>
+              <a:t>Conclusiones</a:t>
+            </a:r>
+          </a:p>
+          <a:p>
+            <a:r>
+              <a:rPr lang="es-ES" dirty="0">
+                <a:solidFill>
+                  <a:schemeClr val="bg2">
+                    <a:lumMod val="75000"/>
+                  </a:schemeClr>
+                </a:solidFill>
+              </a:rPr>
+              <a:t>Preguntas</a:t>
+            </a:r>
+          </a:p>
+          <a:p>
+            <a:endParaRPr lang="es-ES" dirty="0"/>
+          </a:p>
+        </p:txBody>
+      </p:sp>
+    </p:spTree>
+    <p:extLst>
+      <p:ext uri="{BB962C8B-B14F-4D97-AF65-F5344CB8AC3E}">
+        <p14:creationId xmlns:p14="http://schemas.microsoft.com/office/powerpoint/2010/main" val="2374758224"/>
+      </p:ext>
+    </p:extLst>
+  </p:cSld>
+  <p:clrMapOvr>
+    <a:masterClrMapping/>
+  </p:clrMapOvr>
+</p:sld>
+</file>
+
+<file path=ppt/slides/slide16.xml><?xml version="1.0" encoding="utf-8"?>
+<p:sld xmlns:a="http://schemas.openxmlformats.org/drawingml/2006/main" xmlns:r="http://schemas.openxmlformats.org/officeDocument/2006/relationships" xmlns:p="http://schemas.openxmlformats.org/presentationml/2006/main">
+  <p:cSld>
+    <p:spTree>
+      <p:nvGrpSpPr>
+        <p:cNvPr id="1" name=""/>
+        <p:cNvGrpSpPr/>
+        <p:nvPr/>
+      </p:nvGrpSpPr>
+      <p:grpSpPr>
+        <a:xfrm>
+          <a:off x="0" y="0"/>
+          <a:ext cx="0" cy="0"/>
+          <a:chOff x="0" y="0"/>
+          <a:chExt cx="0" cy="0"/>
+        </a:xfrm>
+      </p:grpSpPr>
+      <p:sp>
+        <p:nvSpPr>
+          <p:cNvPr id="2" name="Título 1">
+            <a:extLst>
+              <a:ext uri="{FF2B5EF4-FFF2-40B4-BE49-F238E27FC236}">
+                <a16:creationId xmlns:a16="http://schemas.microsoft.com/office/drawing/2014/main" id="{D986E5BC-5F83-73C7-C180-DA40CF7220B8}"/>
+              </a:ext>
+            </a:extLst>
+          </p:cNvPr>
+          <p:cNvSpPr>
+            <a:spLocks noGrp="1"/>
+          </p:cNvSpPr>
+          <p:nvPr>
+            <p:ph type="title"/>
+          </p:nvPr>
+        </p:nvSpPr>
+        <p:spPr/>
+        <p:txBody>
+          <a:bodyPr/>
+          <a:lstStyle/>
+          <a:p>
+            <a:r>
+              <a:rPr lang="es-ES" dirty="0"/>
+              <a:t>Demo</a:t>
+            </a:r>
+          </a:p>
+        </p:txBody>
+      </p:sp>
+      <p:sp>
+        <p:nvSpPr>
+          <p:cNvPr id="3" name="Marcador de contenido 2">
+            <a:extLst>
+              <a:ext uri="{FF2B5EF4-FFF2-40B4-BE49-F238E27FC236}">
+                <a16:creationId xmlns:a16="http://schemas.microsoft.com/office/drawing/2014/main" id="{B925B571-44AD-9500-5DE4-637EE8EC8A0C}"/>
+              </a:ext>
+            </a:extLst>
+          </p:cNvPr>
+          <p:cNvSpPr>
+            <a:spLocks noGrp="1"/>
+          </p:cNvSpPr>
+          <p:nvPr>
+            <p:ph idx="1"/>
+          </p:nvPr>
+        </p:nvSpPr>
+        <p:spPr/>
+        <p:txBody>
+          <a:bodyPr/>
+          <a:lstStyle/>
+          <a:p>
+            <a:r>
+              <a:rPr lang="es-ES" dirty="0"/>
+              <a:t>Ahora procederé a mostrar una demo de la aplicación y su funcionamiento</a:t>
+            </a:r>
+          </a:p>
+          <a:p>
+            <a:pPr marL="0" indent="0">
+              <a:buNone/>
+            </a:pPr>
+            <a:endParaRPr lang="es-ES" dirty="0"/>
+          </a:p>
+        </p:txBody>
+      </p:sp>
+    </p:spTree>
+    <p:extLst>
+      <p:ext uri="{BB962C8B-B14F-4D97-AF65-F5344CB8AC3E}">
+        <p14:creationId xmlns:p14="http://schemas.microsoft.com/office/powerpoint/2010/main" val="1928398243"/>
+      </p:ext>
+    </p:extLst>
+  </p:cSld>
+  <p:clrMapOvr>
+    <a:masterClrMapping/>
+  </p:clrMapOvr>
+</p:sld>
+</file>
+
+<file path=ppt/slides/slide17.xml><?xml version="1.0" encoding="utf-8"?>
+<p:sld xmlns:a="http://schemas.openxmlformats.org/drawingml/2006/main" xmlns:r="http://schemas.openxmlformats.org/officeDocument/2006/relationships" xmlns:p="http://schemas.openxmlformats.org/presentationml/2006/main">
+  <p:cSld>
+    <p:spTree>
+      <p:nvGrpSpPr>
+        <p:cNvPr id="1" name=""/>
+        <p:cNvGrpSpPr/>
+        <p:nvPr/>
+      </p:nvGrpSpPr>
+      <p:grpSpPr>
+        <a:xfrm>
+          <a:off x="0" y="0"/>
+          <a:ext cx="0" cy="0"/>
+          <a:chOff x="0" y="0"/>
+          <a:chExt cx="0" cy="0"/>
+        </a:xfrm>
+      </p:grpSpPr>
+      <p:sp>
+        <p:nvSpPr>
+          <p:cNvPr id="2" name="Título 1">
+            <a:extLst>
+              <a:ext uri="{FF2B5EF4-FFF2-40B4-BE49-F238E27FC236}">
+                <a16:creationId xmlns:a16="http://schemas.microsoft.com/office/drawing/2014/main" id="{A91E6ED1-188B-76DC-341C-CE194FBB672B}"/>
+              </a:ext>
+            </a:extLst>
+          </p:cNvPr>
+          <p:cNvSpPr>
+            <a:spLocks noGrp="1"/>
+          </p:cNvSpPr>
+          <p:nvPr>
+            <p:ph type="title"/>
+          </p:nvPr>
+        </p:nvSpPr>
+        <p:spPr/>
+        <p:txBody>
+          <a:bodyPr/>
+          <a:lstStyle/>
+          <a:p>
+            <a:r>
+              <a:rPr lang="es-ES" dirty="0"/>
+              <a:t>Índice</a:t>
+            </a:r>
+          </a:p>
+        </p:txBody>
+      </p:sp>
+      <p:sp>
+        <p:nvSpPr>
+          <p:cNvPr id="3" name="Marcador de contenido 2">
+            <a:extLst>
+              <a:ext uri="{FF2B5EF4-FFF2-40B4-BE49-F238E27FC236}">
+                <a16:creationId xmlns:a16="http://schemas.microsoft.com/office/drawing/2014/main" id="{78669549-A335-3A34-3C1D-213FB03C61FD}"/>
+              </a:ext>
+            </a:extLst>
+          </p:cNvPr>
+          <p:cNvSpPr>
+            <a:spLocks noGrp="1"/>
+          </p:cNvSpPr>
+          <p:nvPr>
+            <p:ph idx="1"/>
+          </p:nvPr>
+        </p:nvSpPr>
+        <p:spPr/>
+        <p:txBody>
+          <a:bodyPr>
+            <a:normAutofit/>
+          </a:bodyPr>
+          <a:lstStyle/>
+          <a:p>
+            <a:r>
+              <a:rPr lang="es-ES" dirty="0">
+                <a:solidFill>
+                  <a:schemeClr val="bg2">
+                    <a:lumMod val="75000"/>
+                  </a:schemeClr>
+                </a:solidFill>
+              </a:rPr>
+              <a:t>Motivación</a:t>
+            </a:r>
+          </a:p>
+          <a:p>
+            <a:r>
+              <a:rPr lang="es-ES" dirty="0">
+                <a:solidFill>
+                  <a:schemeClr val="bg2">
+                    <a:lumMod val="75000"/>
+                  </a:schemeClr>
+                </a:solidFill>
+              </a:rPr>
+              <a:t>Objetivos</a:t>
+            </a:r>
+          </a:p>
+          <a:p>
+            <a:r>
+              <a:rPr lang="es-ES" dirty="0">
+                <a:solidFill>
+                  <a:schemeClr val="bg2">
+                    <a:lumMod val="75000"/>
+                  </a:schemeClr>
+                </a:solidFill>
+              </a:rPr>
+              <a:t>Plan de trabajo y Temporalización</a:t>
+            </a:r>
+          </a:p>
+          <a:p>
+            <a:r>
+              <a:rPr lang="es-ES" dirty="0">
+                <a:solidFill>
+                  <a:schemeClr val="bg2">
+                    <a:lumMod val="75000"/>
+                  </a:schemeClr>
+                </a:solidFill>
+              </a:rPr>
+              <a:t>Tecnologías utilizadas</a:t>
+            </a:r>
+          </a:p>
+          <a:p>
+            <a:r>
+              <a:rPr lang="es-ES" dirty="0">
+                <a:solidFill>
+                  <a:schemeClr val="bg2">
+                    <a:lumMod val="75000"/>
+                  </a:schemeClr>
+                </a:solidFill>
+              </a:rPr>
+              <a:t>Prototipo</a:t>
+            </a:r>
+          </a:p>
+          <a:p>
+            <a:r>
+              <a:rPr lang="es-ES" dirty="0">
+                <a:solidFill>
+                  <a:schemeClr val="bg2">
+                    <a:lumMod val="75000"/>
+                  </a:schemeClr>
+                </a:solidFill>
+              </a:rPr>
+              <a:t>Base de Datos</a:t>
+            </a:r>
+          </a:p>
+          <a:p>
+            <a:r>
+              <a:rPr lang="es-ES" dirty="0">
+                <a:solidFill>
+                  <a:schemeClr val="bg2">
+                    <a:lumMod val="75000"/>
+                  </a:schemeClr>
+                </a:solidFill>
+              </a:rPr>
+              <a:t>Demo</a:t>
+            </a:r>
+          </a:p>
+          <a:p>
+            <a:r>
+              <a:rPr lang="es-ES" sz="2400" dirty="0"/>
+              <a:t>Conclusiones</a:t>
+            </a:r>
+          </a:p>
+          <a:p>
+            <a:r>
+              <a:rPr lang="es-ES" dirty="0">
+                <a:solidFill>
+                  <a:schemeClr val="bg2">
+                    <a:lumMod val="75000"/>
+                  </a:schemeClr>
+                </a:solidFill>
+              </a:rPr>
+              <a:t>Preguntas</a:t>
+            </a:r>
+          </a:p>
+          <a:p>
+            <a:endParaRPr lang="es-ES" dirty="0"/>
+          </a:p>
+        </p:txBody>
+      </p:sp>
+    </p:spTree>
+    <p:extLst>
+      <p:ext uri="{BB962C8B-B14F-4D97-AF65-F5344CB8AC3E}">
+        <p14:creationId xmlns:p14="http://schemas.microsoft.com/office/powerpoint/2010/main" val="1074051263"/>
+      </p:ext>
+    </p:extLst>
+  </p:cSld>
+  <p:clrMapOvr>
+    <a:masterClrMapping/>
+  </p:clrMapOvr>
+</p:sld>
+</file>
+
+<file path=ppt/slides/slide18.xml><?xml version="1.0" encoding="utf-8"?>
+<p:sld xmlns:a="http://schemas.openxmlformats.org/drawingml/2006/main" xmlns:r="http://schemas.openxmlformats.org/officeDocument/2006/relationships" xmlns:p="http://schemas.openxmlformats.org/presentationml/2006/main">
+  <p:cSld>
+    <p:spTree>
+      <p:nvGrpSpPr>
+        <p:cNvPr id="1" name=""/>
+        <p:cNvGrpSpPr/>
+        <p:nvPr/>
+      </p:nvGrpSpPr>
+      <p:grpSpPr>
+        <a:xfrm>
+          <a:off x="0" y="0"/>
+          <a:ext cx="0" cy="0"/>
+          <a:chOff x="0" y="0"/>
+          <a:chExt cx="0" cy="0"/>
+        </a:xfrm>
+      </p:grpSpPr>
+      <p:sp>
+        <p:nvSpPr>
+          <p:cNvPr id="2" name="Título 1">
+            <a:extLst>
+              <a:ext uri="{FF2B5EF4-FFF2-40B4-BE49-F238E27FC236}">
+                <a16:creationId xmlns:a16="http://schemas.microsoft.com/office/drawing/2014/main" id="{D986E5BC-5F83-73C7-C180-DA40CF7220B8}"/>
+              </a:ext>
+            </a:extLst>
+          </p:cNvPr>
+          <p:cNvSpPr>
+            <a:spLocks noGrp="1"/>
+          </p:cNvSpPr>
+          <p:nvPr>
+            <p:ph type="title"/>
+          </p:nvPr>
+        </p:nvSpPr>
+        <p:spPr/>
+        <p:txBody>
+          <a:bodyPr/>
+          <a:lstStyle/>
+          <a:p>
+            <a:r>
+              <a:rPr lang="es-ES" dirty="0"/>
+              <a:t>Conclusiones</a:t>
+            </a:r>
+          </a:p>
+        </p:txBody>
+      </p:sp>
+      <p:sp>
+        <p:nvSpPr>
+          <p:cNvPr id="3" name="Marcador de contenido 2">
+            <a:extLst>
+              <a:ext uri="{FF2B5EF4-FFF2-40B4-BE49-F238E27FC236}">
+                <a16:creationId xmlns:a16="http://schemas.microsoft.com/office/drawing/2014/main" id="{B925B571-44AD-9500-5DE4-637EE8EC8A0C}"/>
+              </a:ext>
+            </a:extLst>
+          </p:cNvPr>
+          <p:cNvSpPr>
+            <a:spLocks noGrp="1"/>
+          </p:cNvSpPr>
+          <p:nvPr>
+            <p:ph idx="1"/>
+          </p:nvPr>
+        </p:nvSpPr>
+        <p:spPr/>
+        <p:txBody>
+          <a:bodyPr/>
+          <a:lstStyle/>
+          <a:p>
+            <a:r>
+              <a:rPr lang="es-ES" dirty="0"/>
+              <a:t>Desarrollar una aplicación completa es una tarea compleja que lleva mucho tiempo e implica tomar decisiones complejas.</a:t>
+            </a:r>
+          </a:p>
+          <a:p>
+            <a:r>
+              <a:rPr lang="es-ES" dirty="0"/>
+              <a:t>Trabajar con tecnologías por primera vez supone ampliar los tiempos de desarrollo y aumenta la probabilidad de error.</a:t>
+            </a:r>
+          </a:p>
+          <a:p>
+            <a:r>
+              <a:rPr lang="es-ES" dirty="0"/>
+              <a:t>La separación del </a:t>
+            </a:r>
+            <a:r>
+              <a:rPr lang="es-ES" dirty="0" err="1"/>
+              <a:t>backend</a:t>
+            </a:r>
+            <a:r>
+              <a:rPr lang="es-ES" dirty="0"/>
+              <a:t> y el </a:t>
+            </a:r>
+            <a:r>
+              <a:rPr lang="es-ES" dirty="0" err="1"/>
+              <a:t>frontend</a:t>
+            </a:r>
+            <a:r>
+              <a:rPr lang="es-ES" dirty="0"/>
+              <a:t> son fundamentales en las </a:t>
+            </a:r>
+            <a:r>
+              <a:rPr lang="es-ES"/>
+              <a:t>aplicaciones modernas.</a:t>
+            </a:r>
+            <a:endParaRPr lang="es-ES" dirty="0"/>
+          </a:p>
+          <a:p>
+            <a:r>
+              <a:rPr lang="es-ES" dirty="0"/>
+              <a:t>El despliegue de una aplicación es un proceso del cual solo conozco las bases.</a:t>
+            </a:r>
+          </a:p>
+          <a:p>
+            <a:endParaRPr lang="es-ES" dirty="0"/>
+          </a:p>
+          <a:p>
+            <a:pPr marL="0" indent="0">
+              <a:buNone/>
+            </a:pPr>
+            <a:endParaRPr lang="es-ES" dirty="0"/>
+          </a:p>
+        </p:txBody>
+      </p:sp>
+    </p:spTree>
+    <p:extLst>
+      <p:ext uri="{BB962C8B-B14F-4D97-AF65-F5344CB8AC3E}">
+        <p14:creationId xmlns:p14="http://schemas.microsoft.com/office/powerpoint/2010/main" val="1687958293"/>
+      </p:ext>
+    </p:extLst>
+  </p:cSld>
+  <p:clrMapOvr>
+    <a:masterClrMapping/>
+  </p:clrMapOvr>
+</p:sld>
+</file>
+
+<file path=ppt/slides/slide19.xml><?xml version="1.0" encoding="utf-8"?>
+<p:sld xmlns:a="http://schemas.openxmlformats.org/drawingml/2006/main" xmlns:r="http://schemas.openxmlformats.org/officeDocument/2006/relationships" xmlns:p="http://schemas.openxmlformats.org/presentationml/2006/main">
+  <p:cSld>
+    <p:spTree>
+      <p:nvGrpSpPr>
+        <p:cNvPr id="1" name=""/>
+        <p:cNvGrpSpPr/>
+        <p:nvPr/>
+      </p:nvGrpSpPr>
+      <p:grpSpPr>
+        <a:xfrm>
+          <a:off x="0" y="0"/>
+          <a:ext cx="0" cy="0"/>
+          <a:chOff x="0" y="0"/>
+          <a:chExt cx="0" cy="0"/>
+        </a:xfrm>
+      </p:grpSpPr>
+      <p:sp>
+        <p:nvSpPr>
+          <p:cNvPr id="2" name="Título 1">
+            <a:extLst>
+              <a:ext uri="{FF2B5EF4-FFF2-40B4-BE49-F238E27FC236}">
+                <a16:creationId xmlns:a16="http://schemas.microsoft.com/office/drawing/2014/main" id="{A91E6ED1-188B-76DC-341C-CE194FBB672B}"/>
+              </a:ext>
+            </a:extLst>
+          </p:cNvPr>
+          <p:cNvSpPr>
+            <a:spLocks noGrp="1"/>
+          </p:cNvSpPr>
+          <p:nvPr>
+            <p:ph type="title"/>
+          </p:nvPr>
+        </p:nvSpPr>
+        <p:spPr/>
+        <p:txBody>
+          <a:bodyPr/>
+          <a:lstStyle/>
+          <a:p>
+            <a:r>
+              <a:rPr lang="es-ES" dirty="0"/>
+              <a:t>Índice</a:t>
+            </a:r>
+          </a:p>
+        </p:txBody>
+      </p:sp>
+      <p:sp>
+        <p:nvSpPr>
+          <p:cNvPr id="3" name="Marcador de contenido 2">
+            <a:extLst>
+              <a:ext uri="{FF2B5EF4-FFF2-40B4-BE49-F238E27FC236}">
+                <a16:creationId xmlns:a16="http://schemas.microsoft.com/office/drawing/2014/main" id="{78669549-A335-3A34-3C1D-213FB03C61FD}"/>
+              </a:ext>
+            </a:extLst>
+          </p:cNvPr>
+          <p:cNvSpPr>
+            <a:spLocks noGrp="1"/>
+          </p:cNvSpPr>
+          <p:nvPr>
+            <p:ph idx="1"/>
+          </p:nvPr>
+        </p:nvSpPr>
+        <p:spPr/>
+        <p:txBody>
+          <a:bodyPr>
+            <a:normAutofit/>
+          </a:bodyPr>
+          <a:lstStyle/>
+          <a:p>
+            <a:r>
+              <a:rPr lang="es-ES" dirty="0">
+                <a:solidFill>
+                  <a:schemeClr val="bg2">
+                    <a:lumMod val="75000"/>
+                  </a:schemeClr>
+                </a:solidFill>
+              </a:rPr>
+              <a:t>Motivación</a:t>
+            </a:r>
+          </a:p>
+          <a:p>
+            <a:r>
+              <a:rPr lang="es-ES" dirty="0">
+                <a:solidFill>
+                  <a:schemeClr val="bg2">
+                    <a:lumMod val="75000"/>
+                  </a:schemeClr>
+                </a:solidFill>
+              </a:rPr>
+              <a:t>Objetivos</a:t>
+            </a:r>
+          </a:p>
+          <a:p>
+            <a:r>
+              <a:rPr lang="es-ES" dirty="0">
+                <a:solidFill>
+                  <a:schemeClr val="bg2">
+                    <a:lumMod val="75000"/>
+                  </a:schemeClr>
+                </a:solidFill>
+              </a:rPr>
+              <a:t>Plan de trabajo y Temporalización</a:t>
+            </a:r>
+          </a:p>
+          <a:p>
+            <a:r>
+              <a:rPr lang="es-ES" dirty="0">
+                <a:solidFill>
+                  <a:schemeClr val="bg2">
+                    <a:lumMod val="75000"/>
+                  </a:schemeClr>
+                </a:solidFill>
+              </a:rPr>
+              <a:t>Tecnologías utilizadas</a:t>
+            </a:r>
+          </a:p>
+          <a:p>
+            <a:r>
+              <a:rPr lang="es-ES" dirty="0">
+                <a:solidFill>
+                  <a:schemeClr val="bg2">
+                    <a:lumMod val="75000"/>
+                  </a:schemeClr>
+                </a:solidFill>
+              </a:rPr>
+              <a:t>Prototipo</a:t>
+            </a:r>
+          </a:p>
+          <a:p>
+            <a:r>
+              <a:rPr lang="es-ES" dirty="0">
+                <a:solidFill>
+                  <a:schemeClr val="bg2">
+                    <a:lumMod val="75000"/>
+                  </a:schemeClr>
+                </a:solidFill>
+              </a:rPr>
+              <a:t>Base de Datos</a:t>
+            </a:r>
+          </a:p>
+          <a:p>
+            <a:r>
+              <a:rPr lang="es-ES" dirty="0">
+                <a:solidFill>
+                  <a:schemeClr val="bg2">
+                    <a:lumMod val="75000"/>
+                  </a:schemeClr>
+                </a:solidFill>
+              </a:rPr>
+              <a:t>Demo</a:t>
+            </a:r>
+          </a:p>
+          <a:p>
+            <a:r>
+              <a:rPr lang="es-ES" dirty="0">
+                <a:solidFill>
+                  <a:schemeClr val="bg2">
+                    <a:lumMod val="75000"/>
+                  </a:schemeClr>
+                </a:solidFill>
+              </a:rPr>
+              <a:t>Conclusiones</a:t>
+            </a:r>
+          </a:p>
+          <a:p>
+            <a:r>
+              <a:rPr lang="es-ES" sz="2400" dirty="0"/>
+              <a:t>Preguntas</a:t>
+            </a:r>
+          </a:p>
+          <a:p>
+            <a:endParaRPr lang="es-ES" dirty="0"/>
+          </a:p>
+        </p:txBody>
+      </p:sp>
+    </p:spTree>
+    <p:extLst>
+      <p:ext uri="{BB962C8B-B14F-4D97-AF65-F5344CB8AC3E}">
+        <p14:creationId xmlns:p14="http://schemas.microsoft.com/office/powerpoint/2010/main" val="465450142"/>
+      </p:ext>
+    </p:extLst>
+  </p:cSld>
+  <p:clrMapOvr>
+    <a:masterClrMapping/>
+  </p:clrMapOvr>
+</p:sld>
+</file>
+
+<file path=ppt/slides/slide2.xml><?xml version="1.0" encoding="utf-8"?>
+<p:sld xmlns:a="http://schemas.openxmlformats.org/drawingml/2006/main" xmlns:r="http://schemas.openxmlformats.org/officeDocument/2006/relationships" xmlns:p="http://schemas.openxmlformats.org/presentationml/2006/main">
+  <p:cSld>
+    <p:spTree>
+      <p:nvGrpSpPr>
+        <p:cNvPr id="1" name=""/>
+        <p:cNvGrpSpPr/>
+        <p:nvPr/>
+      </p:nvGrpSpPr>
+      <p:grpSpPr>
+        <a:xfrm>
+          <a:off x="0" y="0"/>
+          <a:ext cx="0" cy="0"/>
+          <a:chOff x="0" y="0"/>
+          <a:chExt cx="0" cy="0"/>
+        </a:xfrm>
+      </p:grpSpPr>
+      <p:sp>
+        <p:nvSpPr>
+          <p:cNvPr id="2" name="Título 1">
+            <a:extLst>
+              <a:ext uri="{FF2B5EF4-FFF2-40B4-BE49-F238E27FC236}">
+                <a16:creationId xmlns:a16="http://schemas.microsoft.com/office/drawing/2014/main" id="{A91E6ED1-188B-76DC-341C-CE194FBB672B}"/>
+              </a:ext>
+            </a:extLst>
+          </p:cNvPr>
+          <p:cNvSpPr>
+            <a:spLocks noGrp="1"/>
+          </p:cNvSpPr>
+          <p:nvPr>
+            <p:ph type="title"/>
+          </p:nvPr>
+        </p:nvSpPr>
+        <p:spPr/>
+        <p:txBody>
+          <a:bodyPr/>
+          <a:lstStyle/>
+          <a:p>
+            <a:r>
+              <a:rPr lang="es-ES" dirty="0"/>
+              <a:t>Índice</a:t>
+            </a:r>
+          </a:p>
+        </p:txBody>
+      </p:sp>
+      <p:sp>
+        <p:nvSpPr>
+          <p:cNvPr id="3" name="Marcador de contenido 2">
+            <a:extLst>
+              <a:ext uri="{FF2B5EF4-FFF2-40B4-BE49-F238E27FC236}">
+                <a16:creationId xmlns:a16="http://schemas.microsoft.com/office/drawing/2014/main" id="{78669549-A335-3A34-3C1D-213FB03C61FD}"/>
+              </a:ext>
+            </a:extLst>
+          </p:cNvPr>
+          <p:cNvSpPr>
+            <a:spLocks noGrp="1"/>
+          </p:cNvSpPr>
+          <p:nvPr>
+            <p:ph idx="1"/>
+          </p:nvPr>
+        </p:nvSpPr>
+        <p:spPr/>
+        <p:txBody>
+          <a:bodyPr>
+            <a:normAutofit/>
+          </a:bodyPr>
+          <a:lstStyle/>
+          <a:p>
+            <a:r>
+              <a:rPr lang="es-ES" dirty="0"/>
+              <a:t>Motivación</a:t>
+            </a:r>
+          </a:p>
+          <a:p>
+            <a:r>
+              <a:rPr lang="es-ES" dirty="0"/>
+              <a:t>Objetivos</a:t>
+            </a:r>
+          </a:p>
+          <a:p>
+            <a:r>
+              <a:rPr lang="es-ES" dirty="0"/>
+              <a:t>Plan de trabajo y Temporalización</a:t>
+            </a:r>
+          </a:p>
+          <a:p>
+            <a:r>
+              <a:rPr lang="es-ES" dirty="0"/>
+              <a:t>Tecnologías utilizadas</a:t>
+            </a:r>
+          </a:p>
+          <a:p>
+            <a:r>
+              <a:rPr lang="es-ES" dirty="0"/>
+              <a:t>Prototipo</a:t>
+            </a:r>
+          </a:p>
+          <a:p>
+            <a:r>
+              <a:rPr lang="es-ES" dirty="0"/>
+              <a:t>Base de Datos</a:t>
+            </a:r>
+          </a:p>
+          <a:p>
+            <a:r>
+              <a:rPr lang="es-ES" dirty="0"/>
+              <a:t>Demo</a:t>
+            </a:r>
+          </a:p>
+          <a:p>
+            <a:r>
+              <a:rPr lang="es-ES" dirty="0"/>
+              <a:t>Conclusiones</a:t>
+            </a:r>
+          </a:p>
+          <a:p>
+            <a:r>
+              <a:rPr lang="es-ES" dirty="0"/>
+              <a:t>Preguntas</a:t>
+            </a:r>
+          </a:p>
+          <a:p>
+            <a:endParaRPr lang="es-ES" dirty="0"/>
+          </a:p>
+        </p:txBody>
+      </p:sp>
+    </p:spTree>
+    <p:extLst>
+      <p:ext uri="{BB962C8B-B14F-4D97-AF65-F5344CB8AC3E}">
+        <p14:creationId xmlns:p14="http://schemas.microsoft.com/office/powerpoint/2010/main" val="144551678"/>
+      </p:ext>
+    </p:extLst>
+  </p:cSld>
+  <p:clrMapOvr>
+    <a:masterClrMapping/>
+  </p:clrMapOvr>
+</p:sld>
+</file>
+
+<file path=ppt/slides/slide20.xml><?xml version="1.0" encoding="utf-8"?>
+<p:sld xmlns:a="http://schemas.openxmlformats.org/drawingml/2006/main" xmlns:r="http://schemas.openxmlformats.org/officeDocument/2006/relationships" xmlns:p="http://schemas.openxmlformats.org/presentationml/2006/main">
+  <p:cSld>
+    <p:spTree>
+      <p:nvGrpSpPr>
+        <p:cNvPr id="1" name=""/>
+        <p:cNvGrpSpPr/>
+        <p:nvPr/>
+      </p:nvGrpSpPr>
+      <p:grpSpPr>
+        <a:xfrm>
+          <a:off x="0" y="0"/>
+          <a:ext cx="0" cy="0"/>
+          <a:chOff x="0" y="0"/>
+          <a:chExt cx="0" cy="0"/>
+        </a:xfrm>
+      </p:grpSpPr>
+      <p:sp>
+        <p:nvSpPr>
+          <p:cNvPr id="2" name="Título 1">
+            <a:extLst>
+              <a:ext uri="{FF2B5EF4-FFF2-40B4-BE49-F238E27FC236}">
+                <a16:creationId xmlns:a16="http://schemas.microsoft.com/office/drawing/2014/main" id="{7AE95EF9-15C3-142E-4017-8EE903C905F2}"/>
+              </a:ext>
+            </a:extLst>
+          </p:cNvPr>
+          <p:cNvSpPr>
+            <a:spLocks noGrp="1"/>
+          </p:cNvSpPr>
+          <p:nvPr>
+            <p:ph type="title"/>
+          </p:nvPr>
+        </p:nvSpPr>
+        <p:spPr>
+          <a:xfrm>
+            <a:off x="1797666" y="3042082"/>
+            <a:ext cx="8596668" cy="1320800"/>
+          </a:xfrm>
+        </p:spPr>
+        <p:txBody>
+          <a:bodyPr/>
+          <a:lstStyle/>
+          <a:p>
+            <a:pPr algn="ctr"/>
+            <a:r>
+              <a:rPr lang="es-ES" dirty="0"/>
+              <a:t>Muchas gracias por su atención. </a:t>
+            </a:r>
+            <a:br>
+              <a:rPr lang="es-ES" dirty="0"/>
+            </a:br>
+            <a:r>
+              <a:rPr lang="es-ES" dirty="0"/>
+              <a:t>Ruegos y Preguntas</a:t>
+            </a:r>
+          </a:p>
+        </p:txBody>
+      </p:sp>
+    </p:spTree>
+    <p:extLst>
+      <p:ext uri="{BB962C8B-B14F-4D97-AF65-F5344CB8AC3E}">
+        <p14:creationId xmlns:p14="http://schemas.microsoft.com/office/powerpoint/2010/main" val="3193451268"/>
+      </p:ext>
+    </p:extLst>
+  </p:cSld>
+  <p:clrMapOvr>
+    <a:masterClrMapping/>
+  </p:clrMapOvr>
+</p:sld>
+</file>
+
+<file path=ppt/slides/slide3.xml><?xml version="1.0" encoding="utf-8"?>
+<p:sld xmlns:a="http://schemas.openxmlformats.org/drawingml/2006/main" xmlns:r="http://schemas.openxmlformats.org/officeDocument/2006/relationships" xmlns:p="http://schemas.openxmlformats.org/presentationml/2006/main">
+  <p:cSld>
+    <p:spTree>
+      <p:nvGrpSpPr>
+        <p:cNvPr id="1" name=""/>
+        <p:cNvGrpSpPr/>
+        <p:nvPr/>
+      </p:nvGrpSpPr>
+      <p:grpSpPr>
+        <a:xfrm>
+          <a:off x="0" y="0"/>
+          <a:ext cx="0" cy="0"/>
+          <a:chOff x="0" y="0"/>
+          <a:chExt cx="0" cy="0"/>
+        </a:xfrm>
+      </p:grpSpPr>
+      <p:sp>
+        <p:nvSpPr>
+          <p:cNvPr id="2" name="Título 1">
+            <a:extLst>
+              <a:ext uri="{FF2B5EF4-FFF2-40B4-BE49-F238E27FC236}">
+                <a16:creationId xmlns:a16="http://schemas.microsoft.com/office/drawing/2014/main" id="{A91E6ED1-188B-76DC-341C-CE194FBB672B}"/>
+              </a:ext>
+            </a:extLst>
+          </p:cNvPr>
+          <p:cNvSpPr>
+            <a:spLocks noGrp="1"/>
+          </p:cNvSpPr>
+          <p:nvPr>
+            <p:ph type="title"/>
+          </p:nvPr>
+        </p:nvSpPr>
+        <p:spPr/>
+        <p:txBody>
+          <a:bodyPr/>
+          <a:lstStyle/>
+          <a:p>
+            <a:r>
+              <a:rPr lang="es-ES" dirty="0"/>
+              <a:t>Índice</a:t>
+            </a:r>
+          </a:p>
+        </p:txBody>
+      </p:sp>
+      <p:sp>
+        <p:nvSpPr>
+          <p:cNvPr id="3" name="Marcador de contenido 2">
+            <a:extLst>
+              <a:ext uri="{FF2B5EF4-FFF2-40B4-BE49-F238E27FC236}">
+                <a16:creationId xmlns:a16="http://schemas.microsoft.com/office/drawing/2014/main" id="{78669549-A335-3A34-3C1D-213FB03C61FD}"/>
+              </a:ext>
+            </a:extLst>
+          </p:cNvPr>
+          <p:cNvSpPr>
+            <a:spLocks noGrp="1"/>
+          </p:cNvSpPr>
+          <p:nvPr>
+            <p:ph idx="1"/>
+          </p:nvPr>
+        </p:nvSpPr>
+        <p:spPr/>
+        <p:txBody>
+          <a:bodyPr>
+            <a:normAutofit/>
+          </a:bodyPr>
+          <a:lstStyle/>
+          <a:p>
+            <a:r>
+              <a:rPr lang="es-ES" sz="2400" dirty="0"/>
+              <a:t>Motivación</a:t>
+            </a:r>
+          </a:p>
+          <a:p>
+            <a:r>
+              <a:rPr lang="es-ES" dirty="0">
+                <a:solidFill>
+                  <a:schemeClr val="bg2">
+                    <a:lumMod val="75000"/>
+                  </a:schemeClr>
+                </a:solidFill>
+              </a:rPr>
+              <a:t>Objetivos</a:t>
+            </a:r>
+          </a:p>
+          <a:p>
+            <a:r>
+              <a:rPr lang="es-ES" dirty="0">
+                <a:solidFill>
+                  <a:schemeClr val="bg2">
+                    <a:lumMod val="75000"/>
+                  </a:schemeClr>
+                </a:solidFill>
+              </a:rPr>
+              <a:t>Plan de trabajo y Temporalización</a:t>
+            </a:r>
+          </a:p>
+          <a:p>
+            <a:r>
+              <a:rPr lang="es-ES" dirty="0">
+                <a:solidFill>
+                  <a:schemeClr val="bg2">
+                    <a:lumMod val="75000"/>
+                  </a:schemeClr>
+                </a:solidFill>
+              </a:rPr>
+              <a:t>Tecnologías utilizadas</a:t>
+            </a:r>
+          </a:p>
+          <a:p>
+            <a:r>
+              <a:rPr lang="es-ES" dirty="0">
+                <a:solidFill>
+                  <a:schemeClr val="bg2">
+                    <a:lumMod val="75000"/>
+                  </a:schemeClr>
+                </a:solidFill>
+              </a:rPr>
+              <a:t>Prototipo</a:t>
+            </a:r>
+          </a:p>
+          <a:p>
+            <a:r>
+              <a:rPr lang="es-ES" dirty="0">
+                <a:solidFill>
+                  <a:schemeClr val="bg2">
+                    <a:lumMod val="75000"/>
+                  </a:schemeClr>
+                </a:solidFill>
+              </a:rPr>
+              <a:t>Base de Datos</a:t>
+            </a:r>
+          </a:p>
+          <a:p>
+            <a:r>
+              <a:rPr lang="es-ES" dirty="0">
+                <a:solidFill>
+                  <a:schemeClr val="bg2">
+                    <a:lumMod val="75000"/>
+                  </a:schemeClr>
+                </a:solidFill>
+              </a:rPr>
+              <a:t>Demo</a:t>
+            </a:r>
+          </a:p>
+          <a:p>
+            <a:r>
+              <a:rPr lang="es-ES" dirty="0">
+                <a:solidFill>
+                  <a:schemeClr val="bg2">
+                    <a:lumMod val="75000"/>
+                  </a:schemeClr>
+                </a:solidFill>
+              </a:rPr>
+              <a:t>Conclusiones</a:t>
+            </a:r>
+          </a:p>
+          <a:p>
+            <a:r>
+              <a:rPr lang="es-ES" dirty="0">
+                <a:solidFill>
+                  <a:schemeClr val="bg2">
+                    <a:lumMod val="75000"/>
+                  </a:schemeClr>
+                </a:solidFill>
+              </a:rPr>
+              <a:t>Preguntas</a:t>
+            </a:r>
+          </a:p>
+          <a:p>
+            <a:endParaRPr lang="es-ES" dirty="0"/>
+          </a:p>
+        </p:txBody>
+      </p:sp>
+    </p:spTree>
+    <p:extLst>
+      <p:ext uri="{BB962C8B-B14F-4D97-AF65-F5344CB8AC3E}">
+        <p14:creationId xmlns:p14="http://schemas.microsoft.com/office/powerpoint/2010/main" val="3777196523"/>
+      </p:ext>
+    </p:extLst>
+  </p:cSld>
+  <p:clrMapOvr>
+    <a:masterClrMapping/>
+  </p:clrMapOvr>
+</p:sld>
+</file>
+
+<file path=ppt/slides/slide4.xml><?xml version="1.0" encoding="utf-8"?>
+<p:sld xmlns:a="http://schemas.openxmlformats.org/drawingml/2006/main" xmlns:r="http://schemas.openxmlformats.org/officeDocument/2006/relationships" xmlns:p="http://schemas.openxmlformats.org/presentationml/2006/main">
+  <p:cSld>
+    <p:spTree>
+      <p:nvGrpSpPr>
+        <p:cNvPr id="1" name=""/>
+        <p:cNvGrpSpPr/>
+        <p:nvPr/>
+      </p:nvGrpSpPr>
+      <p:grpSpPr>
+        <a:xfrm>
+          <a:off x="0" y="0"/>
+          <a:ext cx="0" cy="0"/>
+          <a:chOff x="0" y="0"/>
+          <a:chExt cx="0" cy="0"/>
+        </a:xfrm>
+      </p:grpSpPr>
+      <p:sp>
+        <p:nvSpPr>
+          <p:cNvPr id="2" name="Título 1">
+            <a:extLst>
+              <a:ext uri="{FF2B5EF4-FFF2-40B4-BE49-F238E27FC236}">
+                <a16:creationId xmlns:a16="http://schemas.microsoft.com/office/drawing/2014/main" id="{4B477183-65D0-E767-F6C6-B8965E5686F5}"/>
+              </a:ext>
+            </a:extLst>
+          </p:cNvPr>
+          <p:cNvSpPr>
+            <a:spLocks noGrp="1"/>
+          </p:cNvSpPr>
+          <p:nvPr>
+            <p:ph type="title"/>
+          </p:nvPr>
+        </p:nvSpPr>
+        <p:spPr/>
+        <p:txBody>
+          <a:bodyPr/>
+          <a:lstStyle/>
+          <a:p>
+            <a:r>
+              <a:rPr lang="es-ES" dirty="0"/>
+              <a:t>Motivación</a:t>
+            </a:r>
+          </a:p>
+        </p:txBody>
+      </p:sp>
+      <p:sp>
+        <p:nvSpPr>
+          <p:cNvPr id="3" name="Marcador de contenido 2">
+            <a:extLst>
+              <a:ext uri="{FF2B5EF4-FFF2-40B4-BE49-F238E27FC236}">
+                <a16:creationId xmlns:a16="http://schemas.microsoft.com/office/drawing/2014/main" id="{515BB6CB-CFA5-D552-71B1-74D84E7D6E5A}"/>
+              </a:ext>
+            </a:extLst>
+          </p:cNvPr>
+          <p:cNvSpPr>
+            <a:spLocks noGrp="1"/>
+          </p:cNvSpPr>
+          <p:nvPr>
+            <p:ph idx="1"/>
+          </p:nvPr>
+        </p:nvSpPr>
+        <p:spPr/>
+        <p:txBody>
+          <a:bodyPr/>
+          <a:lstStyle/>
+          <a:p>
+            <a:r>
+              <a:rPr lang="es-ES" dirty="0"/>
+              <a:t>Este proyecto busca aplicar los conocimientos en:</a:t>
+            </a:r>
+          </a:p>
+          <a:p>
+            <a:pPr marL="742950" lvl="2" indent="-342900"/>
+            <a:r>
+              <a:rPr lang="es-ES" sz="1600" dirty="0"/>
+              <a:t>Diseño</a:t>
+            </a:r>
+          </a:p>
+          <a:p>
+            <a:pPr marL="742950" lvl="2" indent="-342900"/>
+            <a:r>
+              <a:rPr lang="es-ES" sz="1600" dirty="0"/>
+              <a:t>Programación</a:t>
+            </a:r>
+          </a:p>
+          <a:p>
+            <a:pPr marL="742950" lvl="2" indent="-342900"/>
+            <a:r>
+              <a:rPr lang="es-ES" sz="1600" dirty="0"/>
+              <a:t>Despliegue</a:t>
+            </a:r>
+          </a:p>
+          <a:p>
+            <a:r>
+              <a:rPr lang="es-ES" dirty="0"/>
+              <a:t>También busca:</a:t>
+            </a:r>
+          </a:p>
+          <a:p>
+            <a:pPr lvl="1"/>
+            <a:r>
+              <a:rPr lang="es-ES" dirty="0"/>
+              <a:t>Generar un Gestor de Dietas para clientes.</a:t>
+            </a:r>
+          </a:p>
+          <a:p>
+            <a:pPr lvl="1"/>
+            <a:r>
+              <a:rPr lang="es-ES" dirty="0"/>
+              <a:t>Trabajar con nuevas tecnologías.</a:t>
+            </a:r>
+          </a:p>
+        </p:txBody>
+      </p:sp>
+    </p:spTree>
+    <p:extLst>
+      <p:ext uri="{BB962C8B-B14F-4D97-AF65-F5344CB8AC3E}">
+        <p14:creationId xmlns:p14="http://schemas.microsoft.com/office/powerpoint/2010/main" val="4107352885"/>
+      </p:ext>
+    </p:extLst>
+  </p:cSld>
+  <p:clrMapOvr>
+    <a:masterClrMapping/>
+  </p:clrMapOvr>
+</p:sld>
+</file>
+
+<file path=ppt/slides/slide5.xml><?xml version="1.0" encoding="utf-8"?>
+<p:sld xmlns:a="http://schemas.openxmlformats.org/drawingml/2006/main" xmlns:r="http://schemas.openxmlformats.org/officeDocument/2006/relationships" xmlns:p="http://schemas.openxmlformats.org/presentationml/2006/main">
+  <p:cSld>
+    <p:spTree>
+      <p:nvGrpSpPr>
+        <p:cNvPr id="1" name=""/>
+        <p:cNvGrpSpPr/>
+        <p:nvPr/>
+      </p:nvGrpSpPr>
+      <p:grpSpPr>
+        <a:xfrm>
+          <a:off x="0" y="0"/>
+          <a:ext cx="0" cy="0"/>
+          <a:chOff x="0" y="0"/>
+          <a:chExt cx="0" cy="0"/>
+        </a:xfrm>
+      </p:grpSpPr>
+      <p:sp>
+        <p:nvSpPr>
+          <p:cNvPr id="2" name="Título 1">
+            <a:extLst>
+              <a:ext uri="{FF2B5EF4-FFF2-40B4-BE49-F238E27FC236}">
+                <a16:creationId xmlns:a16="http://schemas.microsoft.com/office/drawing/2014/main" id="{A91E6ED1-188B-76DC-341C-CE194FBB672B}"/>
+              </a:ext>
+            </a:extLst>
+          </p:cNvPr>
+          <p:cNvSpPr>
+            <a:spLocks noGrp="1"/>
+          </p:cNvSpPr>
+          <p:nvPr>
+            <p:ph type="title"/>
+          </p:nvPr>
+        </p:nvSpPr>
+        <p:spPr/>
+        <p:txBody>
+          <a:bodyPr/>
+          <a:lstStyle/>
+          <a:p>
+            <a:r>
+              <a:rPr lang="es-ES" dirty="0"/>
+              <a:t>Índice</a:t>
+            </a:r>
+          </a:p>
+        </p:txBody>
+      </p:sp>
+      <p:sp>
+        <p:nvSpPr>
+          <p:cNvPr id="3" name="Marcador de contenido 2">
+            <a:extLst>
+              <a:ext uri="{FF2B5EF4-FFF2-40B4-BE49-F238E27FC236}">
+                <a16:creationId xmlns:a16="http://schemas.microsoft.com/office/drawing/2014/main" id="{78669549-A335-3A34-3C1D-213FB03C61FD}"/>
+              </a:ext>
+            </a:extLst>
+          </p:cNvPr>
+          <p:cNvSpPr>
+            <a:spLocks noGrp="1"/>
+          </p:cNvSpPr>
+          <p:nvPr>
+            <p:ph idx="1"/>
+          </p:nvPr>
+        </p:nvSpPr>
+        <p:spPr/>
+        <p:txBody>
+          <a:bodyPr>
+            <a:normAutofit/>
+          </a:bodyPr>
+          <a:lstStyle/>
+          <a:p>
+            <a:r>
+              <a:rPr lang="es-ES" dirty="0">
+                <a:solidFill>
+                  <a:schemeClr val="bg2">
+                    <a:lumMod val="75000"/>
+                  </a:schemeClr>
+                </a:solidFill>
+              </a:rPr>
+              <a:t>Motivación</a:t>
+            </a:r>
+          </a:p>
+          <a:p>
+            <a:r>
+              <a:rPr lang="es-ES" sz="2400" dirty="0"/>
+              <a:t>Objetivos</a:t>
+            </a:r>
+          </a:p>
+          <a:p>
+            <a:r>
+              <a:rPr lang="es-ES" dirty="0">
+                <a:solidFill>
+                  <a:schemeClr val="bg2">
+                    <a:lumMod val="75000"/>
+                  </a:schemeClr>
+                </a:solidFill>
+              </a:rPr>
+              <a:t>Plan de trabajo y Temporalización</a:t>
+            </a:r>
+          </a:p>
+          <a:p>
+            <a:r>
+              <a:rPr lang="es-ES" dirty="0">
+                <a:solidFill>
+                  <a:schemeClr val="bg2">
+                    <a:lumMod val="75000"/>
+                  </a:schemeClr>
+                </a:solidFill>
+              </a:rPr>
+              <a:t>Tecnologías utilizadas</a:t>
+            </a:r>
+          </a:p>
+          <a:p>
+            <a:r>
+              <a:rPr lang="es-ES" dirty="0">
+                <a:solidFill>
+                  <a:schemeClr val="bg2">
+                    <a:lumMod val="75000"/>
+                  </a:schemeClr>
+                </a:solidFill>
+              </a:rPr>
+              <a:t>Prototipo</a:t>
+            </a:r>
+          </a:p>
+          <a:p>
+            <a:r>
+              <a:rPr lang="es-ES" dirty="0">
+                <a:solidFill>
+                  <a:schemeClr val="bg2">
+                    <a:lumMod val="75000"/>
+                  </a:schemeClr>
+                </a:solidFill>
+              </a:rPr>
+              <a:t>Base de Datos</a:t>
+            </a:r>
+          </a:p>
+          <a:p>
+            <a:r>
+              <a:rPr lang="es-ES" dirty="0">
+                <a:solidFill>
+                  <a:schemeClr val="bg2">
+                    <a:lumMod val="75000"/>
+                  </a:schemeClr>
+                </a:solidFill>
+              </a:rPr>
+              <a:t>Demo</a:t>
+            </a:r>
+          </a:p>
+          <a:p>
+            <a:r>
+              <a:rPr lang="es-ES" dirty="0">
+                <a:solidFill>
+                  <a:schemeClr val="bg2">
+                    <a:lumMod val="75000"/>
+                  </a:schemeClr>
+                </a:solidFill>
+              </a:rPr>
+              <a:t>Conclusiones</a:t>
+            </a:r>
+          </a:p>
+          <a:p>
+            <a:r>
+              <a:rPr lang="es-ES" dirty="0">
+                <a:solidFill>
+                  <a:schemeClr val="bg2">
+                    <a:lumMod val="75000"/>
+                  </a:schemeClr>
+                </a:solidFill>
+              </a:rPr>
+              <a:t>Preguntas</a:t>
+            </a:r>
+          </a:p>
+          <a:p>
+            <a:endParaRPr lang="es-ES" dirty="0"/>
+          </a:p>
+        </p:txBody>
+      </p:sp>
+    </p:spTree>
+    <p:extLst>
+      <p:ext uri="{BB962C8B-B14F-4D97-AF65-F5344CB8AC3E}">
+        <p14:creationId xmlns:p14="http://schemas.microsoft.com/office/powerpoint/2010/main" val="2648702181"/>
+      </p:ext>
+    </p:extLst>
+  </p:cSld>
+  <p:clrMapOvr>
+    <a:masterClrMapping/>
+  </p:clrMapOvr>
+</p:sld>
+</file>
+
+<file path=ppt/slides/slide6.xml><?xml version="1.0" encoding="utf-8"?>
+<p:sld xmlns:a="http://schemas.openxmlformats.org/drawingml/2006/main" xmlns:r="http://schemas.openxmlformats.org/officeDocument/2006/relationships" xmlns:p="http://schemas.openxmlformats.org/presentationml/2006/main">
+  <p:cSld>
+    <p:spTree>
+      <p:nvGrpSpPr>
+        <p:cNvPr id="1" name=""/>
+        <p:cNvGrpSpPr/>
+        <p:nvPr/>
+      </p:nvGrpSpPr>
+      <p:grpSpPr>
+        <a:xfrm>
+          <a:off x="0" y="0"/>
+          <a:ext cx="0" cy="0"/>
+          <a:chOff x="0" y="0"/>
+          <a:chExt cx="0" cy="0"/>
+        </a:xfrm>
+      </p:grpSpPr>
+      <p:sp>
+        <p:nvSpPr>
+          <p:cNvPr id="2" name="Título 1">
+            <a:extLst>
+              <a:ext uri="{FF2B5EF4-FFF2-40B4-BE49-F238E27FC236}">
+                <a16:creationId xmlns:a16="http://schemas.microsoft.com/office/drawing/2014/main" id="{EC75CDF1-52C1-3B06-1F0A-6D17F6888232}"/>
+              </a:ext>
+            </a:extLst>
+          </p:cNvPr>
+          <p:cNvSpPr>
+            <a:spLocks noGrp="1"/>
+          </p:cNvSpPr>
+          <p:nvPr>
+            <p:ph type="title"/>
+          </p:nvPr>
+        </p:nvSpPr>
+        <p:spPr/>
+        <p:txBody>
+          <a:bodyPr/>
+          <a:lstStyle/>
+          <a:p>
+            <a:r>
+              <a:rPr lang="es-ES" dirty="0"/>
+              <a:t>Objetivos</a:t>
+            </a:r>
+          </a:p>
+        </p:txBody>
+      </p:sp>
+      <p:sp>
+        <p:nvSpPr>
+          <p:cNvPr id="3" name="Marcador de contenido 2">
+            <a:extLst>
+              <a:ext uri="{FF2B5EF4-FFF2-40B4-BE49-F238E27FC236}">
+                <a16:creationId xmlns:a16="http://schemas.microsoft.com/office/drawing/2014/main" id="{E91C1265-73DF-B355-C494-F5AE5C1690E2}"/>
+              </a:ext>
+            </a:extLst>
+          </p:cNvPr>
+          <p:cNvSpPr>
+            <a:spLocks noGrp="1"/>
+          </p:cNvSpPr>
+          <p:nvPr>
+            <p:ph idx="1"/>
+          </p:nvPr>
+        </p:nvSpPr>
+        <p:spPr/>
+        <p:txBody>
+          <a:bodyPr>
+            <a:normAutofit/>
+          </a:bodyPr>
+          <a:lstStyle/>
+          <a:p>
+            <a:pPr algn="just"/>
+            <a:r>
+              <a:rPr lang="es-ES" sz="1800" b="1" dirty="0">
+                <a:solidFill>
+                  <a:srgbClr val="000000"/>
+                </a:solidFill>
+                <a:effectLst/>
+                <a:latin typeface="Calibri" panose="020F0502020204030204" pitchFamily="34" charset="0"/>
+                <a:ea typeface="Calibri" panose="020F0502020204030204" pitchFamily="34" charset="0"/>
+              </a:rPr>
+              <a:t>A nivel profesional:</a:t>
+            </a:r>
+            <a:endParaRPr lang="es-ES" sz="1800" dirty="0">
+              <a:solidFill>
+                <a:srgbClr val="000000"/>
+              </a:solidFill>
+              <a:effectLst/>
+              <a:latin typeface="Calibri" panose="020F0502020204030204" pitchFamily="34" charset="0"/>
+              <a:ea typeface="Calibri" panose="020F0502020204030204" pitchFamily="34" charset="0"/>
+            </a:endParaRPr>
+          </a:p>
+          <a:p>
+            <a:pPr lvl="1" indent="-342900" algn="just">
+              <a:buFont typeface="Symbol" panose="05050102010706020507" pitchFamily="18" charset="2"/>
+              <a:buChar char=""/>
+            </a:pPr>
+            <a:r>
+              <a:rPr lang="es-ES" dirty="0">
+                <a:solidFill>
+                  <a:srgbClr val="000000"/>
+                </a:solidFill>
+                <a:effectLst/>
+                <a:latin typeface="Calibri" panose="020F0502020204030204" pitchFamily="34" charset="0"/>
+                <a:ea typeface="Calibri" panose="020F0502020204030204" pitchFamily="34" charset="0"/>
+              </a:rPr>
+              <a:t>Desarrollar una aplicación desde el comienzo hasta el final.</a:t>
+            </a:r>
+          </a:p>
+          <a:p>
+            <a:pPr lvl="1" indent="-342900" algn="just">
+              <a:buFont typeface="Symbol" panose="05050102010706020507" pitchFamily="18" charset="2"/>
+              <a:buChar char=""/>
+            </a:pPr>
+            <a:r>
+              <a:rPr lang="es-ES" dirty="0">
+                <a:solidFill>
+                  <a:srgbClr val="000000"/>
+                </a:solidFill>
+                <a:effectLst/>
+                <a:latin typeface="Calibri" panose="020F0502020204030204" pitchFamily="34" charset="0"/>
+                <a:ea typeface="Calibri" panose="020F0502020204030204" pitchFamily="34" charset="0"/>
+              </a:rPr>
+              <a:t>Conocer y utilizar nuevas tecnologías.</a:t>
+            </a:r>
+          </a:p>
+          <a:p>
+            <a:pPr lvl="1" indent="-342900" algn="just">
+              <a:buFont typeface="Symbol" panose="05050102010706020507" pitchFamily="18" charset="2"/>
+              <a:buChar char=""/>
+            </a:pPr>
+            <a:r>
+              <a:rPr lang="es-ES" dirty="0">
+                <a:solidFill>
+                  <a:srgbClr val="000000"/>
+                </a:solidFill>
+                <a:latin typeface="Calibri" panose="020F0502020204030204" pitchFamily="34" charset="0"/>
+                <a:ea typeface="Calibri" panose="020F0502020204030204" pitchFamily="34" charset="0"/>
+              </a:rPr>
+              <a:t>Separar el </a:t>
+            </a:r>
+            <a:r>
+              <a:rPr lang="es-ES" dirty="0" err="1">
+                <a:solidFill>
+                  <a:srgbClr val="000000"/>
+                </a:solidFill>
+                <a:latin typeface="Calibri" panose="020F0502020204030204" pitchFamily="34" charset="0"/>
+                <a:ea typeface="Calibri" panose="020F0502020204030204" pitchFamily="34" charset="0"/>
+              </a:rPr>
+              <a:t>backend</a:t>
+            </a:r>
+            <a:r>
+              <a:rPr lang="es-ES" dirty="0">
+                <a:solidFill>
+                  <a:srgbClr val="000000"/>
+                </a:solidFill>
+                <a:latin typeface="Calibri" panose="020F0502020204030204" pitchFamily="34" charset="0"/>
+                <a:ea typeface="Calibri" panose="020F0502020204030204" pitchFamily="34" charset="0"/>
+              </a:rPr>
+              <a:t> del </a:t>
+            </a:r>
+            <a:r>
+              <a:rPr lang="es-ES" dirty="0" err="1">
+                <a:solidFill>
+                  <a:srgbClr val="000000"/>
+                </a:solidFill>
+                <a:latin typeface="Calibri" panose="020F0502020204030204" pitchFamily="34" charset="0"/>
+                <a:ea typeface="Calibri" panose="020F0502020204030204" pitchFamily="34" charset="0"/>
+              </a:rPr>
+              <a:t>frontend</a:t>
+            </a:r>
+            <a:endParaRPr lang="es-ES" dirty="0">
+              <a:solidFill>
+                <a:srgbClr val="000000"/>
+              </a:solidFill>
+              <a:effectLst/>
+              <a:latin typeface="Calibri" panose="020F0502020204030204" pitchFamily="34" charset="0"/>
+              <a:ea typeface="Calibri" panose="020F0502020204030204" pitchFamily="34" charset="0"/>
+            </a:endParaRPr>
+          </a:p>
+          <a:p>
+            <a:pPr lvl="1" indent="-342900" algn="just">
+              <a:buFont typeface="Symbol" panose="05050102010706020507" pitchFamily="18" charset="2"/>
+              <a:buChar char=""/>
+            </a:pPr>
+            <a:r>
+              <a:rPr lang="es-ES" dirty="0">
+                <a:solidFill>
+                  <a:srgbClr val="000000"/>
+                </a:solidFill>
+                <a:latin typeface="Calibri" panose="020F0502020204030204" pitchFamily="34" charset="0"/>
+              </a:rPr>
+              <a:t>Desplegar una página web.</a:t>
+            </a:r>
+          </a:p>
+          <a:p>
+            <a:pPr algn="just"/>
+            <a:r>
+              <a:rPr lang="es-ES" sz="1800" b="1" dirty="0">
+                <a:solidFill>
+                  <a:srgbClr val="000000"/>
+                </a:solidFill>
+                <a:effectLst/>
+                <a:latin typeface="Calibri" panose="020F0502020204030204" pitchFamily="34" charset="0"/>
+                <a:ea typeface="Calibri" panose="020F0502020204030204" pitchFamily="34" charset="0"/>
+              </a:rPr>
+              <a:t>A nivel personal:</a:t>
+            </a:r>
+            <a:endParaRPr lang="es-ES" sz="1800" dirty="0">
+              <a:solidFill>
+                <a:srgbClr val="000000"/>
+              </a:solidFill>
+              <a:effectLst/>
+              <a:latin typeface="Calibri" panose="020F0502020204030204" pitchFamily="34" charset="0"/>
+              <a:ea typeface="Calibri" panose="020F0502020204030204" pitchFamily="34" charset="0"/>
+            </a:endParaRPr>
+          </a:p>
+          <a:p>
+            <a:pPr lvl="1" indent="-342900" algn="just">
+              <a:buFont typeface="Symbol" panose="05050102010706020507" pitchFamily="18" charset="2"/>
+              <a:buChar char=""/>
+            </a:pPr>
+            <a:r>
+              <a:rPr lang="es-ES" dirty="0">
+                <a:solidFill>
+                  <a:srgbClr val="000000"/>
+                </a:solidFill>
+                <a:effectLst/>
+                <a:latin typeface="Calibri" panose="020F0502020204030204" pitchFamily="34" charset="0"/>
+                <a:ea typeface="Calibri" panose="020F0502020204030204" pitchFamily="34" charset="0"/>
+              </a:rPr>
+              <a:t>Lidiar con los problemas de trabajar con tecnologías desconocidas.</a:t>
+            </a:r>
+          </a:p>
+          <a:p>
+            <a:pPr lvl="1" indent="-342900" algn="just">
+              <a:buFont typeface="Symbol" panose="05050102010706020507" pitchFamily="18" charset="2"/>
+              <a:buChar char=""/>
+            </a:pPr>
+            <a:r>
+              <a:rPr lang="es-ES" dirty="0">
+                <a:solidFill>
+                  <a:srgbClr val="000000"/>
+                </a:solidFill>
+                <a:effectLst/>
+                <a:latin typeface="Calibri" panose="020F0502020204030204" pitchFamily="34" charset="0"/>
+                <a:ea typeface="Calibri" panose="020F0502020204030204" pitchFamily="34" charset="0"/>
+              </a:rPr>
+              <a:t>Gestionar los tiempos.</a:t>
+            </a:r>
+          </a:p>
+          <a:p>
+            <a:pPr lvl="1" indent="-342900" algn="just">
+              <a:buFont typeface="Symbol" panose="05050102010706020507" pitchFamily="18" charset="2"/>
+              <a:buChar char=""/>
+            </a:pPr>
+            <a:r>
+              <a:rPr lang="es-ES" dirty="0">
+                <a:solidFill>
+                  <a:srgbClr val="000000"/>
+                </a:solidFill>
+                <a:latin typeface="Calibri" panose="020F0502020204030204" pitchFamily="34" charset="0"/>
+                <a:ea typeface="Calibri" panose="020F0502020204030204" pitchFamily="34" charset="0"/>
+              </a:rPr>
+              <a:t>Tener que tomar decisiones.</a:t>
+            </a:r>
+            <a:endParaRPr lang="es-ES" dirty="0">
+              <a:solidFill>
+                <a:srgbClr val="000000"/>
+              </a:solidFill>
+              <a:effectLst/>
+              <a:latin typeface="Calibri" panose="020F0502020204030204" pitchFamily="34" charset="0"/>
+              <a:ea typeface="Calibri" panose="020F0502020204030204" pitchFamily="34" charset="0"/>
+            </a:endParaRPr>
+          </a:p>
+          <a:p>
+            <a:endParaRPr lang="es-ES" dirty="0"/>
+          </a:p>
+        </p:txBody>
+      </p:sp>
+    </p:spTree>
+    <p:extLst>
+      <p:ext uri="{BB962C8B-B14F-4D97-AF65-F5344CB8AC3E}">
+        <p14:creationId xmlns:p14="http://schemas.microsoft.com/office/powerpoint/2010/main" val="1472778878"/>
+      </p:ext>
+    </p:extLst>
+  </p:cSld>
+  <p:clrMapOvr>
+    <a:masterClrMapping/>
+  </p:clrMapOvr>
+</p:sld>
+</file>
+
+<file path=ppt/slides/slide7.xml><?xml version="1.0" encoding="utf-8"?>
+<p:sld xmlns:a="http://schemas.openxmlformats.org/drawingml/2006/main" xmlns:r="http://schemas.openxmlformats.org/officeDocument/2006/relationships" xmlns:p="http://schemas.openxmlformats.org/presentationml/2006/main">
+  <p:cSld>
+    <p:spTree>
+      <p:nvGrpSpPr>
+        <p:cNvPr id="1" name=""/>
+        <p:cNvGrpSpPr/>
+        <p:nvPr/>
+      </p:nvGrpSpPr>
+      <p:grpSpPr>
+        <a:xfrm>
+          <a:off x="0" y="0"/>
+          <a:ext cx="0" cy="0"/>
+          <a:chOff x="0" y="0"/>
+          <a:chExt cx="0" cy="0"/>
+        </a:xfrm>
+      </p:grpSpPr>
+      <p:sp>
+        <p:nvSpPr>
+          <p:cNvPr id="2" name="Título 1">
+            <a:extLst>
+              <a:ext uri="{FF2B5EF4-FFF2-40B4-BE49-F238E27FC236}">
+                <a16:creationId xmlns:a16="http://schemas.microsoft.com/office/drawing/2014/main" id="{A91E6ED1-188B-76DC-341C-CE194FBB672B}"/>
+              </a:ext>
+            </a:extLst>
+          </p:cNvPr>
+          <p:cNvSpPr>
+            <a:spLocks noGrp="1"/>
+          </p:cNvSpPr>
+          <p:nvPr>
+            <p:ph type="title"/>
+          </p:nvPr>
+        </p:nvSpPr>
+        <p:spPr/>
+        <p:txBody>
+          <a:bodyPr/>
+          <a:lstStyle/>
+          <a:p>
+            <a:r>
+              <a:rPr lang="es-ES" dirty="0"/>
+              <a:t>Índice</a:t>
+            </a:r>
+          </a:p>
+        </p:txBody>
+      </p:sp>
+      <p:sp>
+        <p:nvSpPr>
+          <p:cNvPr id="3" name="Marcador de contenido 2">
+            <a:extLst>
+              <a:ext uri="{FF2B5EF4-FFF2-40B4-BE49-F238E27FC236}">
+                <a16:creationId xmlns:a16="http://schemas.microsoft.com/office/drawing/2014/main" id="{78669549-A335-3A34-3C1D-213FB03C61FD}"/>
+              </a:ext>
+            </a:extLst>
+          </p:cNvPr>
+          <p:cNvSpPr>
+            <a:spLocks noGrp="1"/>
+          </p:cNvSpPr>
+          <p:nvPr>
+            <p:ph idx="1"/>
+          </p:nvPr>
+        </p:nvSpPr>
+        <p:spPr/>
+        <p:txBody>
+          <a:bodyPr>
+            <a:normAutofit/>
+          </a:bodyPr>
+          <a:lstStyle/>
+          <a:p>
+            <a:r>
+              <a:rPr lang="es-ES" dirty="0">
+                <a:solidFill>
+                  <a:schemeClr val="bg2">
+                    <a:lumMod val="75000"/>
+                  </a:schemeClr>
+                </a:solidFill>
+              </a:rPr>
+              <a:t>Motivación</a:t>
+            </a:r>
+          </a:p>
+          <a:p>
+            <a:r>
+              <a:rPr lang="es-ES" dirty="0">
+                <a:solidFill>
+                  <a:schemeClr val="bg2">
+                    <a:lumMod val="75000"/>
+                  </a:schemeClr>
+                </a:solidFill>
+              </a:rPr>
+              <a:t>Objetivos</a:t>
+            </a:r>
+          </a:p>
+          <a:p>
+            <a:r>
+              <a:rPr lang="es-ES" sz="2400" dirty="0"/>
+              <a:t>Plan de trabajo y Temporalización</a:t>
+            </a:r>
+          </a:p>
+          <a:p>
+            <a:r>
+              <a:rPr lang="es-ES" dirty="0">
+                <a:solidFill>
+                  <a:schemeClr val="bg2">
+                    <a:lumMod val="75000"/>
+                  </a:schemeClr>
+                </a:solidFill>
+              </a:rPr>
+              <a:t>Tecnologías utilizadas</a:t>
+            </a:r>
+          </a:p>
+          <a:p>
+            <a:r>
+              <a:rPr lang="es-ES" dirty="0">
+                <a:solidFill>
+                  <a:schemeClr val="bg2">
+                    <a:lumMod val="75000"/>
+                  </a:schemeClr>
+                </a:solidFill>
+              </a:rPr>
+              <a:t>Prototipo</a:t>
+            </a:r>
+          </a:p>
+          <a:p>
+            <a:r>
+              <a:rPr lang="es-ES" dirty="0">
+                <a:solidFill>
+                  <a:schemeClr val="bg2">
+                    <a:lumMod val="75000"/>
+                  </a:schemeClr>
+                </a:solidFill>
+              </a:rPr>
+              <a:t>Base de Datos</a:t>
+            </a:r>
+          </a:p>
+          <a:p>
+            <a:r>
+              <a:rPr lang="es-ES" dirty="0">
+                <a:solidFill>
+                  <a:schemeClr val="bg2">
+                    <a:lumMod val="75000"/>
+                  </a:schemeClr>
+                </a:solidFill>
+              </a:rPr>
+              <a:t>Demo</a:t>
+            </a:r>
+          </a:p>
+          <a:p>
+            <a:r>
+              <a:rPr lang="es-ES" dirty="0">
+                <a:solidFill>
+                  <a:schemeClr val="bg2">
+                    <a:lumMod val="75000"/>
+                  </a:schemeClr>
+                </a:solidFill>
+              </a:rPr>
+              <a:t>Conclusiones</a:t>
+            </a:r>
+          </a:p>
+          <a:p>
+            <a:r>
+              <a:rPr lang="es-ES" dirty="0">
+                <a:solidFill>
+                  <a:schemeClr val="bg2">
+                    <a:lumMod val="75000"/>
+                  </a:schemeClr>
+                </a:solidFill>
+              </a:rPr>
+              <a:t>Preguntas</a:t>
+            </a:r>
+          </a:p>
+          <a:p>
+            <a:endParaRPr lang="es-ES" dirty="0"/>
+          </a:p>
+        </p:txBody>
+      </p:sp>
+    </p:spTree>
+    <p:extLst>
+      <p:ext uri="{BB962C8B-B14F-4D97-AF65-F5344CB8AC3E}">
+        <p14:creationId xmlns:p14="http://schemas.microsoft.com/office/powerpoint/2010/main" val="4026825388"/>
+      </p:ext>
+    </p:extLst>
+  </p:cSld>
+  <p:clrMapOvr>
+    <a:masterClrMapping/>
+  </p:clrMapOvr>
+</p:sld>
+</file>
+
+<file path=ppt/slides/slide8.xml><?xml version="1.0" encoding="utf-8"?>
+<p:sld xmlns:a="http://schemas.openxmlformats.org/drawingml/2006/main" xmlns:r="http://schemas.openxmlformats.org/officeDocument/2006/relationships" xmlns:p="http://schemas.openxmlformats.org/presentationml/2006/main">
+  <p:cSld>
+    <p:spTree>
+      <p:nvGrpSpPr>
+        <p:cNvPr id="1" name=""/>
+        <p:cNvGrpSpPr/>
+        <p:nvPr/>
+      </p:nvGrpSpPr>
+      <p:grpSpPr>
+        <a:xfrm>
+          <a:off x="0" y="0"/>
+          <a:ext cx="0" cy="0"/>
+          <a:chOff x="0" y="0"/>
+          <a:chExt cx="0" cy="0"/>
+        </a:xfrm>
+      </p:grpSpPr>
+      <p:sp>
+        <p:nvSpPr>
+          <p:cNvPr id="2" name="Título 1">
+            <a:extLst>
+              <a:ext uri="{FF2B5EF4-FFF2-40B4-BE49-F238E27FC236}">
+                <a16:creationId xmlns:a16="http://schemas.microsoft.com/office/drawing/2014/main" id="{8B59851B-67E1-027F-1829-260C3B5518DB}"/>
+              </a:ext>
+            </a:extLst>
+          </p:cNvPr>
+          <p:cNvSpPr>
+            <a:spLocks noGrp="1"/>
+          </p:cNvSpPr>
+          <p:nvPr>
+            <p:ph type="title"/>
+          </p:nvPr>
+        </p:nvSpPr>
+        <p:spPr/>
+        <p:txBody>
+          <a:bodyPr/>
+          <a:lstStyle/>
+          <a:p>
+            <a:r>
+              <a:rPr lang="es-ES" dirty="0"/>
+              <a:t>Plan de trabajo y Temporalización</a:t>
+            </a:r>
+          </a:p>
+        </p:txBody>
+      </p:sp>
+      <p:sp>
+        <p:nvSpPr>
+          <p:cNvPr id="3" name="Marcador de contenido 2">
+            <a:extLst>
+              <a:ext uri="{FF2B5EF4-FFF2-40B4-BE49-F238E27FC236}">
+                <a16:creationId xmlns:a16="http://schemas.microsoft.com/office/drawing/2014/main" id="{4F8C50B0-0470-FF1F-FCAC-069A7FFAADE4}"/>
+              </a:ext>
+            </a:extLst>
+          </p:cNvPr>
+          <p:cNvSpPr>
+            <a:spLocks noGrp="1"/>
+          </p:cNvSpPr>
+          <p:nvPr>
+            <p:ph idx="1"/>
+          </p:nvPr>
+        </p:nvSpPr>
+        <p:spPr/>
+        <p:txBody>
+          <a:bodyPr>
+            <a:normAutofit lnSpcReduction="10000"/>
+          </a:bodyPr>
+          <a:lstStyle/>
+          <a:p>
+            <a:r>
+              <a:rPr lang="es-ES" dirty="0"/>
+              <a:t>El proyecto se ha dividido en las siguientes fases:</a:t>
+            </a:r>
+          </a:p>
+          <a:p>
+            <a:pPr lvl="1" indent="-342900" algn="just">
+              <a:buFont typeface="Symbol" panose="05050102010706020507" pitchFamily="18" charset="2"/>
+              <a:buChar char=""/>
+            </a:pPr>
+            <a:r>
+              <a:rPr lang="es-ES" b="1" dirty="0">
+                <a:solidFill>
+                  <a:srgbClr val="000000"/>
+                </a:solidFill>
+                <a:effectLst/>
+                <a:latin typeface="Calibri" panose="020F0502020204030204" pitchFamily="34" charset="0"/>
+                <a:ea typeface="Calibri" panose="020F0502020204030204" pitchFamily="34" charset="0"/>
+              </a:rPr>
+              <a:t>Análisis (3h)</a:t>
+            </a:r>
+          </a:p>
+          <a:p>
+            <a:pPr lvl="1" indent="-342900" algn="just">
+              <a:buFont typeface="Symbol" panose="05050102010706020507" pitchFamily="18" charset="2"/>
+              <a:buChar char=""/>
+            </a:pPr>
+            <a:r>
+              <a:rPr lang="es-ES" b="1" dirty="0">
+                <a:solidFill>
+                  <a:srgbClr val="000000"/>
+                </a:solidFill>
+                <a:effectLst/>
+                <a:latin typeface="Calibri" panose="020F0502020204030204" pitchFamily="34" charset="0"/>
+                <a:ea typeface="Calibri" panose="020F0502020204030204" pitchFamily="34" charset="0"/>
+              </a:rPr>
+              <a:t>Diseño (20h)</a:t>
+            </a:r>
+          </a:p>
+          <a:p>
+            <a:pPr lvl="1" indent="-342900" algn="just">
+              <a:buFont typeface="Symbol" panose="05050102010706020507" pitchFamily="18" charset="2"/>
+              <a:buChar char=""/>
+            </a:pPr>
+            <a:r>
+              <a:rPr lang="es-ES" b="1" dirty="0">
+                <a:solidFill>
+                  <a:srgbClr val="000000"/>
+                </a:solidFill>
+                <a:effectLst/>
+                <a:latin typeface="Calibri" panose="020F0502020204030204" pitchFamily="34" charset="0"/>
+                <a:ea typeface="Calibri" panose="020F0502020204030204" pitchFamily="34" charset="0"/>
+              </a:rPr>
+              <a:t>Desarrollo (92h total)	</a:t>
+            </a:r>
+          </a:p>
+          <a:p>
+            <a:pPr lvl="2" indent="-342900" algn="just">
+              <a:buFont typeface="Symbol" panose="05050102010706020507" pitchFamily="18" charset="2"/>
+              <a:buChar char=""/>
+            </a:pPr>
+            <a:r>
+              <a:rPr lang="es-ES" b="1" dirty="0">
+                <a:solidFill>
+                  <a:srgbClr val="000000"/>
+                </a:solidFill>
+                <a:latin typeface="Calibri" panose="020F0502020204030204" pitchFamily="34" charset="0"/>
+                <a:ea typeface="Calibri" panose="020F0502020204030204" pitchFamily="34" charset="0"/>
+              </a:rPr>
+              <a:t>Base de Datos (4h)</a:t>
+            </a:r>
+          </a:p>
+          <a:p>
+            <a:pPr lvl="2" indent="-342900" algn="just">
+              <a:buFont typeface="Symbol" panose="05050102010706020507" pitchFamily="18" charset="2"/>
+              <a:buChar char=""/>
+            </a:pPr>
+            <a:r>
+              <a:rPr lang="es-ES" b="1" dirty="0" err="1">
+                <a:solidFill>
+                  <a:srgbClr val="000000"/>
+                </a:solidFill>
+                <a:effectLst/>
+                <a:latin typeface="Calibri" panose="020F0502020204030204" pitchFamily="34" charset="0"/>
+                <a:ea typeface="Calibri" panose="020F0502020204030204" pitchFamily="34" charset="0"/>
+              </a:rPr>
+              <a:t>BackEnd</a:t>
+            </a:r>
+            <a:r>
+              <a:rPr lang="es-ES" b="1" dirty="0">
+                <a:solidFill>
+                  <a:srgbClr val="000000"/>
+                </a:solidFill>
+                <a:effectLst/>
+                <a:latin typeface="Calibri" panose="020F0502020204030204" pitchFamily="34" charset="0"/>
+                <a:ea typeface="Calibri" panose="020F0502020204030204" pitchFamily="34" charset="0"/>
+              </a:rPr>
+              <a:t> (8h)</a:t>
+            </a:r>
+          </a:p>
+          <a:p>
+            <a:pPr lvl="2" indent="-342900" algn="just">
+              <a:buFont typeface="Symbol" panose="05050102010706020507" pitchFamily="18" charset="2"/>
+              <a:buChar char=""/>
+            </a:pPr>
+            <a:r>
+              <a:rPr lang="es-ES" b="1" dirty="0" err="1">
+                <a:solidFill>
+                  <a:srgbClr val="000000"/>
+                </a:solidFill>
+                <a:latin typeface="Calibri" panose="020F0502020204030204" pitchFamily="34" charset="0"/>
+                <a:ea typeface="Calibri" panose="020F0502020204030204" pitchFamily="34" charset="0"/>
+              </a:rPr>
+              <a:t>FrontEnd</a:t>
+            </a:r>
+            <a:r>
+              <a:rPr lang="es-ES" b="1" dirty="0">
+                <a:solidFill>
+                  <a:srgbClr val="000000"/>
+                </a:solidFill>
+                <a:latin typeface="Calibri" panose="020F0502020204030204" pitchFamily="34" charset="0"/>
+                <a:ea typeface="Calibri" panose="020F0502020204030204" pitchFamily="34" charset="0"/>
+              </a:rPr>
+              <a:t> (60h)</a:t>
+            </a:r>
+          </a:p>
+          <a:p>
+            <a:pPr lvl="2" indent="-342900" algn="just">
+              <a:buFont typeface="Symbol" panose="05050102010706020507" pitchFamily="18" charset="2"/>
+              <a:buChar char=""/>
+            </a:pPr>
+            <a:r>
+              <a:rPr lang="es-ES" b="1" dirty="0">
+                <a:solidFill>
+                  <a:srgbClr val="000000"/>
+                </a:solidFill>
+                <a:effectLst/>
+                <a:latin typeface="Calibri" panose="020F0502020204030204" pitchFamily="34" charset="0"/>
+                <a:ea typeface="Calibri" panose="020F0502020204030204" pitchFamily="34" charset="0"/>
+              </a:rPr>
+              <a:t>Corrección de Bugs (20h)</a:t>
+            </a:r>
+          </a:p>
+          <a:p>
+            <a:pPr lvl="1" indent="-342900" algn="just">
+              <a:buFont typeface="Symbol" panose="05050102010706020507" pitchFamily="18" charset="2"/>
+              <a:buChar char=""/>
+            </a:pPr>
+            <a:r>
+              <a:rPr lang="es-ES" b="1" dirty="0">
+                <a:solidFill>
+                  <a:srgbClr val="000000"/>
+                </a:solidFill>
+                <a:effectLst/>
+                <a:latin typeface="Calibri" panose="020F0502020204030204" pitchFamily="34" charset="0"/>
+                <a:ea typeface="Calibri" panose="020F0502020204030204" pitchFamily="34" charset="0"/>
+              </a:rPr>
+              <a:t>Compilación (4h)</a:t>
+            </a:r>
+            <a:endParaRPr lang="es-ES" b="1" dirty="0">
+              <a:solidFill>
+                <a:srgbClr val="000000"/>
+              </a:solidFill>
+              <a:latin typeface="Calibri" panose="020F0502020204030204" pitchFamily="34" charset="0"/>
+              <a:ea typeface="Calibri" panose="020F0502020204030204" pitchFamily="34" charset="0"/>
+            </a:endParaRPr>
+          </a:p>
+          <a:p>
+            <a:pPr lvl="1" indent="-342900" algn="just">
+              <a:buFont typeface="Symbol" panose="05050102010706020507" pitchFamily="18" charset="2"/>
+              <a:buChar char=""/>
+            </a:pPr>
+            <a:r>
+              <a:rPr lang="es-ES" b="1" dirty="0">
+                <a:solidFill>
+                  <a:srgbClr val="000000"/>
+                </a:solidFill>
+                <a:latin typeface="Calibri" panose="020F0502020204030204" pitchFamily="34" charset="0"/>
+              </a:rPr>
+              <a:t>Despliegue (5h)</a:t>
+            </a:r>
+            <a:endParaRPr lang="es-ES" dirty="0"/>
+          </a:p>
+          <a:p>
+            <a:r>
+              <a:rPr lang="es-ES" b="1" dirty="0">
+                <a:solidFill>
+                  <a:srgbClr val="000000"/>
+                </a:solidFill>
+                <a:latin typeface="Calibri" panose="020F0502020204030204" pitchFamily="34" charset="0"/>
+              </a:rPr>
+              <a:t>Total: 124 h aproximadamente</a:t>
+            </a:r>
+          </a:p>
+        </p:txBody>
+      </p:sp>
+    </p:spTree>
+    <p:extLst>
+      <p:ext uri="{BB962C8B-B14F-4D97-AF65-F5344CB8AC3E}">
+        <p14:creationId xmlns:p14="http://schemas.microsoft.com/office/powerpoint/2010/main" val="1052401113"/>
+      </p:ext>
+    </p:extLst>
+  </p:cSld>
+  <p:clrMapOvr>
+    <a:masterClrMapping/>
+  </p:clrMapOvr>
+</p:sld>
+</file>
+
 <file path=ppt/slides/slide9.xml><?xml version="1.0" encoding="utf-8"?>
 <p:sld xmlns:a="http://schemas.openxmlformats.org/drawingml/2006/main" xmlns:r="http://schemas.openxmlformats.org/officeDocument/2006/relationships" xmlns:p="http://schemas.openxmlformats.org/presentationml/2006/main">
   <p:cSld>
@@ -9965,7 +11843,7 @@
           <p:cNvPr id="2" name="Título 1">
             <a:extLst>
               <a:ext uri="{FF2B5EF4-FFF2-40B4-BE49-F238E27FC236}">
-                <a16:creationId xmlns:a16="http://schemas.microsoft.com/office/drawing/2014/main" id="{D986E5BC-5F83-73C7-C180-DA40CF7220B8}"/>
+                <a16:creationId xmlns:a16="http://schemas.microsoft.com/office/drawing/2014/main" id="{A91E6ED1-188B-76DC-341C-CE194FBB672B}"/>
               </a:ext>
             </a:extLst>
           </p:cNvPr>
@@ -9983,7 +11861,7 @@
           <a:p>
             <a:r>
               <a:rPr lang="es-ES" dirty="0"/>
-              <a:t>Demo</a:t>
+              <a:t>Índice</a:t>
             </a:r>
           </a:p>
         </p:txBody>
@@ -9993,7 +11871,7 @@
           <p:cNvPr id="3" name="Marcador de contenido 2">
             <a:extLst>
               <a:ext uri="{FF2B5EF4-FFF2-40B4-BE49-F238E27FC236}">
-                <a16:creationId xmlns:a16="http://schemas.microsoft.com/office/drawing/2014/main" id="{B925B571-44AD-9500-5DE4-637EE8EC8A0C}"/>
+                <a16:creationId xmlns:a16="http://schemas.microsoft.com/office/drawing/2014/main" id="{78669549-A335-3A34-3C1D-213FB03C61FD}"/>
               </a:ext>
             </a:extLst>
           </p:cNvPr>
@@ -10006,33 +11884,121 @@
         </p:nvSpPr>
         <p:spPr/>
         <p:txBody>
-          <a:bodyPr/>
+          <a:bodyPr>
+            <a:normAutofit/>
+          </a:bodyPr>
           <a:lstStyle/>
           <a:p>
             <a:r>
-              <a:rPr lang="es-ES" dirty="0"/>
-              <a:t>Ahora procederé a mostrar una demo de la aplicación y su funcionamiento</a:t>
+              <a:rPr lang="es-ES" dirty="0">
+                <a:solidFill>
+                  <a:schemeClr val="bg2">
+                    <a:lumMod val="75000"/>
+                  </a:schemeClr>
+                </a:solidFill>
+              </a:rPr>
+              <a:t>Motivación</a:t>
+            </a:r>
+          </a:p>
+          <a:p>
+            <a:r>
+              <a:rPr lang="es-ES" dirty="0">
+                <a:solidFill>
+                  <a:schemeClr val="bg2">
+                    <a:lumMod val="75000"/>
+                  </a:schemeClr>
+                </a:solidFill>
+              </a:rPr>
+              <a:t>Objetivos</a:t>
+            </a:r>
+          </a:p>
+          <a:p>
+            <a:r>
+              <a:rPr lang="es-ES" dirty="0">
+                <a:solidFill>
+                  <a:schemeClr val="bg2">
+                    <a:lumMod val="75000"/>
+                  </a:schemeClr>
+                </a:solidFill>
+              </a:rPr>
+              <a:t>Plan de trabajo y Temporalización</a:t>
+            </a:r>
+          </a:p>
+          <a:p>
+            <a:r>
+              <a:rPr lang="es-ES" sz="2400" dirty="0"/>
+              <a:t>Tecnologías utilizadas</a:t>
+            </a:r>
+          </a:p>
+          <a:p>
+            <a:r>
+              <a:rPr lang="es-ES" dirty="0">
+                <a:solidFill>
+                  <a:schemeClr val="bg2">
+                    <a:lumMod val="75000"/>
+                  </a:schemeClr>
+                </a:solidFill>
+              </a:rPr>
+              <a:t>Prototipo</a:t>
+            </a:r>
+          </a:p>
+          <a:p>
+            <a:r>
+              <a:rPr lang="es-ES" dirty="0">
+                <a:solidFill>
+                  <a:schemeClr val="bg2">
+                    <a:lumMod val="75000"/>
+                  </a:schemeClr>
+                </a:solidFill>
+              </a:rPr>
+              <a:t>Base de Datos</a:t>
+            </a:r>
+          </a:p>
+          <a:p>
+            <a:r>
+              <a:rPr lang="es-ES" dirty="0">
+                <a:solidFill>
+                  <a:schemeClr val="bg2">
+                    <a:lumMod val="75000"/>
+                  </a:schemeClr>
+                </a:solidFill>
+              </a:rPr>
+              <a:t>Demo</a:t>
+            </a:r>
+          </a:p>
+          <a:p>
+            <a:r>
+              <a:rPr lang="es-ES" dirty="0">
+                <a:solidFill>
+                  <a:schemeClr val="bg2">
+                    <a:lumMod val="75000"/>
+                  </a:schemeClr>
+                </a:solidFill>
+              </a:rPr>
+              <a:t>Conclusiones</a:t>
+            </a:r>
+          </a:p>
+          <a:p>
+            <a:r>
+              <a:rPr lang="es-ES" dirty="0">
+                <a:solidFill>
+                  <a:schemeClr val="bg2">
+                    <a:lumMod val="75000"/>
+                  </a:schemeClr>
+                </a:solidFill>
+              </a:rPr>
+              <a:t>Preguntas</a:t>
             </a:r>
           </a:p>
           <a:p>
             <a:endParaRPr lang="es-ES" dirty="0"/>
-          </a:p>
-          <a:p>
-            <a:r>
-              <a:rPr lang="es-ES" dirty="0">
-                <a:solidFill>
-                  <a:srgbClr val="FF0000"/>
-                </a:solidFill>
-              </a:rPr>
-              <a:t>PONER AQUÍ EL LINK EN CASO DE DESPLEGARLO</a:t>
-            </a:r>
           </a:p>
         </p:txBody>
       </p:sp>
     </p:spTree>
     <p:extLst>
       <p:ext uri="{BB962C8B-B14F-4D97-AF65-F5344CB8AC3E}">
-        <p14:creationId xmlns:p14="http://schemas.microsoft.com/office/powerpoint/2010/main" val="1928398243"/>
+        <p14:creationId xmlns:p14="http://schemas.microsoft.com/office/powerpoint/2010/main" val="2662567000"/>
       </p:ext>
     </p:extLst>
   </p:cSld>

</xml_diff>